<commit_message>
fixed ex 1 diagram
</commit_message>
<xml_diff>
--- a/assignments/labs/lab2/documents/drawing.pptx
+++ b/assignments/labs/lab2/documents/drawing.pptx
@@ -4140,7 +4140,7 @@
                     <a:pPr algn="ctr"/>
                     <a:r>
                       <a:rPr lang="en-US" dirty="0"/>
-                      <a:t>\0</a:t>
+                      <a:t>?</a:t>
                     </a:r>
                     <a:endParaRPr lang="en-CA" dirty="0"/>
                   </a:p>
@@ -4177,7 +4177,7 @@
                     <a:pPr algn="ctr"/>
                     <a:r>
                       <a:rPr lang="en-US" dirty="0"/>
-                      <a:t>\0</a:t>
+                      <a:t>?</a:t>
                     </a:r>
                     <a:endParaRPr lang="en-CA" dirty="0"/>
                   </a:p>
@@ -4235,7 +4235,7 @@
                     <a:pPr algn="ctr"/>
                     <a:r>
                       <a:rPr lang="en-US" dirty="0"/>
-                      <a:t>\0</a:t>
+                      <a:t>?</a:t>
                     </a:r>
                     <a:endParaRPr lang="en-CA" dirty="0"/>
                   </a:p>
@@ -4272,7 +4272,7 @@
                     <a:pPr algn="ctr"/>
                     <a:r>
                       <a:rPr lang="en-US" dirty="0"/>
-                      <a:t>\0</a:t>
+                      <a:t>?</a:t>
                     </a:r>
                     <a:endParaRPr lang="en-CA" dirty="0"/>
                   </a:p>
@@ -4918,6 +4918,2144 @@
             <a:r>
               <a:rPr lang="en-US" b="1" u="sng" dirty="0"/>
               <a:t>Point 2</a:t>
+            </a:r>
+            <a:endParaRPr lang="en-CA" b="1" u="sng" dirty="0"/>
+          </a:p>
+        </p:txBody>
+      </p:sp>
+      <p:cxnSp>
+        <p:nvCxnSpPr>
+          <p:cNvPr id="11" name="Straight Connector 10">
+            <a:extLst>
+              <a:ext uri="{FF2B5EF4-FFF2-40B4-BE49-F238E27FC236}">
+                <a16:creationId xmlns:a16="http://schemas.microsoft.com/office/drawing/2014/main" id="{864EEF87-5E24-8D86-29AE-FBEDA76B19C1}"/>
+              </a:ext>
+            </a:extLst>
+          </p:cNvPr>
+          <p:cNvCxnSpPr>
+            <a:cxnSpLocks/>
+          </p:cNvCxnSpPr>
+          <p:nvPr/>
+        </p:nvCxnSpPr>
+        <p:spPr>
+          <a:xfrm>
+            <a:off x="2929589" y="5378177"/>
+            <a:ext cx="3550920" cy="0"/>
+          </a:xfrm>
+          <a:prstGeom prst="line">
+            <a:avLst/>
+          </a:prstGeom>
+        </p:spPr>
+        <p:style>
+          <a:lnRef idx="1">
+            <a:schemeClr val="dk1"/>
+          </a:lnRef>
+          <a:fillRef idx="0">
+            <a:schemeClr val="dk1"/>
+          </a:fillRef>
+          <a:effectRef idx="0">
+            <a:schemeClr val="dk1"/>
+          </a:effectRef>
+          <a:fontRef idx="minor">
+            <a:schemeClr val="tx1"/>
+          </a:fontRef>
+        </p:style>
+      </p:cxnSp>
+      <p:sp>
+        <p:nvSpPr>
+          <p:cNvPr id="12" name="TextBox 11">
+            <a:extLst>
+              <a:ext uri="{FF2B5EF4-FFF2-40B4-BE49-F238E27FC236}">
+                <a16:creationId xmlns:a16="http://schemas.microsoft.com/office/drawing/2014/main" id="{0B433080-284D-7D97-2992-FE77EE257555}"/>
+              </a:ext>
+            </a:extLst>
+          </p:cNvPr>
+          <p:cNvSpPr txBox="1"/>
+          <p:nvPr/>
+        </p:nvSpPr>
+        <p:spPr>
+          <a:xfrm>
+            <a:off x="2929589" y="5406652"/>
+            <a:ext cx="3550920" cy="369332"/>
+          </a:xfrm>
+          <a:prstGeom prst="rect">
+            <a:avLst/>
+          </a:prstGeom>
+          <a:noFill/>
+        </p:spPr>
+        <p:txBody>
+          <a:bodyPr wrap="square" rtlCol="0">
+            <a:spAutoFit/>
+          </a:bodyPr>
+          <a:lstStyle/>
+          <a:p>
+            <a:pPr algn="ctr"/>
+            <a:r>
+              <a:rPr lang="en-US" dirty="0"/>
+              <a:t>No arguments</a:t>
+            </a:r>
+            <a:endParaRPr lang="en-CA" dirty="0"/>
+          </a:p>
+        </p:txBody>
+      </p:sp>
+      <p:sp>
+        <p:nvSpPr>
+          <p:cNvPr id="13" name="TextBox 12">
+            <a:extLst>
+              <a:ext uri="{FF2B5EF4-FFF2-40B4-BE49-F238E27FC236}">
+                <a16:creationId xmlns:a16="http://schemas.microsoft.com/office/drawing/2014/main" id="{2BEB660A-F17F-EBD5-09C5-DB7ABA245FA4}"/>
+              </a:ext>
+            </a:extLst>
+          </p:cNvPr>
+          <p:cNvSpPr txBox="1">
+            <a:spLocks/>
+          </p:cNvSpPr>
+          <p:nvPr/>
+        </p:nvSpPr>
+        <p:spPr>
+          <a:xfrm>
+            <a:off x="1973392" y="3779902"/>
+            <a:ext cx="965329" cy="369332"/>
+          </a:xfrm>
+          <a:prstGeom prst="rect">
+            <a:avLst/>
+          </a:prstGeom>
+          <a:noFill/>
+        </p:spPr>
+        <p:txBody>
+          <a:bodyPr wrap="none" rtlCol="0">
+            <a:spAutoFit/>
+          </a:bodyPr>
+          <a:lstStyle/>
+          <a:p>
+            <a:r>
+              <a:rPr lang="en-US" dirty="0"/>
+              <a:t>AR main</a:t>
+            </a:r>
+            <a:endParaRPr lang="en-CA" dirty="0"/>
+          </a:p>
+        </p:txBody>
+      </p:sp>
+      <p:grpSp>
+        <p:nvGrpSpPr>
+          <p:cNvPr id="5" name="Group 4">
+            <a:extLst>
+              <a:ext uri="{FF2B5EF4-FFF2-40B4-BE49-F238E27FC236}">
+                <a16:creationId xmlns:a16="http://schemas.microsoft.com/office/drawing/2014/main" id="{DA34308E-8370-4584-0279-57BBBBD6E06B}"/>
+              </a:ext>
+            </a:extLst>
+          </p:cNvPr>
+          <p:cNvGrpSpPr>
+            <a:grpSpLocks noGrp="1" noUngrp="1" noRot="1" noMove="1" noResize="1"/>
+          </p:cNvGrpSpPr>
+          <p:nvPr/>
+        </p:nvGrpSpPr>
+        <p:grpSpPr>
+          <a:xfrm>
+            <a:off x="2910740" y="3533335"/>
+            <a:ext cx="3572176" cy="2294021"/>
+            <a:chOff x="2720340" y="1014663"/>
+            <a:chExt cx="3572176" cy="2294021"/>
+          </a:xfrm>
+        </p:grpSpPr>
+        <p:grpSp>
+          <p:nvGrpSpPr>
+            <p:cNvPr id="50" name="Group 49">
+              <a:extLst>
+                <a:ext uri="{FF2B5EF4-FFF2-40B4-BE49-F238E27FC236}">
+                  <a16:creationId xmlns:a16="http://schemas.microsoft.com/office/drawing/2014/main" id="{9CD3C0BA-0025-4662-55E9-9D96917EF836}"/>
+                </a:ext>
+              </a:extLst>
+            </p:cNvPr>
+            <p:cNvGrpSpPr>
+              <a:grpSpLocks noGrp="1" noUngrp="1" noRot="1" noMove="1" noResize="1"/>
+            </p:cNvGrpSpPr>
+            <p:nvPr/>
+          </p:nvGrpSpPr>
+          <p:grpSpPr>
+            <a:xfrm>
+              <a:off x="2743200" y="1245643"/>
+              <a:ext cx="1937084" cy="652935"/>
+              <a:chOff x="2743200" y="1245643"/>
+              <a:chExt cx="1937084" cy="652935"/>
+            </a:xfrm>
+          </p:grpSpPr>
+          <p:sp>
+            <p:nvSpPr>
+              <p:cNvPr id="18" name="Rectangle 17">
+                <a:extLst>
+                  <a:ext uri="{FF2B5EF4-FFF2-40B4-BE49-F238E27FC236}">
+                    <a16:creationId xmlns:a16="http://schemas.microsoft.com/office/drawing/2014/main" id="{FC31BB81-2776-1BE2-99DF-39E86F15E699}"/>
+                  </a:ext>
+                </a:extLst>
+              </p:cNvPr>
+              <p:cNvSpPr>
+                <a:spLocks noGrp="1" noRot="1" noMove="1" noResize="1" noEditPoints="1" noAdjustHandles="1" noChangeArrowheads="1" noChangeShapeType="1"/>
+              </p:cNvSpPr>
+              <p:nvPr/>
+            </p:nvSpPr>
+            <p:spPr>
+              <a:xfrm>
+                <a:off x="3369209" y="1245643"/>
+                <a:ext cx="1307138" cy="399796"/>
+              </a:xfrm>
+              <a:prstGeom prst="rect">
+                <a:avLst/>
+              </a:prstGeom>
+              <a:noFill/>
+              <a:ln>
+                <a:solidFill>
+                  <a:schemeClr val="tx1"/>
+                </a:solidFill>
+              </a:ln>
+            </p:spPr>
+            <p:style>
+              <a:lnRef idx="2">
+                <a:schemeClr val="accent1">
+                  <a:shade val="15000"/>
+                </a:schemeClr>
+              </a:lnRef>
+              <a:fillRef idx="1">
+                <a:schemeClr val="accent1"/>
+              </a:fillRef>
+              <a:effectRef idx="0">
+                <a:schemeClr val="accent1"/>
+              </a:effectRef>
+              <a:fontRef idx="minor">
+                <a:schemeClr val="lt1"/>
+              </a:fontRef>
+            </p:style>
+            <p:txBody>
+              <a:bodyPr rtlCol="0" anchor="ctr"/>
+              <a:lstStyle/>
+              <a:p>
+                <a:pPr algn="ctr"/>
+                <a:endParaRPr lang="en-CA"/>
+              </a:p>
+            </p:txBody>
+          </p:sp>
+          <p:sp>
+            <p:nvSpPr>
+              <p:cNvPr id="17" name="TextBox 16">
+                <a:extLst>
+                  <a:ext uri="{FF2B5EF4-FFF2-40B4-BE49-F238E27FC236}">
+                    <a16:creationId xmlns:a16="http://schemas.microsoft.com/office/drawing/2014/main" id="{555E3565-737B-CA0F-1EE4-D4AFC2471ADC}"/>
+                  </a:ext>
+                </a:extLst>
+              </p:cNvPr>
+              <p:cNvSpPr txBox="1">
+                <a:spLocks noGrp="1" noRot="1" noMove="1" noResize="1" noEditPoints="1" noAdjustHandles="1" noChangeArrowheads="1" noChangeShapeType="1"/>
+              </p:cNvSpPr>
+              <p:nvPr/>
+            </p:nvSpPr>
+            <p:spPr>
+              <a:xfrm>
+                <a:off x="2743200" y="1252247"/>
+                <a:ext cx="626009" cy="646331"/>
+              </a:xfrm>
+              <a:prstGeom prst="rect">
+                <a:avLst/>
+              </a:prstGeom>
+              <a:noFill/>
+            </p:spPr>
+            <p:txBody>
+              <a:bodyPr wrap="square" rtlCol="0">
+                <a:spAutoFit/>
+              </a:bodyPr>
+              <a:lstStyle/>
+              <a:p>
+                <a:pPr algn="ctr"/>
+                <a:r>
+                  <a:rPr lang="en-US" dirty="0"/>
+                  <a:t>sum</a:t>
+                </a:r>
+                <a:endParaRPr lang="en-CA" dirty="0"/>
+              </a:p>
+            </p:txBody>
+          </p:sp>
+          <p:sp>
+            <p:nvSpPr>
+              <p:cNvPr id="24" name="TextBox 23">
+                <a:extLst>
+                  <a:ext uri="{FF2B5EF4-FFF2-40B4-BE49-F238E27FC236}">
+                    <a16:creationId xmlns:a16="http://schemas.microsoft.com/office/drawing/2014/main" id="{36380628-3A09-5297-36B5-2B0244A5BE5C}"/>
+                  </a:ext>
+                </a:extLst>
+              </p:cNvPr>
+              <p:cNvSpPr txBox="1">
+                <a:spLocks noGrp="1" noRot="1" noMove="1" noResize="1" noEditPoints="1" noAdjustHandles="1" noChangeArrowheads="1" noChangeShapeType="1"/>
+              </p:cNvSpPr>
+              <p:nvPr/>
+            </p:nvSpPr>
+            <p:spPr>
+              <a:xfrm>
+                <a:off x="3381020" y="1270535"/>
+                <a:ext cx="1299264" cy="369332"/>
+              </a:xfrm>
+              <a:prstGeom prst="rect">
+                <a:avLst/>
+              </a:prstGeom>
+              <a:noFill/>
+            </p:spPr>
+            <p:txBody>
+              <a:bodyPr wrap="square" rtlCol="0">
+                <a:spAutoFit/>
+              </a:bodyPr>
+              <a:lstStyle/>
+              <a:p>
+                <a:pPr algn="ctr"/>
+                <a:r>
+                  <a:rPr lang="en-US" dirty="0"/>
+                  <a:t>0</a:t>
+                </a:r>
+                <a:endParaRPr lang="en-CA" dirty="0"/>
+              </a:p>
+            </p:txBody>
+          </p:sp>
+        </p:grpSp>
+        <p:grpSp>
+          <p:nvGrpSpPr>
+            <p:cNvPr id="4" name="Group 3">
+              <a:extLst>
+                <a:ext uri="{FF2B5EF4-FFF2-40B4-BE49-F238E27FC236}">
+                  <a16:creationId xmlns:a16="http://schemas.microsoft.com/office/drawing/2014/main" id="{01E1524F-D215-531C-44D7-023B2BEE35FE}"/>
+                </a:ext>
+              </a:extLst>
+            </p:cNvPr>
+            <p:cNvGrpSpPr>
+              <a:grpSpLocks noGrp="1" noUngrp="1" noRot="1" noMove="1" noResize="1"/>
+            </p:cNvGrpSpPr>
+            <p:nvPr/>
+          </p:nvGrpSpPr>
+          <p:grpSpPr>
+            <a:xfrm>
+              <a:off x="2720340" y="1014663"/>
+              <a:ext cx="3572176" cy="2294021"/>
+              <a:chOff x="2720340" y="1014663"/>
+              <a:chExt cx="3572176" cy="2294021"/>
+            </a:xfrm>
+          </p:grpSpPr>
+          <p:sp>
+            <p:nvSpPr>
+              <p:cNvPr id="10" name="Rectangle 9">
+                <a:extLst>
+                  <a:ext uri="{FF2B5EF4-FFF2-40B4-BE49-F238E27FC236}">
+                    <a16:creationId xmlns:a16="http://schemas.microsoft.com/office/drawing/2014/main" id="{9C9B4144-BA02-7272-481D-121FB6A4802E}"/>
+                  </a:ext>
+                </a:extLst>
+              </p:cNvPr>
+              <p:cNvSpPr>
+                <a:spLocks noGrp="1" noRot="1" noMove="1" noResize="1" noEditPoints="1" noAdjustHandles="1" noChangeArrowheads="1" noChangeShapeType="1"/>
+              </p:cNvSpPr>
+              <p:nvPr/>
+            </p:nvSpPr>
+            <p:spPr>
+              <a:xfrm>
+                <a:off x="2739190" y="1014663"/>
+                <a:ext cx="3553326" cy="2294021"/>
+              </a:xfrm>
+              <a:prstGeom prst="rect">
+                <a:avLst/>
+              </a:prstGeom>
+              <a:noFill/>
+              <a:ln>
+                <a:solidFill>
+                  <a:schemeClr val="tx1"/>
+                </a:solidFill>
+              </a:ln>
+            </p:spPr>
+            <p:style>
+              <a:lnRef idx="2">
+                <a:schemeClr val="accent1">
+                  <a:shade val="15000"/>
+                </a:schemeClr>
+              </a:lnRef>
+              <a:fillRef idx="1">
+                <a:schemeClr val="accent1"/>
+              </a:fillRef>
+              <a:effectRef idx="0">
+                <a:schemeClr val="accent1"/>
+              </a:effectRef>
+              <a:fontRef idx="minor">
+                <a:schemeClr val="lt1"/>
+              </a:fontRef>
+            </p:style>
+            <p:txBody>
+              <a:bodyPr rtlCol="0" anchor="ctr"/>
+              <a:lstStyle/>
+              <a:p>
+                <a:pPr algn="ctr"/>
+                <a:endParaRPr lang="en-CA"/>
+              </a:p>
+            </p:txBody>
+          </p:sp>
+          <p:grpSp>
+            <p:nvGrpSpPr>
+              <p:cNvPr id="2" name="Group 1">
+                <a:extLst>
+                  <a:ext uri="{FF2B5EF4-FFF2-40B4-BE49-F238E27FC236}">
+                    <a16:creationId xmlns:a16="http://schemas.microsoft.com/office/drawing/2014/main" id="{D713AC0C-1A63-777A-9A52-DA2261A60D21}"/>
+                  </a:ext>
+                </a:extLst>
+              </p:cNvPr>
+              <p:cNvGrpSpPr>
+                <a:grpSpLocks noGrp="1" noUngrp="1" noRot="1" noMove="1" noResize="1"/>
+              </p:cNvGrpSpPr>
+              <p:nvPr/>
+            </p:nvGrpSpPr>
+            <p:grpSpPr>
+              <a:xfrm>
+                <a:off x="2720340" y="1824763"/>
+                <a:ext cx="3345180" cy="940816"/>
+                <a:chOff x="2720340" y="1824763"/>
+                <a:chExt cx="3345180" cy="940816"/>
+              </a:xfrm>
+            </p:grpSpPr>
+            <p:grpSp>
+              <p:nvGrpSpPr>
+                <p:cNvPr id="106" name="Group 105">
+                  <a:extLst>
+                    <a:ext uri="{FF2B5EF4-FFF2-40B4-BE49-F238E27FC236}">
+                      <a16:creationId xmlns:a16="http://schemas.microsoft.com/office/drawing/2014/main" id="{15DAE353-9425-CC7A-9CBB-6CCA743E0549}"/>
+                    </a:ext>
+                  </a:extLst>
+                </p:cNvPr>
+                <p:cNvGrpSpPr>
+                  <a:grpSpLocks noGrp="1" noUngrp="1" noRot="1" noMove="1" noResize="1"/>
+                </p:cNvGrpSpPr>
+                <p:nvPr/>
+              </p:nvGrpSpPr>
+              <p:grpSpPr>
+                <a:xfrm>
+                  <a:off x="2720340" y="1824763"/>
+                  <a:ext cx="3337560" cy="399796"/>
+                  <a:chOff x="2720340" y="1855243"/>
+                  <a:chExt cx="3337560" cy="399796"/>
+                </a:xfrm>
+              </p:grpSpPr>
+              <p:sp>
+                <p:nvSpPr>
+                  <p:cNvPr id="54" name="TextBox 53">
+                    <a:extLst>
+                      <a:ext uri="{FF2B5EF4-FFF2-40B4-BE49-F238E27FC236}">
+                        <a16:creationId xmlns:a16="http://schemas.microsoft.com/office/drawing/2014/main" id="{EA81B028-EFCE-85B2-4E1F-0A1E56A8D6F3}"/>
+                      </a:ext>
+                    </a:extLst>
+                  </p:cNvPr>
+                  <p:cNvSpPr txBox="1">
+                    <a:spLocks noGrp="1" noRot="1" noMove="1" noResize="1" noEditPoints="1" noAdjustHandles="1" noChangeArrowheads="1" noChangeShapeType="1"/>
+                  </p:cNvSpPr>
+                  <p:nvPr/>
+                </p:nvSpPr>
+                <p:spPr>
+                  <a:xfrm>
+                    <a:off x="2720340" y="1861847"/>
+                    <a:ext cx="626009" cy="369332"/>
+                  </a:xfrm>
+                  <a:prstGeom prst="rect">
+                    <a:avLst/>
+                  </a:prstGeom>
+                  <a:noFill/>
+                </p:spPr>
+                <p:txBody>
+                  <a:bodyPr wrap="square" rtlCol="0">
+                    <a:spAutoFit/>
+                  </a:bodyPr>
+                  <a:lstStyle/>
+                  <a:p>
+                    <a:pPr algn="ctr"/>
+                    <a:r>
+                      <a:rPr lang="en-US" dirty="0"/>
+                      <a:t>x</a:t>
+                    </a:r>
+                    <a:endParaRPr lang="en-CA" dirty="0"/>
+                  </a:p>
+                </p:txBody>
+              </p:sp>
+              <p:grpSp>
+                <p:nvGrpSpPr>
+                  <p:cNvPr id="88" name="Group 87">
+                    <a:extLst>
+                      <a:ext uri="{FF2B5EF4-FFF2-40B4-BE49-F238E27FC236}">
+                        <a16:creationId xmlns:a16="http://schemas.microsoft.com/office/drawing/2014/main" id="{4C4B189A-1612-E6C8-E6E3-92BB9F93B414}"/>
+                      </a:ext>
+                    </a:extLst>
+                  </p:cNvPr>
+                  <p:cNvGrpSpPr>
+                    <a:grpSpLocks noGrp="1" noUngrp="1" noRot="1" noMove="1" noResize="1"/>
+                  </p:cNvGrpSpPr>
+                  <p:nvPr/>
+                </p:nvGrpSpPr>
+                <p:grpSpPr>
+                  <a:xfrm>
+                    <a:off x="3346349" y="1855243"/>
+                    <a:ext cx="2711551" cy="399796"/>
+                    <a:chOff x="3346349" y="1855243"/>
+                    <a:chExt cx="2711551" cy="399796"/>
+                  </a:xfrm>
+                </p:grpSpPr>
+                <p:grpSp>
+                  <p:nvGrpSpPr>
+                    <p:cNvPr id="66" name="Group 65">
+                      <a:extLst>
+                        <a:ext uri="{FF2B5EF4-FFF2-40B4-BE49-F238E27FC236}">
+                          <a16:creationId xmlns:a16="http://schemas.microsoft.com/office/drawing/2014/main" id="{C96C39AF-92BA-D971-5EEC-CD6ED77CBEED}"/>
+                        </a:ext>
+                      </a:extLst>
+                    </p:cNvPr>
+                    <p:cNvGrpSpPr>
+                      <a:grpSpLocks noGrp="1" noUngrp="1" noRot="1" noMove="1" noResize="1"/>
+                    </p:cNvGrpSpPr>
+                    <p:nvPr/>
+                  </p:nvGrpSpPr>
+                  <p:grpSpPr>
+                    <a:xfrm>
+                      <a:off x="3346349" y="1855243"/>
+                      <a:ext cx="2711551" cy="399796"/>
+                      <a:chOff x="3346349" y="1855243"/>
+                      <a:chExt cx="2711551" cy="399796"/>
+                    </a:xfrm>
+                  </p:grpSpPr>
+                  <p:grpSp>
+                    <p:nvGrpSpPr>
+                      <p:cNvPr id="62" name="Group 61">
+                        <a:extLst>
+                          <a:ext uri="{FF2B5EF4-FFF2-40B4-BE49-F238E27FC236}">
+                            <a16:creationId xmlns:a16="http://schemas.microsoft.com/office/drawing/2014/main" id="{DC567CBB-1B67-BBBB-BA75-0301EE40C2C4}"/>
+                          </a:ext>
+                        </a:extLst>
+                      </p:cNvPr>
+                      <p:cNvGrpSpPr>
+                        <a:grpSpLocks noGrp="1" noUngrp="1" noRot="1" noMove="1" noResize="1"/>
+                      </p:cNvGrpSpPr>
+                      <p:nvPr/>
+                    </p:nvGrpSpPr>
+                    <p:grpSpPr>
+                      <a:xfrm>
+                        <a:off x="3346349" y="1855243"/>
+                        <a:ext cx="1355191" cy="399796"/>
+                        <a:chOff x="3346349" y="1855243"/>
+                        <a:chExt cx="1355191" cy="399796"/>
+                      </a:xfrm>
+                    </p:grpSpPr>
+                    <p:sp>
+                      <p:nvSpPr>
+                        <p:cNvPr id="52" name="Rectangle 51">
+                          <a:extLst>
+                            <a:ext uri="{FF2B5EF4-FFF2-40B4-BE49-F238E27FC236}">
+                              <a16:creationId xmlns:a16="http://schemas.microsoft.com/office/drawing/2014/main" id="{6DDE8478-9C69-4522-7017-BE5CD0822E9C}"/>
+                            </a:ext>
+                          </a:extLst>
+                        </p:cNvPr>
+                        <p:cNvSpPr>
+                          <a:spLocks noGrp="1" noRot="1" noMove="1" noResize="1" noEditPoints="1" noAdjustHandles="1" noChangeArrowheads="1" noChangeShapeType="1"/>
+                        </p:cNvSpPr>
+                        <p:nvPr/>
+                      </p:nvSpPr>
+                      <p:spPr>
+                        <a:xfrm>
+                          <a:off x="3346349" y="1855243"/>
+                          <a:ext cx="677011" cy="399796"/>
+                        </a:xfrm>
+                        <a:prstGeom prst="rect">
+                          <a:avLst/>
+                        </a:prstGeom>
+                        <a:noFill/>
+                        <a:ln>
+                          <a:solidFill>
+                            <a:schemeClr val="tx1"/>
+                          </a:solidFill>
+                        </a:ln>
+                      </p:spPr>
+                      <p:style>
+                        <a:lnRef idx="2">
+                          <a:schemeClr val="accent1">
+                            <a:shade val="15000"/>
+                          </a:schemeClr>
+                        </a:lnRef>
+                        <a:fillRef idx="1">
+                          <a:schemeClr val="accent1"/>
+                        </a:fillRef>
+                        <a:effectRef idx="0">
+                          <a:schemeClr val="accent1"/>
+                        </a:effectRef>
+                        <a:fontRef idx="minor">
+                          <a:schemeClr val="lt1"/>
+                        </a:fontRef>
+                      </p:style>
+                      <p:txBody>
+                        <a:bodyPr rtlCol="0" anchor="ctr"/>
+                        <a:lstStyle/>
+                        <a:p>
+                          <a:pPr algn="ctr"/>
+                          <a:endParaRPr lang="en-CA"/>
+                        </a:p>
+                      </p:txBody>
+                    </p:sp>
+                    <p:sp>
+                      <p:nvSpPr>
+                        <p:cNvPr id="59" name="Rectangle 58">
+                          <a:extLst>
+                            <a:ext uri="{FF2B5EF4-FFF2-40B4-BE49-F238E27FC236}">
+                              <a16:creationId xmlns:a16="http://schemas.microsoft.com/office/drawing/2014/main" id="{B1EAB6AC-6700-ABEB-2C15-4408E6DA81AB}"/>
+                            </a:ext>
+                          </a:extLst>
+                        </p:cNvPr>
+                        <p:cNvSpPr>
+                          <a:spLocks noGrp="1" noRot="1" noMove="1" noResize="1" noEditPoints="1" noAdjustHandles="1" noChangeArrowheads="1" noChangeShapeType="1"/>
+                        </p:cNvSpPr>
+                        <p:nvPr/>
+                      </p:nvSpPr>
+                      <p:spPr>
+                        <a:xfrm>
+                          <a:off x="4024529" y="1855243"/>
+                          <a:ext cx="677011" cy="399796"/>
+                        </a:xfrm>
+                        <a:prstGeom prst="rect">
+                          <a:avLst/>
+                        </a:prstGeom>
+                        <a:noFill/>
+                        <a:ln>
+                          <a:solidFill>
+                            <a:schemeClr val="tx1"/>
+                          </a:solidFill>
+                        </a:ln>
+                      </p:spPr>
+                      <p:style>
+                        <a:lnRef idx="2">
+                          <a:schemeClr val="accent1">
+                            <a:shade val="15000"/>
+                          </a:schemeClr>
+                        </a:lnRef>
+                        <a:fillRef idx="1">
+                          <a:schemeClr val="accent1"/>
+                        </a:fillRef>
+                        <a:effectRef idx="0">
+                          <a:schemeClr val="accent1"/>
+                        </a:effectRef>
+                        <a:fontRef idx="minor">
+                          <a:schemeClr val="lt1"/>
+                        </a:fontRef>
+                      </p:style>
+                      <p:txBody>
+                        <a:bodyPr rtlCol="0" anchor="ctr"/>
+                        <a:lstStyle/>
+                        <a:p>
+                          <a:pPr algn="ctr"/>
+                          <a:endParaRPr lang="en-CA"/>
+                        </a:p>
+                      </p:txBody>
+                    </p:sp>
+                  </p:grpSp>
+                  <p:grpSp>
+                    <p:nvGrpSpPr>
+                      <p:cNvPr id="63" name="Group 62">
+                        <a:extLst>
+                          <a:ext uri="{FF2B5EF4-FFF2-40B4-BE49-F238E27FC236}">
+                            <a16:creationId xmlns:a16="http://schemas.microsoft.com/office/drawing/2014/main" id="{59D693B3-E636-1D39-1EDA-440FE1E87390}"/>
+                          </a:ext>
+                        </a:extLst>
+                      </p:cNvPr>
+                      <p:cNvGrpSpPr>
+                        <a:grpSpLocks noGrp="1" noUngrp="1" noRot="1" noMove="1" noResize="1"/>
+                      </p:cNvGrpSpPr>
+                      <p:nvPr/>
+                    </p:nvGrpSpPr>
+                    <p:grpSpPr>
+                      <a:xfrm>
+                        <a:off x="4702709" y="1855243"/>
+                        <a:ext cx="1355191" cy="399796"/>
+                        <a:chOff x="3346349" y="1855243"/>
+                        <a:chExt cx="1355191" cy="399796"/>
+                      </a:xfrm>
+                    </p:grpSpPr>
+                    <p:sp>
+                      <p:nvSpPr>
+                        <p:cNvPr id="64" name="Rectangle 63">
+                          <a:extLst>
+                            <a:ext uri="{FF2B5EF4-FFF2-40B4-BE49-F238E27FC236}">
+                              <a16:creationId xmlns:a16="http://schemas.microsoft.com/office/drawing/2014/main" id="{E1EF94C3-F7C2-A46C-D6D5-C1B4C63357BA}"/>
+                            </a:ext>
+                          </a:extLst>
+                        </p:cNvPr>
+                        <p:cNvSpPr>
+                          <a:spLocks noGrp="1" noRot="1" noMove="1" noResize="1" noEditPoints="1" noAdjustHandles="1" noChangeArrowheads="1" noChangeShapeType="1"/>
+                        </p:cNvSpPr>
+                        <p:nvPr/>
+                      </p:nvSpPr>
+                      <p:spPr>
+                        <a:xfrm>
+                          <a:off x="3346349" y="1855243"/>
+                          <a:ext cx="677011" cy="399796"/>
+                        </a:xfrm>
+                        <a:prstGeom prst="rect">
+                          <a:avLst/>
+                        </a:prstGeom>
+                        <a:noFill/>
+                        <a:ln>
+                          <a:solidFill>
+                            <a:schemeClr val="tx1"/>
+                          </a:solidFill>
+                        </a:ln>
+                      </p:spPr>
+                      <p:style>
+                        <a:lnRef idx="2">
+                          <a:schemeClr val="accent1">
+                            <a:shade val="15000"/>
+                          </a:schemeClr>
+                        </a:lnRef>
+                        <a:fillRef idx="1">
+                          <a:schemeClr val="accent1"/>
+                        </a:fillRef>
+                        <a:effectRef idx="0">
+                          <a:schemeClr val="accent1"/>
+                        </a:effectRef>
+                        <a:fontRef idx="minor">
+                          <a:schemeClr val="lt1"/>
+                        </a:fontRef>
+                      </p:style>
+                      <p:txBody>
+                        <a:bodyPr rtlCol="0" anchor="ctr"/>
+                        <a:lstStyle/>
+                        <a:p>
+                          <a:pPr algn="ctr"/>
+                          <a:endParaRPr lang="en-CA"/>
+                        </a:p>
+                      </p:txBody>
+                    </p:sp>
+                    <p:sp>
+                      <p:nvSpPr>
+                        <p:cNvPr id="65" name="Rectangle 64">
+                          <a:extLst>
+                            <a:ext uri="{FF2B5EF4-FFF2-40B4-BE49-F238E27FC236}">
+                              <a16:creationId xmlns:a16="http://schemas.microsoft.com/office/drawing/2014/main" id="{1BE12BC7-95FD-DECD-8324-26DFDF580A46}"/>
+                            </a:ext>
+                          </a:extLst>
+                        </p:cNvPr>
+                        <p:cNvSpPr>
+                          <a:spLocks noGrp="1" noRot="1" noMove="1" noResize="1" noEditPoints="1" noAdjustHandles="1" noChangeArrowheads="1" noChangeShapeType="1"/>
+                        </p:cNvSpPr>
+                        <p:nvPr/>
+                      </p:nvSpPr>
+                      <p:spPr>
+                        <a:xfrm>
+                          <a:off x="4024529" y="1855243"/>
+                          <a:ext cx="677011" cy="399796"/>
+                        </a:xfrm>
+                        <a:prstGeom prst="rect">
+                          <a:avLst/>
+                        </a:prstGeom>
+                        <a:noFill/>
+                        <a:ln>
+                          <a:solidFill>
+                            <a:schemeClr val="tx1"/>
+                          </a:solidFill>
+                        </a:ln>
+                      </p:spPr>
+                      <p:style>
+                        <a:lnRef idx="2">
+                          <a:schemeClr val="accent1">
+                            <a:shade val="15000"/>
+                          </a:schemeClr>
+                        </a:lnRef>
+                        <a:fillRef idx="1">
+                          <a:schemeClr val="accent1"/>
+                        </a:fillRef>
+                        <a:effectRef idx="0">
+                          <a:schemeClr val="accent1"/>
+                        </a:effectRef>
+                        <a:fontRef idx="minor">
+                          <a:schemeClr val="lt1"/>
+                        </a:fontRef>
+                      </p:style>
+                      <p:txBody>
+                        <a:bodyPr rtlCol="0" anchor="ctr"/>
+                        <a:lstStyle/>
+                        <a:p>
+                          <a:pPr algn="ctr"/>
+                          <a:endParaRPr lang="en-CA"/>
+                        </a:p>
+                      </p:txBody>
+                    </p:sp>
+                  </p:grpSp>
+                </p:grpSp>
+                <p:grpSp>
+                  <p:nvGrpSpPr>
+                    <p:cNvPr id="79" name="Group 78">
+                      <a:extLst>
+                        <a:ext uri="{FF2B5EF4-FFF2-40B4-BE49-F238E27FC236}">
+                          <a16:creationId xmlns:a16="http://schemas.microsoft.com/office/drawing/2014/main" id="{669565BC-47CE-12FF-74FC-6D02FD43E72F}"/>
+                        </a:ext>
+                      </a:extLst>
+                    </p:cNvPr>
+                    <p:cNvGrpSpPr>
+                      <a:grpSpLocks noGrp="1" noUngrp="1" noRot="1" noMove="1" noResize="1"/>
+                    </p:cNvGrpSpPr>
+                    <p:nvPr/>
+                  </p:nvGrpSpPr>
+                  <p:grpSpPr>
+                    <a:xfrm>
+                      <a:off x="3352800" y="1866900"/>
+                      <a:ext cx="2644140" cy="382566"/>
+                      <a:chOff x="3352800" y="1866900"/>
+                      <a:chExt cx="2644140" cy="382566"/>
+                    </a:xfrm>
+                  </p:grpSpPr>
+                  <p:grpSp>
+                    <p:nvGrpSpPr>
+                      <p:cNvPr id="75" name="Group 74">
+                        <a:extLst>
+                          <a:ext uri="{FF2B5EF4-FFF2-40B4-BE49-F238E27FC236}">
+                            <a16:creationId xmlns:a16="http://schemas.microsoft.com/office/drawing/2014/main" id="{3EE208CC-441B-744B-C420-3604F52B7670}"/>
+                          </a:ext>
+                        </a:extLst>
+                      </p:cNvPr>
+                      <p:cNvGrpSpPr>
+                        <a:grpSpLocks noGrp="1" noUngrp="1" noRot="1" noMove="1" noResize="1"/>
+                      </p:cNvGrpSpPr>
+                      <p:nvPr/>
+                    </p:nvGrpSpPr>
+                    <p:grpSpPr>
+                      <a:xfrm>
+                        <a:off x="3352800" y="1866900"/>
+                        <a:ext cx="1333500" cy="367326"/>
+                        <a:chOff x="3352800" y="1866900"/>
+                        <a:chExt cx="1333500" cy="367326"/>
+                      </a:xfrm>
+                    </p:grpSpPr>
+                    <p:sp>
+                      <p:nvSpPr>
+                        <p:cNvPr id="56" name="TextBox 55">
+                          <a:extLst>
+                            <a:ext uri="{FF2B5EF4-FFF2-40B4-BE49-F238E27FC236}">
+                              <a16:creationId xmlns:a16="http://schemas.microsoft.com/office/drawing/2014/main" id="{D8CAEC3B-F62A-D71B-5265-C39697F8DB94}"/>
+                            </a:ext>
+                          </a:extLst>
+                        </p:cNvPr>
+                        <p:cNvSpPr txBox="1">
+                          <a:spLocks noGrp="1" noRot="1" noMove="1" noResize="1" noEditPoints="1" noAdjustHandles="1" noChangeArrowheads="1" noChangeShapeType="1"/>
+                        </p:cNvSpPr>
+                        <p:nvPr/>
+                      </p:nvSpPr>
+                      <p:spPr>
+                        <a:xfrm>
+                          <a:off x="3352800" y="1866900"/>
+                          <a:ext cx="678180" cy="367326"/>
+                        </a:xfrm>
+                        <a:prstGeom prst="rect">
+                          <a:avLst/>
+                        </a:prstGeom>
+                        <a:noFill/>
+                      </p:spPr>
+                      <p:txBody>
+                        <a:bodyPr wrap="square" rtlCol="0">
+                          <a:spAutoFit/>
+                        </a:bodyPr>
+                        <a:lstStyle/>
+                        <a:p>
+                          <a:pPr algn="ctr"/>
+                          <a:r>
+                            <a:rPr lang="en-US" dirty="0"/>
+                            <a:t>?</a:t>
+                          </a:r>
+                          <a:endParaRPr lang="en-CA" dirty="0"/>
+                        </a:p>
+                      </p:txBody>
+                    </p:sp>
+                    <p:sp>
+                      <p:nvSpPr>
+                        <p:cNvPr id="74" name="TextBox 73">
+                          <a:extLst>
+                            <a:ext uri="{FF2B5EF4-FFF2-40B4-BE49-F238E27FC236}">
+                              <a16:creationId xmlns:a16="http://schemas.microsoft.com/office/drawing/2014/main" id="{D96810D0-B22E-D09B-308D-AE920BE25A3B}"/>
+                            </a:ext>
+                          </a:extLst>
+                        </p:cNvPr>
+                        <p:cNvSpPr txBox="1">
+                          <a:spLocks noGrp="1" noRot="1" noMove="1" noResize="1" noEditPoints="1" noAdjustHandles="1" noChangeArrowheads="1" noChangeShapeType="1"/>
+                        </p:cNvSpPr>
+                        <p:nvPr/>
+                      </p:nvSpPr>
+                      <p:spPr>
+                        <a:xfrm>
+                          <a:off x="4008120" y="1866900"/>
+                          <a:ext cx="678180" cy="367326"/>
+                        </a:xfrm>
+                        <a:prstGeom prst="rect">
+                          <a:avLst/>
+                        </a:prstGeom>
+                        <a:noFill/>
+                      </p:spPr>
+                      <p:txBody>
+                        <a:bodyPr wrap="square" rtlCol="0">
+                          <a:spAutoFit/>
+                        </a:bodyPr>
+                        <a:lstStyle/>
+                        <a:p>
+                          <a:pPr algn="ctr"/>
+                          <a:r>
+                            <a:rPr lang="en-US" dirty="0"/>
+                            <a:t>?</a:t>
+                          </a:r>
+                          <a:endParaRPr lang="en-CA" dirty="0"/>
+                        </a:p>
+                      </p:txBody>
+                    </p:sp>
+                  </p:grpSp>
+                  <p:grpSp>
+                    <p:nvGrpSpPr>
+                      <p:cNvPr id="76" name="Group 75">
+                        <a:extLst>
+                          <a:ext uri="{FF2B5EF4-FFF2-40B4-BE49-F238E27FC236}">
+                            <a16:creationId xmlns:a16="http://schemas.microsoft.com/office/drawing/2014/main" id="{8B549F91-E211-799E-D072-F4E7E6EBB3B7}"/>
+                          </a:ext>
+                        </a:extLst>
+                      </p:cNvPr>
+                      <p:cNvGrpSpPr>
+                        <a:grpSpLocks noGrp="1" noUngrp="1" noRot="1" noMove="1" noResize="1"/>
+                      </p:cNvGrpSpPr>
+                      <p:nvPr/>
+                    </p:nvGrpSpPr>
+                    <p:grpSpPr>
+                      <a:xfrm>
+                        <a:off x="4663440" y="1882140"/>
+                        <a:ext cx="1333500" cy="367326"/>
+                        <a:chOff x="3352800" y="1866900"/>
+                        <a:chExt cx="1333500" cy="367326"/>
+                      </a:xfrm>
+                    </p:grpSpPr>
+                    <p:sp>
+                      <p:nvSpPr>
+                        <p:cNvPr id="77" name="TextBox 76">
+                          <a:extLst>
+                            <a:ext uri="{FF2B5EF4-FFF2-40B4-BE49-F238E27FC236}">
+                              <a16:creationId xmlns:a16="http://schemas.microsoft.com/office/drawing/2014/main" id="{399EF06D-3618-8291-ED7E-9B8FFFED0E64}"/>
+                            </a:ext>
+                          </a:extLst>
+                        </p:cNvPr>
+                        <p:cNvSpPr txBox="1">
+                          <a:spLocks noGrp="1" noRot="1" noMove="1" noResize="1" noEditPoints="1" noAdjustHandles="1" noChangeArrowheads="1" noChangeShapeType="1"/>
+                        </p:cNvSpPr>
+                        <p:nvPr/>
+                      </p:nvSpPr>
+                      <p:spPr>
+                        <a:xfrm>
+                          <a:off x="3352800" y="1866900"/>
+                          <a:ext cx="678180" cy="367326"/>
+                        </a:xfrm>
+                        <a:prstGeom prst="rect">
+                          <a:avLst/>
+                        </a:prstGeom>
+                        <a:noFill/>
+                      </p:spPr>
+                      <p:txBody>
+                        <a:bodyPr wrap="square" rtlCol="0">
+                          <a:spAutoFit/>
+                        </a:bodyPr>
+                        <a:lstStyle/>
+                        <a:p>
+                          <a:pPr algn="ctr"/>
+                          <a:r>
+                            <a:rPr lang="en-US" dirty="0"/>
+                            <a:t>?</a:t>
+                          </a:r>
+                          <a:endParaRPr lang="en-CA" dirty="0"/>
+                        </a:p>
+                      </p:txBody>
+                    </p:sp>
+                    <p:sp>
+                      <p:nvSpPr>
+                        <p:cNvPr id="78" name="TextBox 77">
+                          <a:extLst>
+                            <a:ext uri="{FF2B5EF4-FFF2-40B4-BE49-F238E27FC236}">
+                              <a16:creationId xmlns:a16="http://schemas.microsoft.com/office/drawing/2014/main" id="{26F46947-EBDA-7CA1-1AF1-5518A6FC481E}"/>
+                            </a:ext>
+                          </a:extLst>
+                        </p:cNvPr>
+                        <p:cNvSpPr txBox="1">
+                          <a:spLocks noGrp="1" noRot="1" noMove="1" noResize="1" noEditPoints="1" noAdjustHandles="1" noChangeArrowheads="1" noChangeShapeType="1"/>
+                        </p:cNvSpPr>
+                        <p:nvPr/>
+                      </p:nvSpPr>
+                      <p:spPr>
+                        <a:xfrm>
+                          <a:off x="4008120" y="1866900"/>
+                          <a:ext cx="678180" cy="367326"/>
+                        </a:xfrm>
+                        <a:prstGeom prst="rect">
+                          <a:avLst/>
+                        </a:prstGeom>
+                        <a:noFill/>
+                      </p:spPr>
+                      <p:txBody>
+                        <a:bodyPr wrap="square" rtlCol="0">
+                          <a:spAutoFit/>
+                        </a:bodyPr>
+                        <a:lstStyle/>
+                        <a:p>
+                          <a:pPr algn="ctr"/>
+                          <a:r>
+                            <a:rPr lang="en-US" dirty="0"/>
+                            <a:t>?</a:t>
+                          </a:r>
+                          <a:endParaRPr lang="en-CA" dirty="0"/>
+                        </a:p>
+                      </p:txBody>
+                    </p:sp>
+                  </p:grpSp>
+                </p:grpSp>
+              </p:grpSp>
+            </p:grpSp>
+            <p:grpSp>
+              <p:nvGrpSpPr>
+                <p:cNvPr id="105" name="Group 104">
+                  <a:extLst>
+                    <a:ext uri="{FF2B5EF4-FFF2-40B4-BE49-F238E27FC236}">
+                      <a16:creationId xmlns:a16="http://schemas.microsoft.com/office/drawing/2014/main" id="{D7350D51-4870-8674-FFE7-9009A128199F}"/>
+                    </a:ext>
+                  </a:extLst>
+                </p:cNvPr>
+                <p:cNvGrpSpPr>
+                  <a:grpSpLocks noGrp="1" noUngrp="1" noRot="1" noMove="1" noResize="1"/>
+                </p:cNvGrpSpPr>
+                <p:nvPr/>
+              </p:nvGrpSpPr>
+              <p:grpSpPr>
+                <a:xfrm>
+                  <a:off x="2727960" y="2365783"/>
+                  <a:ext cx="3337560" cy="399796"/>
+                  <a:chOff x="2727960" y="2365783"/>
+                  <a:chExt cx="3337560" cy="399796"/>
+                </a:xfrm>
+              </p:grpSpPr>
+              <p:grpSp>
+                <p:nvGrpSpPr>
+                  <p:cNvPr id="89" name="Group 88">
+                    <a:extLst>
+                      <a:ext uri="{FF2B5EF4-FFF2-40B4-BE49-F238E27FC236}">
+                        <a16:creationId xmlns:a16="http://schemas.microsoft.com/office/drawing/2014/main" id="{4DC34644-E751-47E9-238F-180C2BCDD3B8}"/>
+                      </a:ext>
+                    </a:extLst>
+                  </p:cNvPr>
+                  <p:cNvGrpSpPr>
+                    <a:grpSpLocks noGrp="1" noUngrp="1" noRot="1" noMove="1" noResize="1"/>
+                  </p:cNvGrpSpPr>
+                  <p:nvPr/>
+                </p:nvGrpSpPr>
+                <p:grpSpPr>
+                  <a:xfrm>
+                    <a:off x="3353969" y="2365783"/>
+                    <a:ext cx="2711551" cy="399796"/>
+                    <a:chOff x="3346349" y="1855243"/>
+                    <a:chExt cx="2711551" cy="399796"/>
+                  </a:xfrm>
+                </p:grpSpPr>
+                <p:grpSp>
+                  <p:nvGrpSpPr>
+                    <p:cNvPr id="90" name="Group 89">
+                      <a:extLst>
+                        <a:ext uri="{FF2B5EF4-FFF2-40B4-BE49-F238E27FC236}">
+                          <a16:creationId xmlns:a16="http://schemas.microsoft.com/office/drawing/2014/main" id="{6C9759C0-6573-14DF-E00F-649DB7C1DF9C}"/>
+                        </a:ext>
+                      </a:extLst>
+                    </p:cNvPr>
+                    <p:cNvGrpSpPr>
+                      <a:grpSpLocks noGrp="1" noUngrp="1" noRot="1" noMove="1" noResize="1"/>
+                    </p:cNvGrpSpPr>
+                    <p:nvPr/>
+                  </p:nvGrpSpPr>
+                  <p:grpSpPr>
+                    <a:xfrm>
+                      <a:off x="3346349" y="1855243"/>
+                      <a:ext cx="2711551" cy="399796"/>
+                      <a:chOff x="3346349" y="1855243"/>
+                      <a:chExt cx="2711551" cy="399796"/>
+                    </a:xfrm>
+                  </p:grpSpPr>
+                  <p:grpSp>
+                    <p:nvGrpSpPr>
+                      <p:cNvPr id="98" name="Group 97">
+                        <a:extLst>
+                          <a:ext uri="{FF2B5EF4-FFF2-40B4-BE49-F238E27FC236}">
+                            <a16:creationId xmlns:a16="http://schemas.microsoft.com/office/drawing/2014/main" id="{6A821F28-FAD8-4C4B-7D0D-562850E4A9AF}"/>
+                          </a:ext>
+                        </a:extLst>
+                      </p:cNvPr>
+                      <p:cNvGrpSpPr>
+                        <a:grpSpLocks noGrp="1" noUngrp="1" noRot="1" noMove="1" noResize="1"/>
+                      </p:cNvGrpSpPr>
+                      <p:nvPr/>
+                    </p:nvGrpSpPr>
+                    <p:grpSpPr>
+                      <a:xfrm>
+                        <a:off x="3346349" y="1855243"/>
+                        <a:ext cx="1355191" cy="399796"/>
+                        <a:chOff x="3346349" y="1855243"/>
+                        <a:chExt cx="1355191" cy="399796"/>
+                      </a:xfrm>
+                    </p:grpSpPr>
+                    <p:sp>
+                      <p:nvSpPr>
+                        <p:cNvPr id="102" name="Rectangle 101">
+                          <a:extLst>
+                            <a:ext uri="{FF2B5EF4-FFF2-40B4-BE49-F238E27FC236}">
+                              <a16:creationId xmlns:a16="http://schemas.microsoft.com/office/drawing/2014/main" id="{04D685F3-8D3D-DBBE-2A66-C62FAE8680CF}"/>
+                            </a:ext>
+                          </a:extLst>
+                        </p:cNvPr>
+                        <p:cNvSpPr>
+                          <a:spLocks noGrp="1" noRot="1" noMove="1" noResize="1" noEditPoints="1" noAdjustHandles="1" noChangeArrowheads="1" noChangeShapeType="1"/>
+                        </p:cNvSpPr>
+                        <p:nvPr/>
+                      </p:nvSpPr>
+                      <p:spPr>
+                        <a:xfrm>
+                          <a:off x="3346349" y="1855243"/>
+                          <a:ext cx="677011" cy="399796"/>
+                        </a:xfrm>
+                        <a:prstGeom prst="rect">
+                          <a:avLst/>
+                        </a:prstGeom>
+                        <a:noFill/>
+                        <a:ln>
+                          <a:solidFill>
+                            <a:schemeClr val="tx1"/>
+                          </a:solidFill>
+                        </a:ln>
+                      </p:spPr>
+                      <p:style>
+                        <a:lnRef idx="2">
+                          <a:schemeClr val="accent1">
+                            <a:shade val="15000"/>
+                          </a:schemeClr>
+                        </a:lnRef>
+                        <a:fillRef idx="1">
+                          <a:schemeClr val="accent1"/>
+                        </a:fillRef>
+                        <a:effectRef idx="0">
+                          <a:schemeClr val="accent1"/>
+                        </a:effectRef>
+                        <a:fontRef idx="minor">
+                          <a:schemeClr val="lt1"/>
+                        </a:fontRef>
+                      </p:style>
+                      <p:txBody>
+                        <a:bodyPr rtlCol="0" anchor="ctr"/>
+                        <a:lstStyle/>
+                        <a:p>
+                          <a:pPr algn="ctr"/>
+                          <a:endParaRPr lang="en-CA"/>
+                        </a:p>
+                      </p:txBody>
+                    </p:sp>
+                    <p:sp>
+                      <p:nvSpPr>
+                        <p:cNvPr id="103" name="Rectangle 102">
+                          <a:extLst>
+                            <a:ext uri="{FF2B5EF4-FFF2-40B4-BE49-F238E27FC236}">
+                              <a16:creationId xmlns:a16="http://schemas.microsoft.com/office/drawing/2014/main" id="{CF23AC2F-6B9A-1456-6C53-1D5D915246BD}"/>
+                            </a:ext>
+                          </a:extLst>
+                        </p:cNvPr>
+                        <p:cNvSpPr>
+                          <a:spLocks noGrp="1" noRot="1" noMove="1" noResize="1" noEditPoints="1" noAdjustHandles="1" noChangeArrowheads="1" noChangeShapeType="1"/>
+                        </p:cNvSpPr>
+                        <p:nvPr/>
+                      </p:nvSpPr>
+                      <p:spPr>
+                        <a:xfrm>
+                          <a:off x="4024529" y="1855243"/>
+                          <a:ext cx="677011" cy="399796"/>
+                        </a:xfrm>
+                        <a:prstGeom prst="rect">
+                          <a:avLst/>
+                        </a:prstGeom>
+                        <a:noFill/>
+                        <a:ln>
+                          <a:solidFill>
+                            <a:schemeClr val="tx1"/>
+                          </a:solidFill>
+                        </a:ln>
+                      </p:spPr>
+                      <p:style>
+                        <a:lnRef idx="2">
+                          <a:schemeClr val="accent1">
+                            <a:shade val="15000"/>
+                          </a:schemeClr>
+                        </a:lnRef>
+                        <a:fillRef idx="1">
+                          <a:schemeClr val="accent1"/>
+                        </a:fillRef>
+                        <a:effectRef idx="0">
+                          <a:schemeClr val="accent1"/>
+                        </a:effectRef>
+                        <a:fontRef idx="minor">
+                          <a:schemeClr val="lt1"/>
+                        </a:fontRef>
+                      </p:style>
+                      <p:txBody>
+                        <a:bodyPr rtlCol="0" anchor="ctr"/>
+                        <a:lstStyle/>
+                        <a:p>
+                          <a:pPr algn="ctr"/>
+                          <a:endParaRPr lang="en-CA"/>
+                        </a:p>
+                      </p:txBody>
+                    </p:sp>
+                  </p:grpSp>
+                  <p:grpSp>
+                    <p:nvGrpSpPr>
+                      <p:cNvPr id="99" name="Group 98">
+                        <a:extLst>
+                          <a:ext uri="{FF2B5EF4-FFF2-40B4-BE49-F238E27FC236}">
+                            <a16:creationId xmlns:a16="http://schemas.microsoft.com/office/drawing/2014/main" id="{65AEACC5-2BDA-B820-8CAA-23EF35A1D8D6}"/>
+                          </a:ext>
+                        </a:extLst>
+                      </p:cNvPr>
+                      <p:cNvGrpSpPr>
+                        <a:grpSpLocks noGrp="1" noUngrp="1" noRot="1" noMove="1" noResize="1"/>
+                      </p:cNvGrpSpPr>
+                      <p:nvPr/>
+                    </p:nvGrpSpPr>
+                    <p:grpSpPr>
+                      <a:xfrm>
+                        <a:off x="4702709" y="1855243"/>
+                        <a:ext cx="1355191" cy="399796"/>
+                        <a:chOff x="3346349" y="1855243"/>
+                        <a:chExt cx="1355191" cy="399796"/>
+                      </a:xfrm>
+                    </p:grpSpPr>
+                    <p:sp>
+                      <p:nvSpPr>
+                        <p:cNvPr id="100" name="Rectangle 99">
+                          <a:extLst>
+                            <a:ext uri="{FF2B5EF4-FFF2-40B4-BE49-F238E27FC236}">
+                              <a16:creationId xmlns:a16="http://schemas.microsoft.com/office/drawing/2014/main" id="{C3FCE7E2-7B3B-C6BA-60E1-A1AB9C404713}"/>
+                            </a:ext>
+                          </a:extLst>
+                        </p:cNvPr>
+                        <p:cNvSpPr>
+                          <a:spLocks noGrp="1" noRot="1" noMove="1" noResize="1" noEditPoints="1" noAdjustHandles="1" noChangeArrowheads="1" noChangeShapeType="1"/>
+                        </p:cNvSpPr>
+                        <p:nvPr/>
+                      </p:nvSpPr>
+                      <p:spPr>
+                        <a:xfrm>
+                          <a:off x="3346349" y="1855243"/>
+                          <a:ext cx="677011" cy="399796"/>
+                        </a:xfrm>
+                        <a:prstGeom prst="rect">
+                          <a:avLst/>
+                        </a:prstGeom>
+                        <a:noFill/>
+                        <a:ln>
+                          <a:solidFill>
+                            <a:schemeClr val="tx1"/>
+                          </a:solidFill>
+                        </a:ln>
+                      </p:spPr>
+                      <p:style>
+                        <a:lnRef idx="2">
+                          <a:schemeClr val="accent1">
+                            <a:shade val="15000"/>
+                          </a:schemeClr>
+                        </a:lnRef>
+                        <a:fillRef idx="1">
+                          <a:schemeClr val="accent1"/>
+                        </a:fillRef>
+                        <a:effectRef idx="0">
+                          <a:schemeClr val="accent1"/>
+                        </a:effectRef>
+                        <a:fontRef idx="minor">
+                          <a:schemeClr val="lt1"/>
+                        </a:fontRef>
+                      </p:style>
+                      <p:txBody>
+                        <a:bodyPr rtlCol="0" anchor="ctr"/>
+                        <a:lstStyle/>
+                        <a:p>
+                          <a:pPr algn="ctr"/>
+                          <a:endParaRPr lang="en-CA"/>
+                        </a:p>
+                      </p:txBody>
+                    </p:sp>
+                    <p:sp>
+                      <p:nvSpPr>
+                        <p:cNvPr id="101" name="Rectangle 100">
+                          <a:extLst>
+                            <a:ext uri="{FF2B5EF4-FFF2-40B4-BE49-F238E27FC236}">
+                              <a16:creationId xmlns:a16="http://schemas.microsoft.com/office/drawing/2014/main" id="{E13F262D-46A6-2A12-3F79-E075FD0EB4D6}"/>
+                            </a:ext>
+                          </a:extLst>
+                        </p:cNvPr>
+                        <p:cNvSpPr>
+                          <a:spLocks noGrp="1" noRot="1" noMove="1" noResize="1" noEditPoints="1" noAdjustHandles="1" noChangeArrowheads="1" noChangeShapeType="1"/>
+                        </p:cNvSpPr>
+                        <p:nvPr/>
+                      </p:nvSpPr>
+                      <p:spPr>
+                        <a:xfrm>
+                          <a:off x="4024529" y="1855243"/>
+                          <a:ext cx="677011" cy="399796"/>
+                        </a:xfrm>
+                        <a:prstGeom prst="rect">
+                          <a:avLst/>
+                        </a:prstGeom>
+                        <a:noFill/>
+                        <a:ln>
+                          <a:solidFill>
+                            <a:schemeClr val="tx1"/>
+                          </a:solidFill>
+                        </a:ln>
+                      </p:spPr>
+                      <p:style>
+                        <a:lnRef idx="2">
+                          <a:schemeClr val="accent1">
+                            <a:shade val="15000"/>
+                          </a:schemeClr>
+                        </a:lnRef>
+                        <a:fillRef idx="1">
+                          <a:schemeClr val="accent1"/>
+                        </a:fillRef>
+                        <a:effectRef idx="0">
+                          <a:schemeClr val="accent1"/>
+                        </a:effectRef>
+                        <a:fontRef idx="minor">
+                          <a:schemeClr val="lt1"/>
+                        </a:fontRef>
+                      </p:style>
+                      <p:txBody>
+                        <a:bodyPr rtlCol="0" anchor="ctr"/>
+                        <a:lstStyle/>
+                        <a:p>
+                          <a:pPr algn="ctr"/>
+                          <a:endParaRPr lang="en-CA"/>
+                        </a:p>
+                      </p:txBody>
+                    </p:sp>
+                  </p:grpSp>
+                </p:grpSp>
+                <p:grpSp>
+                  <p:nvGrpSpPr>
+                    <p:cNvPr id="91" name="Group 90">
+                      <a:extLst>
+                        <a:ext uri="{FF2B5EF4-FFF2-40B4-BE49-F238E27FC236}">
+                          <a16:creationId xmlns:a16="http://schemas.microsoft.com/office/drawing/2014/main" id="{DD4AC55F-43BD-0D4B-1087-E011195567AA}"/>
+                        </a:ext>
+                      </a:extLst>
+                    </p:cNvPr>
+                    <p:cNvGrpSpPr>
+                      <a:grpSpLocks noGrp="1" noUngrp="1" noRot="1" noMove="1" noResize="1"/>
+                    </p:cNvGrpSpPr>
+                    <p:nvPr/>
+                  </p:nvGrpSpPr>
+                  <p:grpSpPr>
+                    <a:xfrm>
+                      <a:off x="3352800" y="1866900"/>
+                      <a:ext cx="2644140" cy="382566"/>
+                      <a:chOff x="3352800" y="1866900"/>
+                      <a:chExt cx="2644140" cy="382566"/>
+                    </a:xfrm>
+                  </p:grpSpPr>
+                  <p:grpSp>
+                    <p:nvGrpSpPr>
+                      <p:cNvPr id="92" name="Group 91">
+                        <a:extLst>
+                          <a:ext uri="{FF2B5EF4-FFF2-40B4-BE49-F238E27FC236}">
+                            <a16:creationId xmlns:a16="http://schemas.microsoft.com/office/drawing/2014/main" id="{84533336-6D15-E138-FBE6-69975F6C0B08}"/>
+                          </a:ext>
+                        </a:extLst>
+                      </p:cNvPr>
+                      <p:cNvGrpSpPr>
+                        <a:grpSpLocks noGrp="1" noUngrp="1" noRot="1" noMove="1" noResize="1"/>
+                      </p:cNvGrpSpPr>
+                      <p:nvPr/>
+                    </p:nvGrpSpPr>
+                    <p:grpSpPr>
+                      <a:xfrm>
+                        <a:off x="3352800" y="1866900"/>
+                        <a:ext cx="1333500" cy="367326"/>
+                        <a:chOff x="3352800" y="1866900"/>
+                        <a:chExt cx="1333500" cy="367326"/>
+                      </a:xfrm>
+                    </p:grpSpPr>
+                    <p:sp>
+                      <p:nvSpPr>
+                        <p:cNvPr id="96" name="TextBox 95">
+                          <a:extLst>
+                            <a:ext uri="{FF2B5EF4-FFF2-40B4-BE49-F238E27FC236}">
+                              <a16:creationId xmlns:a16="http://schemas.microsoft.com/office/drawing/2014/main" id="{CB8F18E3-FF9B-16E7-5F5E-24E9C2AECFBA}"/>
+                            </a:ext>
+                          </a:extLst>
+                        </p:cNvPr>
+                        <p:cNvSpPr txBox="1">
+                          <a:spLocks noGrp="1" noRot="1" noMove="1" noResize="1" noEditPoints="1" noAdjustHandles="1" noChangeArrowheads="1" noChangeShapeType="1"/>
+                        </p:cNvSpPr>
+                        <p:nvPr/>
+                      </p:nvSpPr>
+                      <p:spPr>
+                        <a:xfrm>
+                          <a:off x="3352800" y="1866900"/>
+                          <a:ext cx="678180" cy="367326"/>
+                        </a:xfrm>
+                        <a:prstGeom prst="rect">
+                          <a:avLst/>
+                        </a:prstGeom>
+                        <a:noFill/>
+                      </p:spPr>
+                      <p:txBody>
+                        <a:bodyPr wrap="square" rtlCol="0">
+                          <a:spAutoFit/>
+                        </a:bodyPr>
+                        <a:lstStyle/>
+                        <a:p>
+                          <a:pPr algn="ctr"/>
+                          <a:r>
+                            <a:rPr lang="en-US" dirty="0"/>
+                            <a:t>2.3</a:t>
+                          </a:r>
+                          <a:endParaRPr lang="en-CA" dirty="0"/>
+                        </a:p>
+                      </p:txBody>
+                    </p:sp>
+                    <p:sp>
+                      <p:nvSpPr>
+                        <p:cNvPr id="97" name="TextBox 96">
+                          <a:extLst>
+                            <a:ext uri="{FF2B5EF4-FFF2-40B4-BE49-F238E27FC236}">
+                              <a16:creationId xmlns:a16="http://schemas.microsoft.com/office/drawing/2014/main" id="{F2CE7F15-C0F9-1EC5-B0CD-F03C12B58979}"/>
+                            </a:ext>
+                          </a:extLst>
+                        </p:cNvPr>
+                        <p:cNvSpPr txBox="1">
+                          <a:spLocks noGrp="1" noRot="1" noMove="1" noResize="1" noEditPoints="1" noAdjustHandles="1" noChangeArrowheads="1" noChangeShapeType="1"/>
+                        </p:cNvSpPr>
+                        <p:nvPr/>
+                      </p:nvSpPr>
+                      <p:spPr>
+                        <a:xfrm>
+                          <a:off x="4008120" y="1866900"/>
+                          <a:ext cx="678180" cy="367326"/>
+                        </a:xfrm>
+                        <a:prstGeom prst="rect">
+                          <a:avLst/>
+                        </a:prstGeom>
+                        <a:noFill/>
+                      </p:spPr>
+                      <p:txBody>
+                        <a:bodyPr wrap="square" rtlCol="0">
+                          <a:spAutoFit/>
+                        </a:bodyPr>
+                        <a:lstStyle/>
+                        <a:p>
+                          <a:pPr algn="ctr"/>
+                          <a:r>
+                            <a:rPr lang="en-US" dirty="0"/>
+                            <a:t>1.2</a:t>
+                          </a:r>
+                          <a:endParaRPr lang="en-CA" dirty="0"/>
+                        </a:p>
+                      </p:txBody>
+                    </p:sp>
+                  </p:grpSp>
+                  <p:grpSp>
+                    <p:nvGrpSpPr>
+                      <p:cNvPr id="93" name="Group 92">
+                        <a:extLst>
+                          <a:ext uri="{FF2B5EF4-FFF2-40B4-BE49-F238E27FC236}">
+                            <a16:creationId xmlns:a16="http://schemas.microsoft.com/office/drawing/2014/main" id="{888972DB-0DCA-A013-3401-03C5D2056C57}"/>
+                          </a:ext>
+                        </a:extLst>
+                      </p:cNvPr>
+                      <p:cNvGrpSpPr>
+                        <a:grpSpLocks noGrp="1" noUngrp="1" noRot="1" noMove="1" noResize="1"/>
+                      </p:cNvGrpSpPr>
+                      <p:nvPr/>
+                    </p:nvGrpSpPr>
+                    <p:grpSpPr>
+                      <a:xfrm>
+                        <a:off x="4663440" y="1882140"/>
+                        <a:ext cx="1333500" cy="367326"/>
+                        <a:chOff x="3352800" y="1866900"/>
+                        <a:chExt cx="1333500" cy="367326"/>
+                      </a:xfrm>
+                    </p:grpSpPr>
+                    <p:sp>
+                      <p:nvSpPr>
+                        <p:cNvPr id="94" name="TextBox 93">
+                          <a:extLst>
+                            <a:ext uri="{FF2B5EF4-FFF2-40B4-BE49-F238E27FC236}">
+                              <a16:creationId xmlns:a16="http://schemas.microsoft.com/office/drawing/2014/main" id="{EE2687CA-C4E3-2044-7461-E106974CE721}"/>
+                            </a:ext>
+                          </a:extLst>
+                        </p:cNvPr>
+                        <p:cNvSpPr txBox="1">
+                          <a:spLocks noGrp="1" noRot="1" noMove="1" noResize="1" noEditPoints="1" noAdjustHandles="1" noChangeArrowheads="1" noChangeShapeType="1"/>
+                        </p:cNvSpPr>
+                        <p:nvPr/>
+                      </p:nvSpPr>
+                      <p:spPr>
+                        <a:xfrm>
+                          <a:off x="3352800" y="1866900"/>
+                          <a:ext cx="678180" cy="367326"/>
+                        </a:xfrm>
+                        <a:prstGeom prst="rect">
+                          <a:avLst/>
+                        </a:prstGeom>
+                        <a:noFill/>
+                      </p:spPr>
+                      <p:txBody>
+                        <a:bodyPr wrap="square" rtlCol="0">
+                          <a:spAutoFit/>
+                        </a:bodyPr>
+                        <a:lstStyle/>
+                        <a:p>
+                          <a:pPr algn="ctr"/>
+                          <a:r>
+                            <a:rPr lang="en-US" dirty="0"/>
+                            <a:t>2.0</a:t>
+                          </a:r>
+                          <a:endParaRPr lang="en-CA" dirty="0"/>
+                        </a:p>
+                      </p:txBody>
+                    </p:sp>
+                    <p:sp>
+                      <p:nvSpPr>
+                        <p:cNvPr id="95" name="TextBox 94">
+                          <a:extLst>
+                            <a:ext uri="{FF2B5EF4-FFF2-40B4-BE49-F238E27FC236}">
+                              <a16:creationId xmlns:a16="http://schemas.microsoft.com/office/drawing/2014/main" id="{FE02A58B-459C-4BAF-A050-813277C17F0F}"/>
+                            </a:ext>
+                          </a:extLst>
+                        </p:cNvPr>
+                        <p:cNvSpPr txBox="1">
+                          <a:spLocks noGrp="1" noRot="1" noMove="1" noResize="1" noEditPoints="1" noAdjustHandles="1" noChangeArrowheads="1" noChangeShapeType="1"/>
+                        </p:cNvSpPr>
+                        <p:nvPr/>
+                      </p:nvSpPr>
+                      <p:spPr>
+                        <a:xfrm>
+                          <a:off x="4008120" y="1866900"/>
+                          <a:ext cx="678180" cy="367326"/>
+                        </a:xfrm>
+                        <a:prstGeom prst="rect">
+                          <a:avLst/>
+                        </a:prstGeom>
+                        <a:noFill/>
+                      </p:spPr>
+                      <p:txBody>
+                        <a:bodyPr wrap="square" rtlCol="0">
+                          <a:spAutoFit/>
+                        </a:bodyPr>
+                        <a:lstStyle/>
+                        <a:p>
+                          <a:pPr algn="ctr"/>
+                          <a:r>
+                            <a:rPr lang="en-US" dirty="0"/>
+                            <a:t>4.0</a:t>
+                          </a:r>
+                          <a:endParaRPr lang="en-CA" dirty="0"/>
+                        </a:p>
+                      </p:txBody>
+                    </p:sp>
+                  </p:grpSp>
+                </p:grpSp>
+              </p:grpSp>
+              <p:sp>
+                <p:nvSpPr>
+                  <p:cNvPr id="104" name="TextBox 103">
+                    <a:extLst>
+                      <a:ext uri="{FF2B5EF4-FFF2-40B4-BE49-F238E27FC236}">
+                        <a16:creationId xmlns:a16="http://schemas.microsoft.com/office/drawing/2014/main" id="{DAB27740-4A5A-FE22-9593-CAD7FA8B1824}"/>
+                      </a:ext>
+                    </a:extLst>
+                  </p:cNvPr>
+                  <p:cNvSpPr txBox="1">
+                    <a:spLocks noGrp="1" noRot="1" noMove="1" noResize="1" noEditPoints="1" noAdjustHandles="1" noChangeArrowheads="1" noChangeShapeType="1"/>
+                  </p:cNvSpPr>
+                  <p:nvPr/>
+                </p:nvSpPr>
+                <p:spPr>
+                  <a:xfrm>
+                    <a:off x="2727960" y="2380007"/>
+                    <a:ext cx="626009" cy="369332"/>
+                  </a:xfrm>
+                  <a:prstGeom prst="rect">
+                    <a:avLst/>
+                  </a:prstGeom>
+                  <a:noFill/>
+                </p:spPr>
+                <p:txBody>
+                  <a:bodyPr wrap="square" rtlCol="0">
+                    <a:spAutoFit/>
+                  </a:bodyPr>
+                  <a:lstStyle/>
+                  <a:p>
+                    <a:pPr algn="ctr"/>
+                    <a:r>
+                      <a:rPr lang="en-US" dirty="0"/>
+                      <a:t>y</a:t>
+                    </a:r>
+                    <a:endParaRPr lang="en-CA" dirty="0"/>
+                  </a:p>
+                </p:txBody>
+              </p:sp>
+            </p:grpSp>
+          </p:grpSp>
+        </p:grpSp>
+      </p:grpSp>
+      <p:cxnSp>
+        <p:nvCxnSpPr>
+          <p:cNvPr id="15" name="Straight Connector 14">
+            <a:extLst>
+              <a:ext uri="{FF2B5EF4-FFF2-40B4-BE49-F238E27FC236}">
+                <a16:creationId xmlns:a16="http://schemas.microsoft.com/office/drawing/2014/main" id="{BA1B24E4-CAD0-61BB-3BCD-F0EDBB0857EC}"/>
+              </a:ext>
+            </a:extLst>
+          </p:cNvPr>
+          <p:cNvCxnSpPr>
+            <a:cxnSpLocks/>
+          </p:cNvCxnSpPr>
+          <p:nvPr/>
+        </p:nvCxnSpPr>
+        <p:spPr>
+          <a:xfrm>
+            <a:off x="2935605" y="1924150"/>
+            <a:ext cx="3550920" cy="0"/>
+          </a:xfrm>
+          <a:prstGeom prst="line">
+            <a:avLst/>
+          </a:prstGeom>
+        </p:spPr>
+        <p:style>
+          <a:lnRef idx="1">
+            <a:schemeClr val="dk1"/>
+          </a:lnRef>
+          <a:fillRef idx="0">
+            <a:schemeClr val="dk1"/>
+          </a:fillRef>
+          <a:effectRef idx="0">
+            <a:schemeClr val="dk1"/>
+          </a:effectRef>
+          <a:fontRef idx="minor">
+            <a:schemeClr val="tx1"/>
+          </a:fontRef>
+        </p:style>
+      </p:cxnSp>
+      <p:sp>
+        <p:nvSpPr>
+          <p:cNvPr id="20" name="TextBox 19">
+            <a:extLst>
+              <a:ext uri="{FF2B5EF4-FFF2-40B4-BE49-F238E27FC236}">
+                <a16:creationId xmlns:a16="http://schemas.microsoft.com/office/drawing/2014/main" id="{7C5DA3D0-0265-C798-81AC-E7A5480D1394}"/>
+              </a:ext>
+            </a:extLst>
+          </p:cNvPr>
+          <p:cNvSpPr txBox="1">
+            <a:spLocks/>
+          </p:cNvSpPr>
+          <p:nvPr/>
+        </p:nvSpPr>
+        <p:spPr>
+          <a:xfrm>
+            <a:off x="1245983" y="983100"/>
+            <a:ext cx="1628010" cy="369332"/>
+          </a:xfrm>
+          <a:prstGeom prst="rect">
+            <a:avLst/>
+          </a:prstGeom>
+          <a:noFill/>
+        </p:spPr>
+        <p:txBody>
+          <a:bodyPr wrap="none" rtlCol="0">
+            <a:spAutoFit/>
+          </a:bodyPr>
+          <a:lstStyle/>
+          <a:p>
+            <a:r>
+              <a:rPr lang="en-US" dirty="0"/>
+              <a:t>AR </a:t>
+            </a:r>
+            <a:r>
+              <a:rPr lang="en-US" dirty="0" err="1"/>
+              <a:t>try_to_copy</a:t>
+            </a:r>
+            <a:endParaRPr lang="en-CA" dirty="0"/>
+          </a:p>
+        </p:txBody>
+      </p:sp>
+      <p:grpSp>
+        <p:nvGrpSpPr>
+          <p:cNvPr id="22" name="Group 21">
+            <a:extLst>
+              <a:ext uri="{FF2B5EF4-FFF2-40B4-BE49-F238E27FC236}">
+                <a16:creationId xmlns:a16="http://schemas.microsoft.com/office/drawing/2014/main" id="{982695A6-3335-36E6-FD3D-834F959B04CF}"/>
+              </a:ext>
+            </a:extLst>
+          </p:cNvPr>
+          <p:cNvGrpSpPr>
+            <a:grpSpLocks/>
+          </p:cNvGrpSpPr>
+          <p:nvPr/>
+        </p:nvGrpSpPr>
+        <p:grpSpPr>
+          <a:xfrm>
+            <a:off x="2905125" y="2343149"/>
+            <a:ext cx="1647396" cy="371900"/>
+            <a:chOff x="2800350" y="2916554"/>
+            <a:chExt cx="1647396" cy="371900"/>
+          </a:xfrm>
+        </p:grpSpPr>
+        <p:sp>
+          <p:nvSpPr>
+            <p:cNvPr id="71" name="Rectangle 70">
+              <a:extLst>
+                <a:ext uri="{FF2B5EF4-FFF2-40B4-BE49-F238E27FC236}">
+                  <a16:creationId xmlns:a16="http://schemas.microsoft.com/office/drawing/2014/main" id="{875740E8-BEFB-D56E-F5B2-DC442359E673}"/>
+                </a:ext>
+              </a:extLst>
+            </p:cNvPr>
+            <p:cNvSpPr>
+              <a:spLocks/>
+            </p:cNvSpPr>
+            <p:nvPr/>
+          </p:nvSpPr>
+          <p:spPr>
+            <a:xfrm>
+              <a:off x="3448049" y="2916554"/>
+              <a:ext cx="999697" cy="338609"/>
+            </a:xfrm>
+            <a:prstGeom prst="rect">
+              <a:avLst/>
+            </a:prstGeom>
+            <a:noFill/>
+            <a:ln>
+              <a:solidFill>
+                <a:schemeClr val="tx1"/>
+              </a:solidFill>
+            </a:ln>
+          </p:spPr>
+          <p:style>
+            <a:lnRef idx="2">
+              <a:schemeClr val="accent1">
+                <a:shade val="15000"/>
+              </a:schemeClr>
+            </a:lnRef>
+            <a:fillRef idx="1">
+              <a:schemeClr val="accent1"/>
+            </a:fillRef>
+            <a:effectRef idx="0">
+              <a:schemeClr val="accent1"/>
+            </a:effectRef>
+            <a:fontRef idx="minor">
+              <a:schemeClr val="lt1"/>
+            </a:fontRef>
+          </p:style>
+          <p:txBody>
+            <a:bodyPr rtlCol="0" anchor="ctr"/>
+            <a:lstStyle/>
+            <a:p>
+              <a:pPr algn="ctr"/>
+              <a:endParaRPr lang="en-CA"/>
+            </a:p>
+          </p:txBody>
+        </p:sp>
+        <p:sp>
+          <p:nvSpPr>
+            <p:cNvPr id="72" name="TextBox 71">
+              <a:extLst>
+                <a:ext uri="{FF2B5EF4-FFF2-40B4-BE49-F238E27FC236}">
+                  <a16:creationId xmlns:a16="http://schemas.microsoft.com/office/drawing/2014/main" id="{625ADCAE-8AAA-BFA4-2A54-E103F613E66F}"/>
+                </a:ext>
+              </a:extLst>
+            </p:cNvPr>
+            <p:cNvSpPr txBox="1">
+              <a:spLocks/>
+            </p:cNvSpPr>
+            <p:nvPr/>
+          </p:nvSpPr>
+          <p:spPr>
+            <a:xfrm>
+              <a:off x="2800350" y="2919122"/>
+              <a:ext cx="626009" cy="369332"/>
+            </a:xfrm>
+            <a:prstGeom prst="rect">
+              <a:avLst/>
+            </a:prstGeom>
+            <a:noFill/>
+          </p:spPr>
+          <p:txBody>
+            <a:bodyPr wrap="square" rtlCol="0">
+              <a:spAutoFit/>
+            </a:bodyPr>
+            <a:lstStyle/>
+            <a:p>
+              <a:pPr algn="ctr"/>
+              <a:r>
+                <a:rPr lang="en-US" dirty="0" err="1"/>
+                <a:t>dest</a:t>
+              </a:r>
+              <a:endParaRPr lang="en-CA" dirty="0"/>
+            </a:p>
+          </p:txBody>
+        </p:sp>
+      </p:grpSp>
+      <p:sp>
+        <p:nvSpPr>
+          <p:cNvPr id="25" name="Rectangle 24">
+            <a:extLst>
+              <a:ext uri="{FF2B5EF4-FFF2-40B4-BE49-F238E27FC236}">
+                <a16:creationId xmlns:a16="http://schemas.microsoft.com/office/drawing/2014/main" id="{24847AA7-D9EA-BC1F-621B-EE58EB859C0A}"/>
+              </a:ext>
+            </a:extLst>
+          </p:cNvPr>
+          <p:cNvSpPr>
+            <a:spLocks/>
+          </p:cNvSpPr>
+          <p:nvPr/>
+        </p:nvSpPr>
+        <p:spPr>
+          <a:xfrm>
+            <a:off x="2920165" y="736533"/>
+            <a:ext cx="3553326" cy="2294021"/>
+          </a:xfrm>
+          <a:prstGeom prst="rect">
+            <a:avLst/>
+          </a:prstGeom>
+          <a:noFill/>
+          <a:ln>
+            <a:solidFill>
+              <a:schemeClr val="tx1"/>
+            </a:solidFill>
+          </a:ln>
+        </p:spPr>
+        <p:style>
+          <a:lnRef idx="2">
+            <a:schemeClr val="accent1">
+              <a:shade val="15000"/>
+            </a:schemeClr>
+          </a:lnRef>
+          <a:fillRef idx="1">
+            <a:schemeClr val="accent1"/>
+          </a:fillRef>
+          <a:effectRef idx="0">
+            <a:schemeClr val="accent1"/>
+          </a:effectRef>
+          <a:fontRef idx="minor">
+            <a:schemeClr val="lt1"/>
+          </a:fontRef>
+        </p:style>
+        <p:txBody>
+          <a:bodyPr rtlCol="0" anchor="ctr"/>
+          <a:lstStyle/>
+          <a:p>
+            <a:pPr algn="ctr"/>
+            <a:endParaRPr lang="en-CA"/>
+          </a:p>
+        </p:txBody>
+      </p:sp>
+      <p:grpSp>
+        <p:nvGrpSpPr>
+          <p:cNvPr id="80" name="Group 79">
+            <a:extLst>
+              <a:ext uri="{FF2B5EF4-FFF2-40B4-BE49-F238E27FC236}">
+                <a16:creationId xmlns:a16="http://schemas.microsoft.com/office/drawing/2014/main" id="{92D7B302-B4C5-AF89-3449-EFD6CD90FDA8}"/>
+              </a:ext>
+            </a:extLst>
+          </p:cNvPr>
+          <p:cNvGrpSpPr>
+            <a:grpSpLocks/>
+          </p:cNvGrpSpPr>
+          <p:nvPr/>
+        </p:nvGrpSpPr>
+        <p:grpSpPr>
+          <a:xfrm>
+            <a:off x="4505325" y="2336192"/>
+            <a:ext cx="1799796" cy="369332"/>
+            <a:chOff x="2647950" y="2900072"/>
+            <a:chExt cx="1799796" cy="369332"/>
+          </a:xfrm>
+        </p:grpSpPr>
+        <p:sp>
+          <p:nvSpPr>
+            <p:cNvPr id="81" name="Rectangle 80">
+              <a:extLst>
+                <a:ext uri="{FF2B5EF4-FFF2-40B4-BE49-F238E27FC236}">
+                  <a16:creationId xmlns:a16="http://schemas.microsoft.com/office/drawing/2014/main" id="{E7717D85-0CB8-150C-197C-13949EDDF712}"/>
+                </a:ext>
+              </a:extLst>
+            </p:cNvPr>
+            <p:cNvSpPr>
+              <a:spLocks/>
+            </p:cNvSpPr>
+            <p:nvPr/>
+          </p:nvSpPr>
+          <p:spPr>
+            <a:xfrm>
+              <a:off x="3448049" y="2916554"/>
+              <a:ext cx="999697" cy="338609"/>
+            </a:xfrm>
+            <a:prstGeom prst="rect">
+              <a:avLst/>
+            </a:prstGeom>
+            <a:noFill/>
+            <a:ln>
+              <a:solidFill>
+                <a:schemeClr val="tx1"/>
+              </a:solidFill>
+            </a:ln>
+          </p:spPr>
+          <p:style>
+            <a:lnRef idx="2">
+              <a:schemeClr val="accent1">
+                <a:shade val="15000"/>
+              </a:schemeClr>
+            </a:lnRef>
+            <a:fillRef idx="1">
+              <a:schemeClr val="accent1"/>
+            </a:fillRef>
+            <a:effectRef idx="0">
+              <a:schemeClr val="accent1"/>
+            </a:effectRef>
+            <a:fontRef idx="minor">
+              <a:schemeClr val="lt1"/>
+            </a:fontRef>
+          </p:style>
+          <p:txBody>
+            <a:bodyPr rtlCol="0" anchor="ctr"/>
+            <a:lstStyle/>
+            <a:p>
+              <a:pPr algn="ctr"/>
+              <a:endParaRPr lang="en-CA"/>
+            </a:p>
+          </p:txBody>
+        </p:sp>
+        <p:sp>
+          <p:nvSpPr>
+            <p:cNvPr id="82" name="TextBox 81">
+              <a:extLst>
+                <a:ext uri="{FF2B5EF4-FFF2-40B4-BE49-F238E27FC236}">
+                  <a16:creationId xmlns:a16="http://schemas.microsoft.com/office/drawing/2014/main" id="{5A492B31-0E77-9B1C-9211-4379220918E9}"/>
+                </a:ext>
+              </a:extLst>
+            </p:cNvPr>
+            <p:cNvSpPr txBox="1">
+              <a:spLocks/>
+            </p:cNvSpPr>
+            <p:nvPr/>
+          </p:nvSpPr>
+          <p:spPr>
+            <a:xfrm>
+              <a:off x="2647950" y="2900072"/>
+              <a:ext cx="847725" cy="369332"/>
+            </a:xfrm>
+            <a:prstGeom prst="rect">
+              <a:avLst/>
+            </a:prstGeom>
+            <a:noFill/>
+          </p:spPr>
+          <p:txBody>
+            <a:bodyPr wrap="square" rtlCol="0">
+              <a:spAutoFit/>
+            </a:bodyPr>
+            <a:lstStyle/>
+            <a:p>
+              <a:pPr algn="ctr"/>
+              <a:r>
+                <a:rPr lang="en-US" dirty="0"/>
+                <a:t>source</a:t>
+              </a:r>
+              <a:endParaRPr lang="en-CA" dirty="0"/>
+            </a:p>
+          </p:txBody>
+        </p:sp>
+      </p:grpSp>
+      <p:cxnSp>
+        <p:nvCxnSpPr>
+          <p:cNvPr id="84" name="Connector: Curved 83">
+            <a:extLst>
+              <a:ext uri="{FF2B5EF4-FFF2-40B4-BE49-F238E27FC236}">
+                <a16:creationId xmlns:a16="http://schemas.microsoft.com/office/drawing/2014/main" id="{06CC5023-9014-CF1C-002C-B1F7E1690F1E}"/>
+              </a:ext>
+            </a:extLst>
+          </p:cNvPr>
+          <p:cNvCxnSpPr>
+            <a:cxnSpLocks/>
+          </p:cNvCxnSpPr>
+          <p:nvPr/>
+        </p:nvCxnSpPr>
+        <p:spPr>
+          <a:xfrm rot="5400000">
+            <a:off x="2817253" y="3810454"/>
+            <a:ext cx="2023653" cy="520801"/>
+          </a:xfrm>
+          <a:prstGeom prst="curvedConnector2">
+            <a:avLst/>
+          </a:prstGeom>
+          <a:ln>
+            <a:solidFill>
+              <a:srgbClr val="C00000"/>
+            </a:solidFill>
+            <a:tailEnd type="triangle"/>
+          </a:ln>
+        </p:spPr>
+        <p:style>
+          <a:lnRef idx="1">
+            <a:schemeClr val="accent1"/>
+          </a:lnRef>
+          <a:fillRef idx="0">
+            <a:schemeClr val="accent1"/>
+          </a:fillRef>
+          <a:effectRef idx="0">
+            <a:schemeClr val="accent1"/>
+          </a:effectRef>
+          <a:fontRef idx="minor">
+            <a:schemeClr val="tx1"/>
+          </a:fontRef>
+        </p:style>
+      </p:cxnSp>
+      <p:cxnSp>
+        <p:nvCxnSpPr>
+          <p:cNvPr id="86" name="Connector: Curved 85">
+            <a:extLst>
+              <a:ext uri="{FF2B5EF4-FFF2-40B4-BE49-F238E27FC236}">
+                <a16:creationId xmlns:a16="http://schemas.microsoft.com/office/drawing/2014/main" id="{78CAE5D8-70B0-1A79-84F1-1A99C620C1EA}"/>
+              </a:ext>
+            </a:extLst>
+          </p:cNvPr>
+          <p:cNvCxnSpPr>
+            <a:endCxn id="104" idx="3"/>
+          </p:cNvCxnSpPr>
+          <p:nvPr/>
+        </p:nvCxnSpPr>
+        <p:spPr>
+          <a:xfrm rot="5400000">
+            <a:off x="3400886" y="2689561"/>
+            <a:ext cx="2540148" cy="2240280"/>
+          </a:xfrm>
+          <a:prstGeom prst="curvedConnector4">
+            <a:avLst>
+              <a:gd name="adj1" fmla="val 46385"/>
+              <a:gd name="adj2" fmla="val 110204"/>
+            </a:avLst>
+          </a:prstGeom>
+          <a:ln>
+            <a:tailEnd type="triangle"/>
+          </a:ln>
+        </p:spPr>
+        <p:style>
+          <a:lnRef idx="1">
+            <a:schemeClr val="accent1"/>
+          </a:lnRef>
+          <a:fillRef idx="0">
+            <a:schemeClr val="accent1"/>
+          </a:fillRef>
+          <a:effectRef idx="0">
+            <a:schemeClr val="accent1"/>
+          </a:effectRef>
+          <a:fontRef idx="minor">
+            <a:schemeClr val="tx1"/>
+          </a:fontRef>
+        </p:style>
+      </p:cxnSp>
+      <p:sp>
+        <p:nvSpPr>
+          <p:cNvPr id="87" name="TextBox 86">
+            <a:extLst>
+              <a:ext uri="{FF2B5EF4-FFF2-40B4-BE49-F238E27FC236}">
+                <a16:creationId xmlns:a16="http://schemas.microsoft.com/office/drawing/2014/main" id="{44153DC0-0D4D-4279-71A2-9DBDF6CC287B}"/>
+              </a:ext>
+            </a:extLst>
+          </p:cNvPr>
+          <p:cNvSpPr txBox="1"/>
+          <p:nvPr/>
+        </p:nvSpPr>
+        <p:spPr>
+          <a:xfrm>
+            <a:off x="2926080" y="1104900"/>
+            <a:ext cx="3550920" cy="369332"/>
+          </a:xfrm>
+          <a:prstGeom prst="rect">
+            <a:avLst/>
+          </a:prstGeom>
+          <a:noFill/>
+        </p:spPr>
+        <p:txBody>
+          <a:bodyPr wrap="square" rtlCol="0">
+            <a:spAutoFit/>
+          </a:bodyPr>
+          <a:lstStyle/>
+          <a:p>
+            <a:pPr algn="ctr"/>
+            <a:r>
+              <a:rPr lang="en-US" dirty="0"/>
+              <a:t>No local variables</a:t>
+            </a:r>
+            <a:endParaRPr lang="en-CA" dirty="0"/>
+          </a:p>
+        </p:txBody>
+      </p:sp>
+    </p:spTree>
+    <p:extLst>
+      <p:ext uri="{BB962C8B-B14F-4D97-AF65-F5344CB8AC3E}">
+        <p14:creationId xmlns:p14="http://schemas.microsoft.com/office/powerpoint/2010/main" val="2884349664"/>
+      </p:ext>
+    </p:extLst>
+  </p:cSld>
+  <p:clrMapOvr>
+    <a:masterClrMapping/>
+  </p:clrMapOvr>
+</p:sld>
+</file>
+
+<file path=ppt/slides/slide3.xml><?xml version="1.0" encoding="utf-8"?>
+<p:sld xmlns:a="http://schemas.openxmlformats.org/drawingml/2006/main" xmlns:r="http://schemas.openxmlformats.org/officeDocument/2006/relationships" xmlns:p="http://schemas.openxmlformats.org/presentationml/2006/main">
+  <p:cSld>
+    <p:spTree>
+      <p:nvGrpSpPr>
+        <p:cNvPr id="1" name=""/>
+        <p:cNvGrpSpPr/>
+        <p:nvPr/>
+      </p:nvGrpSpPr>
+      <p:grpSpPr>
+        <a:xfrm>
+          <a:off x="0" y="0"/>
+          <a:ext cx="0" cy="0"/>
+          <a:chOff x="0" y="0"/>
+          <a:chExt cx="0" cy="0"/>
+        </a:xfrm>
+      </p:grpSpPr>
+      <p:sp>
+        <p:nvSpPr>
+          <p:cNvPr id="3" name="TextBox 2">
+            <a:extLst>
+              <a:ext uri="{FF2B5EF4-FFF2-40B4-BE49-F238E27FC236}">
+                <a16:creationId xmlns:a16="http://schemas.microsoft.com/office/drawing/2014/main" id="{3ADCEB22-761A-1882-E9D1-306234468128}"/>
+              </a:ext>
+            </a:extLst>
+          </p:cNvPr>
+          <p:cNvSpPr txBox="1"/>
+          <p:nvPr/>
+        </p:nvSpPr>
+        <p:spPr>
+          <a:xfrm>
+            <a:off x="8420601" y="525880"/>
+            <a:ext cx="855299" cy="369332"/>
+          </a:xfrm>
+          <a:prstGeom prst="rect">
+            <a:avLst/>
+          </a:prstGeom>
+          <a:noFill/>
+        </p:spPr>
+        <p:txBody>
+          <a:bodyPr wrap="none" rtlCol="0">
+            <a:spAutoFit/>
+          </a:bodyPr>
+          <a:lstStyle/>
+          <a:p>
+            <a:r>
+              <a:rPr lang="en-US" b="1" u="sng" dirty="0"/>
+              <a:t>Point 3</a:t>
             </a:r>
             <a:endParaRPr lang="en-CA" b="1" u="sng" dirty="0"/>
           </a:p>
@@ -5766,7 +7904,7 @@
                               <a:pPr algn="ctr"/>
                               <a:r>
                                 <a:rPr lang="en-US" dirty="0"/>
-                                <a:t>\0</a:t>
+                                <a:t>?</a:t>
                               </a:r>
                               <a:endParaRPr lang="en-CA" dirty="0"/>
                             </a:p>
@@ -5803,7 +7941,7 @@
                               <a:pPr algn="ctr"/>
                               <a:r>
                                 <a:rPr lang="en-US" dirty="0"/>
-                                <a:t>\0</a:t>
+                                <a:t>?</a:t>
                               </a:r>
                               <a:endParaRPr lang="en-CA" dirty="0"/>
                             </a:p>
@@ -5861,7 +7999,7 @@
                               <a:pPr algn="ctr"/>
                               <a:r>
                                 <a:rPr lang="en-US" dirty="0"/>
-                                <a:t>\0</a:t>
+                                <a:t>?</a:t>
                               </a:r>
                               <a:endParaRPr lang="en-CA" dirty="0"/>
                             </a:p>
@@ -5898,7 +8036,7 @@
                               <a:pPr algn="ctr"/>
                               <a:r>
                                 <a:rPr lang="en-US" dirty="0"/>
-                                <a:t>\0</a:t>
+                                <a:t>49</a:t>
                               </a:r>
                               <a:endParaRPr lang="en-CA" dirty="0"/>
                             </a:p>
@@ -6542,8 +8680,8 @@
         </p:nvSpPr>
         <p:spPr>
           <a:xfrm>
-            <a:off x="1245983" y="983100"/>
-            <a:ext cx="1628010" cy="369332"/>
+            <a:off x="1074533" y="1011675"/>
+            <a:ext cx="1859996" cy="369332"/>
           </a:xfrm>
           <a:prstGeom prst="rect">
             <a:avLst/>
@@ -6562,7 +8700,7 @@
             </a:r>
             <a:r>
               <a:rPr lang="en-US" dirty="0" err="1"/>
-              <a:t>try_to_copy</a:t>
+              <a:t>try_to_change</a:t>
             </a:r>
             <a:endParaRPr lang="en-CA" dirty="0"/>
           </a:p>
@@ -6738,122 +8876,6 @@
           </a:p>
         </p:txBody>
       </p:sp>
-      <p:grpSp>
-        <p:nvGrpSpPr>
-          <p:cNvPr id="80" name="Group 79">
-            <a:extLst>
-              <a:ext uri="{FF2B5EF4-FFF2-40B4-BE49-F238E27FC236}">
-                <a16:creationId xmlns:a16="http://schemas.microsoft.com/office/drawing/2014/main" id="{92D7B302-B4C5-AF89-3449-EFD6CD90FDA8}"/>
-              </a:ext>
-            </a:extLst>
-          </p:cNvPr>
-          <p:cNvGrpSpPr>
-            <a:grpSpLocks/>
-          </p:cNvGrpSpPr>
-          <p:nvPr/>
-        </p:nvGrpSpPr>
-        <p:grpSpPr>
-          <a:xfrm>
-            <a:off x="4505325" y="2336192"/>
-            <a:ext cx="1799796" cy="369332"/>
-            <a:chOff x="2647950" y="2900072"/>
-            <a:chExt cx="1799796" cy="369332"/>
-          </a:xfrm>
-        </p:grpSpPr>
-        <p:sp>
-          <p:nvSpPr>
-            <p:cNvPr id="81" name="Rectangle 80">
-              <a:extLst>
-                <a:ext uri="{FF2B5EF4-FFF2-40B4-BE49-F238E27FC236}">
-                  <a16:creationId xmlns:a16="http://schemas.microsoft.com/office/drawing/2014/main" id="{E7717D85-0CB8-150C-197C-13949EDDF712}"/>
-                </a:ext>
-              </a:extLst>
-            </p:cNvPr>
-            <p:cNvSpPr>
-              <a:spLocks/>
-            </p:cNvSpPr>
-            <p:nvPr/>
-          </p:nvSpPr>
-          <p:spPr>
-            <a:xfrm>
-              <a:off x="3448049" y="2916554"/>
-              <a:ext cx="999697" cy="338609"/>
-            </a:xfrm>
-            <a:prstGeom prst="rect">
-              <a:avLst/>
-            </a:prstGeom>
-            <a:noFill/>
-            <a:ln>
-              <a:solidFill>
-                <a:schemeClr val="tx1"/>
-              </a:solidFill>
-            </a:ln>
-          </p:spPr>
-          <p:style>
-            <a:lnRef idx="2">
-              <a:schemeClr val="accent1">
-                <a:shade val="15000"/>
-              </a:schemeClr>
-            </a:lnRef>
-            <a:fillRef idx="1">
-              <a:schemeClr val="accent1"/>
-            </a:fillRef>
-            <a:effectRef idx="0">
-              <a:schemeClr val="accent1"/>
-            </a:effectRef>
-            <a:fontRef idx="minor">
-              <a:schemeClr val="lt1"/>
-            </a:fontRef>
-          </p:style>
-          <p:txBody>
-            <a:bodyPr rtlCol="0" anchor="ctr"/>
-            <a:lstStyle/>
-            <a:p>
-              <a:pPr algn="ctr"/>
-              <a:endParaRPr lang="en-CA"/>
-            </a:p>
-          </p:txBody>
-        </p:sp>
-        <p:sp>
-          <p:nvSpPr>
-            <p:cNvPr id="82" name="TextBox 81">
-              <a:extLst>
-                <a:ext uri="{FF2B5EF4-FFF2-40B4-BE49-F238E27FC236}">
-                  <a16:creationId xmlns:a16="http://schemas.microsoft.com/office/drawing/2014/main" id="{5A492B31-0E77-9B1C-9211-4379220918E9}"/>
-                </a:ext>
-              </a:extLst>
-            </p:cNvPr>
-            <p:cNvSpPr txBox="1">
-              <a:spLocks/>
-            </p:cNvSpPr>
-            <p:nvPr/>
-          </p:nvSpPr>
-          <p:spPr>
-            <a:xfrm>
-              <a:off x="2647950" y="2900072"/>
-              <a:ext cx="847725" cy="369332"/>
-            </a:xfrm>
-            <a:prstGeom prst="rect">
-              <a:avLst/>
-            </a:prstGeom>
-            <a:noFill/>
-          </p:spPr>
-          <p:txBody>
-            <a:bodyPr wrap="square" rtlCol="0">
-              <a:spAutoFit/>
-            </a:bodyPr>
-            <a:lstStyle/>
-            <a:p>
-              <a:pPr algn="ctr"/>
-              <a:r>
-                <a:rPr lang="en-US" dirty="0"/>
-                <a:t>source</a:t>
-              </a:r>
-              <a:endParaRPr lang="en-CA" dirty="0"/>
-            </a:p>
-          </p:txBody>
-        </p:sp>
-      </p:grpSp>
       <p:cxnSp>
         <p:nvCxnSpPr>
           <p:cNvPr id="84" name="Connector: Curved 83">
@@ -6880,50 +8902,6 @@
             <a:solidFill>
               <a:srgbClr val="C00000"/>
             </a:solidFill>
-            <a:tailEnd type="triangle"/>
-          </a:ln>
-        </p:spPr>
-        <p:style>
-          <a:lnRef idx="1">
-            <a:schemeClr val="accent1"/>
-          </a:lnRef>
-          <a:fillRef idx="0">
-            <a:schemeClr val="accent1"/>
-          </a:fillRef>
-          <a:effectRef idx="0">
-            <a:schemeClr val="accent1"/>
-          </a:effectRef>
-          <a:fontRef idx="minor">
-            <a:schemeClr val="tx1"/>
-          </a:fontRef>
-        </p:style>
-      </p:cxnSp>
-      <p:cxnSp>
-        <p:nvCxnSpPr>
-          <p:cNvPr id="86" name="Connector: Curved 85">
-            <a:extLst>
-              <a:ext uri="{FF2B5EF4-FFF2-40B4-BE49-F238E27FC236}">
-                <a16:creationId xmlns:a16="http://schemas.microsoft.com/office/drawing/2014/main" id="{78CAE5D8-70B0-1A79-84F1-1A99C620C1EA}"/>
-              </a:ext>
-            </a:extLst>
-          </p:cNvPr>
-          <p:cNvCxnSpPr>
-            <a:endCxn id="104" idx="3"/>
-          </p:cNvCxnSpPr>
-          <p:nvPr/>
-        </p:nvCxnSpPr>
-        <p:spPr>
-          <a:xfrm rot="5400000">
-            <a:off x="3400986" y="2693109"/>
-            <a:ext cx="2540148" cy="2240280"/>
-          </a:xfrm>
-          <a:prstGeom prst="curvedConnector4">
-            <a:avLst>
-              <a:gd name="adj1" fmla="val 46385"/>
-              <a:gd name="adj2" fmla="val 110204"/>
-            </a:avLst>
-          </a:prstGeom>
-          <a:ln>
             <a:tailEnd type="triangle"/>
           </a:ln>
         </p:spPr>
@@ -6982,7 +8960,7 @@
     </p:spTree>
     <p:extLst>
       <p:ext uri="{BB962C8B-B14F-4D97-AF65-F5344CB8AC3E}">
-        <p14:creationId xmlns:p14="http://schemas.microsoft.com/office/powerpoint/2010/main" val="2884349664"/>
+        <p14:creationId xmlns:p14="http://schemas.microsoft.com/office/powerpoint/2010/main" val="778413885"/>
       </p:ext>
     </p:extLst>
   </p:cSld>
@@ -6992,7 +8970,7 @@
 </p:sld>
 </file>
 
-<file path=ppt/slides/slide3.xml><?xml version="1.0" encoding="utf-8"?>
+<file path=ppt/slides/slide4.xml><?xml version="1.0" encoding="utf-8"?>
 <p:sld xmlns:a="http://schemas.openxmlformats.org/drawingml/2006/main" xmlns:r="http://schemas.openxmlformats.org/officeDocument/2006/relationships" xmlns:p="http://schemas.openxmlformats.org/presentationml/2006/main">
   <p:cSld>
     <p:spTree>
@@ -7023,7 +9001,7 @@
         </p:nvSpPr>
         <p:spPr>
           <a:xfrm>
-            <a:off x="8420601" y="525880"/>
+            <a:off x="8430126" y="363955"/>
             <a:ext cx="855299" cy="369332"/>
           </a:xfrm>
           <a:prstGeom prst="rect">
@@ -7039,7 +9017,7 @@
           <a:p>
             <a:r>
               <a:rPr lang="en-US" b="1" u="sng" dirty="0"/>
-              <a:t>Point 3</a:t>
+              <a:t>Point 4</a:t>
             </a:r>
             <a:endParaRPr lang="en-CA" b="1" u="sng" dirty="0"/>
           </a:p>
@@ -7888,7 +9866,7 @@
                               <a:pPr algn="ctr"/>
                               <a:r>
                                 <a:rPr lang="en-US" dirty="0"/>
-                                <a:t>\0</a:t>
+                                <a:t>?</a:t>
                               </a:r>
                               <a:endParaRPr lang="en-CA" dirty="0"/>
                             </a:p>
@@ -7925,7 +9903,7 @@
                               <a:pPr algn="ctr"/>
                               <a:r>
                                 <a:rPr lang="en-US" dirty="0"/>
-                                <a:t>\0</a:t>
+                                <a:t>?</a:t>
                               </a:r>
                               <a:endParaRPr lang="en-CA" dirty="0"/>
                             </a:p>
@@ -7983,1969 +9961,7 @@
                               <a:pPr algn="ctr"/>
                               <a:r>
                                 <a:rPr lang="en-US" dirty="0"/>
-                                <a:t>\0</a:t>
-                              </a:r>
-                              <a:endParaRPr lang="en-CA" dirty="0"/>
-                            </a:p>
-                          </p:txBody>
-                        </p:sp>
-                        <p:sp>
-                          <p:nvSpPr>
-                            <p:cNvPr id="78" name="TextBox 77">
-                              <a:extLst>
-                                <a:ext uri="{FF2B5EF4-FFF2-40B4-BE49-F238E27FC236}">
-                                  <a16:creationId xmlns:a16="http://schemas.microsoft.com/office/drawing/2014/main" id="{26F46947-EBDA-7CA1-1AF1-5518A6FC481E}"/>
-                                </a:ext>
-                              </a:extLst>
-                            </p:cNvPr>
-                            <p:cNvSpPr txBox="1"/>
-                            <p:nvPr/>
-                          </p:nvSpPr>
-                          <p:spPr>
-                            <a:xfrm>
-                              <a:off x="4008120" y="1866900"/>
-                              <a:ext cx="678180" cy="367326"/>
-                            </a:xfrm>
-                            <a:prstGeom prst="rect">
-                              <a:avLst/>
-                            </a:prstGeom>
-                            <a:noFill/>
-                          </p:spPr>
-                          <p:txBody>
-                            <a:bodyPr wrap="square" rtlCol="0">
-                              <a:spAutoFit/>
-                            </a:bodyPr>
-                            <a:lstStyle/>
-                            <a:p>
-                              <a:pPr algn="ctr"/>
-                              <a:r>
-                                <a:rPr lang="en-US" dirty="0"/>
-                                <a:t>49</a:t>
-                              </a:r>
-                              <a:endParaRPr lang="en-CA" dirty="0"/>
-                            </a:p>
-                          </p:txBody>
-                        </p:sp>
-                      </p:grpSp>
-                    </p:grpSp>
-                  </p:grpSp>
-                </p:grpSp>
-                <p:grpSp>
-                  <p:nvGrpSpPr>
-                    <p:cNvPr id="105" name="Group 104">
-                      <a:extLst>
-                        <a:ext uri="{FF2B5EF4-FFF2-40B4-BE49-F238E27FC236}">
-                          <a16:creationId xmlns:a16="http://schemas.microsoft.com/office/drawing/2014/main" id="{D7350D51-4870-8674-FFE7-9009A128199F}"/>
-                        </a:ext>
-                      </a:extLst>
-                    </p:cNvPr>
-                    <p:cNvGrpSpPr/>
-                    <p:nvPr/>
-                  </p:nvGrpSpPr>
-                  <p:grpSpPr>
-                    <a:xfrm>
-                      <a:off x="2727960" y="2365783"/>
-                      <a:ext cx="3337560" cy="399796"/>
-                      <a:chOff x="2727960" y="2365783"/>
-                      <a:chExt cx="3337560" cy="399796"/>
-                    </a:xfrm>
-                  </p:grpSpPr>
-                  <p:grpSp>
-                    <p:nvGrpSpPr>
-                      <p:cNvPr id="89" name="Group 88">
-                        <a:extLst>
-                          <a:ext uri="{FF2B5EF4-FFF2-40B4-BE49-F238E27FC236}">
-                            <a16:creationId xmlns:a16="http://schemas.microsoft.com/office/drawing/2014/main" id="{4DC34644-E751-47E9-238F-180C2BCDD3B8}"/>
-                          </a:ext>
-                        </a:extLst>
-                      </p:cNvPr>
-                      <p:cNvGrpSpPr/>
-                      <p:nvPr/>
-                    </p:nvGrpSpPr>
-                    <p:grpSpPr>
-                      <a:xfrm>
-                        <a:off x="3353969" y="2365783"/>
-                        <a:ext cx="2711551" cy="399796"/>
-                        <a:chOff x="3346349" y="1855243"/>
-                        <a:chExt cx="2711551" cy="399796"/>
-                      </a:xfrm>
-                    </p:grpSpPr>
-                    <p:grpSp>
-                      <p:nvGrpSpPr>
-                        <p:cNvPr id="90" name="Group 89">
-                          <a:extLst>
-                            <a:ext uri="{FF2B5EF4-FFF2-40B4-BE49-F238E27FC236}">
-                              <a16:creationId xmlns:a16="http://schemas.microsoft.com/office/drawing/2014/main" id="{6C9759C0-6573-14DF-E00F-649DB7C1DF9C}"/>
-                            </a:ext>
-                          </a:extLst>
-                        </p:cNvPr>
-                        <p:cNvGrpSpPr>
-                          <a:grpSpLocks/>
-                        </p:cNvGrpSpPr>
-                        <p:nvPr/>
-                      </p:nvGrpSpPr>
-                      <p:grpSpPr>
-                        <a:xfrm>
-                          <a:off x="3346349" y="1855243"/>
-                          <a:ext cx="2711551" cy="399796"/>
-                          <a:chOff x="3346349" y="1855243"/>
-                          <a:chExt cx="2711551" cy="399796"/>
-                        </a:xfrm>
-                      </p:grpSpPr>
-                      <p:grpSp>
-                        <p:nvGrpSpPr>
-                          <p:cNvPr id="98" name="Group 97">
-                            <a:extLst>
-                              <a:ext uri="{FF2B5EF4-FFF2-40B4-BE49-F238E27FC236}">
-                                <a16:creationId xmlns:a16="http://schemas.microsoft.com/office/drawing/2014/main" id="{6A821F28-FAD8-4C4B-7D0D-562850E4A9AF}"/>
-                              </a:ext>
-                            </a:extLst>
-                          </p:cNvPr>
-                          <p:cNvGrpSpPr>
-                            <a:grpSpLocks/>
-                          </p:cNvGrpSpPr>
-                          <p:nvPr/>
-                        </p:nvGrpSpPr>
-                        <p:grpSpPr>
-                          <a:xfrm>
-                            <a:off x="3346349" y="1855243"/>
-                            <a:ext cx="1355191" cy="399796"/>
-                            <a:chOff x="3346349" y="1855243"/>
-                            <a:chExt cx="1355191" cy="399796"/>
-                          </a:xfrm>
-                        </p:grpSpPr>
-                        <p:sp>
-                          <p:nvSpPr>
-                            <p:cNvPr id="102" name="Rectangle 101">
-                              <a:extLst>
-                                <a:ext uri="{FF2B5EF4-FFF2-40B4-BE49-F238E27FC236}">
-                                  <a16:creationId xmlns:a16="http://schemas.microsoft.com/office/drawing/2014/main" id="{04D685F3-8D3D-DBBE-2A66-C62FAE8680CF}"/>
-                                </a:ext>
-                              </a:extLst>
-                            </p:cNvPr>
-                            <p:cNvSpPr>
-                              <a:spLocks/>
-                            </p:cNvSpPr>
-                            <p:nvPr/>
-                          </p:nvSpPr>
-                          <p:spPr>
-                            <a:xfrm>
-                              <a:off x="3346349" y="1855243"/>
-                              <a:ext cx="677011" cy="399796"/>
-                            </a:xfrm>
-                            <a:prstGeom prst="rect">
-                              <a:avLst/>
-                            </a:prstGeom>
-                            <a:noFill/>
-                            <a:ln>
-                              <a:solidFill>
-                                <a:schemeClr val="tx1"/>
-                              </a:solidFill>
-                            </a:ln>
-                          </p:spPr>
-                          <p:style>
-                            <a:lnRef idx="2">
-                              <a:schemeClr val="accent1">
-                                <a:shade val="15000"/>
-                              </a:schemeClr>
-                            </a:lnRef>
-                            <a:fillRef idx="1">
-                              <a:schemeClr val="accent1"/>
-                            </a:fillRef>
-                            <a:effectRef idx="0">
-                              <a:schemeClr val="accent1"/>
-                            </a:effectRef>
-                            <a:fontRef idx="minor">
-                              <a:schemeClr val="lt1"/>
-                            </a:fontRef>
-                          </p:style>
-                          <p:txBody>
-                            <a:bodyPr rtlCol="0" anchor="ctr"/>
-                            <a:lstStyle/>
-                            <a:p>
-                              <a:pPr algn="ctr"/>
-                              <a:endParaRPr lang="en-CA"/>
-                            </a:p>
-                          </p:txBody>
-                        </p:sp>
-                        <p:sp>
-                          <p:nvSpPr>
-                            <p:cNvPr id="103" name="Rectangle 102">
-                              <a:extLst>
-                                <a:ext uri="{FF2B5EF4-FFF2-40B4-BE49-F238E27FC236}">
-                                  <a16:creationId xmlns:a16="http://schemas.microsoft.com/office/drawing/2014/main" id="{CF23AC2F-6B9A-1456-6C53-1D5D915246BD}"/>
-                                </a:ext>
-                              </a:extLst>
-                            </p:cNvPr>
-                            <p:cNvSpPr>
-                              <a:spLocks/>
-                            </p:cNvSpPr>
-                            <p:nvPr/>
-                          </p:nvSpPr>
-                          <p:spPr>
-                            <a:xfrm>
-                              <a:off x="4024529" y="1855243"/>
-                              <a:ext cx="677011" cy="399796"/>
-                            </a:xfrm>
-                            <a:prstGeom prst="rect">
-                              <a:avLst/>
-                            </a:prstGeom>
-                            <a:noFill/>
-                            <a:ln>
-                              <a:solidFill>
-                                <a:schemeClr val="tx1"/>
-                              </a:solidFill>
-                            </a:ln>
-                          </p:spPr>
-                          <p:style>
-                            <a:lnRef idx="2">
-                              <a:schemeClr val="accent1">
-                                <a:shade val="15000"/>
-                              </a:schemeClr>
-                            </a:lnRef>
-                            <a:fillRef idx="1">
-                              <a:schemeClr val="accent1"/>
-                            </a:fillRef>
-                            <a:effectRef idx="0">
-                              <a:schemeClr val="accent1"/>
-                            </a:effectRef>
-                            <a:fontRef idx="minor">
-                              <a:schemeClr val="lt1"/>
-                            </a:fontRef>
-                          </p:style>
-                          <p:txBody>
-                            <a:bodyPr rtlCol="0" anchor="ctr"/>
-                            <a:lstStyle/>
-                            <a:p>
-                              <a:pPr algn="ctr"/>
-                              <a:endParaRPr lang="en-CA"/>
-                            </a:p>
-                          </p:txBody>
-                        </p:sp>
-                      </p:grpSp>
-                      <p:grpSp>
-                        <p:nvGrpSpPr>
-                          <p:cNvPr id="99" name="Group 98">
-                            <a:extLst>
-                              <a:ext uri="{FF2B5EF4-FFF2-40B4-BE49-F238E27FC236}">
-                                <a16:creationId xmlns:a16="http://schemas.microsoft.com/office/drawing/2014/main" id="{65AEACC5-2BDA-B820-8CAA-23EF35A1D8D6}"/>
-                              </a:ext>
-                            </a:extLst>
-                          </p:cNvPr>
-                          <p:cNvGrpSpPr>
-                            <a:grpSpLocks/>
-                          </p:cNvGrpSpPr>
-                          <p:nvPr/>
-                        </p:nvGrpSpPr>
-                        <p:grpSpPr>
-                          <a:xfrm>
-                            <a:off x="4702709" y="1855243"/>
-                            <a:ext cx="1355191" cy="399796"/>
-                            <a:chOff x="3346349" y="1855243"/>
-                            <a:chExt cx="1355191" cy="399796"/>
-                          </a:xfrm>
-                        </p:grpSpPr>
-                        <p:sp>
-                          <p:nvSpPr>
-                            <p:cNvPr id="100" name="Rectangle 99">
-                              <a:extLst>
-                                <a:ext uri="{FF2B5EF4-FFF2-40B4-BE49-F238E27FC236}">
-                                  <a16:creationId xmlns:a16="http://schemas.microsoft.com/office/drawing/2014/main" id="{C3FCE7E2-7B3B-C6BA-60E1-A1AB9C404713}"/>
-                                </a:ext>
-                              </a:extLst>
-                            </p:cNvPr>
-                            <p:cNvSpPr>
-                              <a:spLocks/>
-                            </p:cNvSpPr>
-                            <p:nvPr/>
-                          </p:nvSpPr>
-                          <p:spPr>
-                            <a:xfrm>
-                              <a:off x="3346349" y="1855243"/>
-                              <a:ext cx="677011" cy="399796"/>
-                            </a:xfrm>
-                            <a:prstGeom prst="rect">
-                              <a:avLst/>
-                            </a:prstGeom>
-                            <a:noFill/>
-                            <a:ln>
-                              <a:solidFill>
-                                <a:schemeClr val="tx1"/>
-                              </a:solidFill>
-                            </a:ln>
-                          </p:spPr>
-                          <p:style>
-                            <a:lnRef idx="2">
-                              <a:schemeClr val="accent1">
-                                <a:shade val="15000"/>
-                              </a:schemeClr>
-                            </a:lnRef>
-                            <a:fillRef idx="1">
-                              <a:schemeClr val="accent1"/>
-                            </a:fillRef>
-                            <a:effectRef idx="0">
-                              <a:schemeClr val="accent1"/>
-                            </a:effectRef>
-                            <a:fontRef idx="minor">
-                              <a:schemeClr val="lt1"/>
-                            </a:fontRef>
-                          </p:style>
-                          <p:txBody>
-                            <a:bodyPr rtlCol="0" anchor="ctr"/>
-                            <a:lstStyle/>
-                            <a:p>
-                              <a:pPr algn="ctr"/>
-                              <a:endParaRPr lang="en-CA"/>
-                            </a:p>
-                          </p:txBody>
-                        </p:sp>
-                        <p:sp>
-                          <p:nvSpPr>
-                            <p:cNvPr id="101" name="Rectangle 100">
-                              <a:extLst>
-                                <a:ext uri="{FF2B5EF4-FFF2-40B4-BE49-F238E27FC236}">
-                                  <a16:creationId xmlns:a16="http://schemas.microsoft.com/office/drawing/2014/main" id="{E13F262D-46A6-2A12-3F79-E075FD0EB4D6}"/>
-                                </a:ext>
-                              </a:extLst>
-                            </p:cNvPr>
-                            <p:cNvSpPr>
-                              <a:spLocks/>
-                            </p:cNvSpPr>
-                            <p:nvPr/>
-                          </p:nvSpPr>
-                          <p:spPr>
-                            <a:xfrm>
-                              <a:off x="4024529" y="1855243"/>
-                              <a:ext cx="677011" cy="399796"/>
-                            </a:xfrm>
-                            <a:prstGeom prst="rect">
-                              <a:avLst/>
-                            </a:prstGeom>
-                            <a:noFill/>
-                            <a:ln>
-                              <a:solidFill>
-                                <a:schemeClr val="tx1"/>
-                              </a:solidFill>
-                            </a:ln>
-                          </p:spPr>
-                          <p:style>
-                            <a:lnRef idx="2">
-                              <a:schemeClr val="accent1">
-                                <a:shade val="15000"/>
-                              </a:schemeClr>
-                            </a:lnRef>
-                            <a:fillRef idx="1">
-                              <a:schemeClr val="accent1"/>
-                            </a:fillRef>
-                            <a:effectRef idx="0">
-                              <a:schemeClr val="accent1"/>
-                            </a:effectRef>
-                            <a:fontRef idx="minor">
-                              <a:schemeClr val="lt1"/>
-                            </a:fontRef>
-                          </p:style>
-                          <p:txBody>
-                            <a:bodyPr rtlCol="0" anchor="ctr"/>
-                            <a:lstStyle/>
-                            <a:p>
-                              <a:pPr algn="ctr"/>
-                              <a:endParaRPr lang="en-CA"/>
-                            </a:p>
-                          </p:txBody>
-                        </p:sp>
-                      </p:grpSp>
-                    </p:grpSp>
-                    <p:grpSp>
-                      <p:nvGrpSpPr>
-                        <p:cNvPr id="91" name="Group 90">
-                          <a:extLst>
-                            <a:ext uri="{FF2B5EF4-FFF2-40B4-BE49-F238E27FC236}">
-                              <a16:creationId xmlns:a16="http://schemas.microsoft.com/office/drawing/2014/main" id="{DD4AC55F-43BD-0D4B-1087-E011195567AA}"/>
-                            </a:ext>
-                          </a:extLst>
-                        </p:cNvPr>
-                        <p:cNvGrpSpPr/>
-                        <p:nvPr/>
-                      </p:nvGrpSpPr>
-                      <p:grpSpPr>
-                        <a:xfrm>
-                          <a:off x="3352800" y="1866900"/>
-                          <a:ext cx="2644140" cy="382566"/>
-                          <a:chOff x="3352800" y="1866900"/>
-                          <a:chExt cx="2644140" cy="382566"/>
-                        </a:xfrm>
-                      </p:grpSpPr>
-                      <p:grpSp>
-                        <p:nvGrpSpPr>
-                          <p:cNvPr id="92" name="Group 91">
-                            <a:extLst>
-                              <a:ext uri="{FF2B5EF4-FFF2-40B4-BE49-F238E27FC236}">
-                                <a16:creationId xmlns:a16="http://schemas.microsoft.com/office/drawing/2014/main" id="{84533336-6D15-E138-FBE6-69975F6C0B08}"/>
-                              </a:ext>
-                            </a:extLst>
-                          </p:cNvPr>
-                          <p:cNvGrpSpPr/>
-                          <p:nvPr/>
-                        </p:nvGrpSpPr>
-                        <p:grpSpPr>
-                          <a:xfrm>
-                            <a:off x="3352800" y="1866900"/>
-                            <a:ext cx="1333500" cy="367326"/>
-                            <a:chOff x="3352800" y="1866900"/>
-                            <a:chExt cx="1333500" cy="367326"/>
-                          </a:xfrm>
-                        </p:grpSpPr>
-                        <p:sp>
-                          <p:nvSpPr>
-                            <p:cNvPr id="96" name="TextBox 95">
-                              <a:extLst>
-                                <a:ext uri="{FF2B5EF4-FFF2-40B4-BE49-F238E27FC236}">
-                                  <a16:creationId xmlns:a16="http://schemas.microsoft.com/office/drawing/2014/main" id="{CB8F18E3-FF9B-16E7-5F5E-24E9C2AECFBA}"/>
-                                </a:ext>
-                              </a:extLst>
-                            </p:cNvPr>
-                            <p:cNvSpPr txBox="1"/>
-                            <p:nvPr/>
-                          </p:nvSpPr>
-                          <p:spPr>
-                            <a:xfrm>
-                              <a:off x="3352800" y="1866900"/>
-                              <a:ext cx="678180" cy="367326"/>
-                            </a:xfrm>
-                            <a:prstGeom prst="rect">
-                              <a:avLst/>
-                            </a:prstGeom>
-                            <a:noFill/>
-                          </p:spPr>
-                          <p:txBody>
-                            <a:bodyPr wrap="square" rtlCol="0">
-                              <a:spAutoFit/>
-                            </a:bodyPr>
-                            <a:lstStyle/>
-                            <a:p>
-                              <a:pPr algn="ctr"/>
-                              <a:r>
-                                <a:rPr lang="en-US" dirty="0"/>
-                                <a:t>2.3</a:t>
-                              </a:r>
-                              <a:endParaRPr lang="en-CA" dirty="0"/>
-                            </a:p>
-                          </p:txBody>
-                        </p:sp>
-                        <p:sp>
-                          <p:nvSpPr>
-                            <p:cNvPr id="97" name="TextBox 96">
-                              <a:extLst>
-                                <a:ext uri="{FF2B5EF4-FFF2-40B4-BE49-F238E27FC236}">
-                                  <a16:creationId xmlns:a16="http://schemas.microsoft.com/office/drawing/2014/main" id="{F2CE7F15-C0F9-1EC5-B0CD-F03C12B58979}"/>
-                                </a:ext>
-                              </a:extLst>
-                            </p:cNvPr>
-                            <p:cNvSpPr txBox="1"/>
-                            <p:nvPr/>
-                          </p:nvSpPr>
-                          <p:spPr>
-                            <a:xfrm>
-                              <a:off x="4008120" y="1866900"/>
-                              <a:ext cx="678180" cy="367326"/>
-                            </a:xfrm>
-                            <a:prstGeom prst="rect">
-                              <a:avLst/>
-                            </a:prstGeom>
-                            <a:noFill/>
-                          </p:spPr>
-                          <p:txBody>
-                            <a:bodyPr wrap="square" rtlCol="0">
-                              <a:spAutoFit/>
-                            </a:bodyPr>
-                            <a:lstStyle/>
-                            <a:p>
-                              <a:pPr algn="ctr"/>
-                              <a:r>
-                                <a:rPr lang="en-US" dirty="0"/>
-                                <a:t>1.2</a:t>
-                              </a:r>
-                              <a:endParaRPr lang="en-CA" dirty="0"/>
-                            </a:p>
-                          </p:txBody>
-                        </p:sp>
-                      </p:grpSp>
-                      <p:grpSp>
-                        <p:nvGrpSpPr>
-                          <p:cNvPr id="93" name="Group 92">
-                            <a:extLst>
-                              <a:ext uri="{FF2B5EF4-FFF2-40B4-BE49-F238E27FC236}">
-                                <a16:creationId xmlns:a16="http://schemas.microsoft.com/office/drawing/2014/main" id="{888972DB-0DCA-A013-3401-03C5D2056C57}"/>
-                              </a:ext>
-                            </a:extLst>
-                          </p:cNvPr>
-                          <p:cNvGrpSpPr/>
-                          <p:nvPr/>
-                        </p:nvGrpSpPr>
-                        <p:grpSpPr>
-                          <a:xfrm>
-                            <a:off x="4663440" y="1882140"/>
-                            <a:ext cx="1333500" cy="367326"/>
-                            <a:chOff x="3352800" y="1866900"/>
-                            <a:chExt cx="1333500" cy="367326"/>
-                          </a:xfrm>
-                        </p:grpSpPr>
-                        <p:sp>
-                          <p:nvSpPr>
-                            <p:cNvPr id="94" name="TextBox 93">
-                              <a:extLst>
-                                <a:ext uri="{FF2B5EF4-FFF2-40B4-BE49-F238E27FC236}">
-                                  <a16:creationId xmlns:a16="http://schemas.microsoft.com/office/drawing/2014/main" id="{EE2687CA-C4E3-2044-7461-E106974CE721}"/>
-                                </a:ext>
-                              </a:extLst>
-                            </p:cNvPr>
-                            <p:cNvSpPr txBox="1"/>
-                            <p:nvPr/>
-                          </p:nvSpPr>
-                          <p:spPr>
-                            <a:xfrm>
-                              <a:off x="3352800" y="1866900"/>
-                              <a:ext cx="678180" cy="367326"/>
-                            </a:xfrm>
-                            <a:prstGeom prst="rect">
-                              <a:avLst/>
-                            </a:prstGeom>
-                            <a:noFill/>
-                          </p:spPr>
-                          <p:txBody>
-                            <a:bodyPr wrap="square" rtlCol="0">
-                              <a:spAutoFit/>
-                            </a:bodyPr>
-                            <a:lstStyle/>
-                            <a:p>
-                              <a:pPr algn="ctr"/>
-                              <a:r>
-                                <a:rPr lang="en-US" dirty="0"/>
-                                <a:t>2.0</a:t>
-                              </a:r>
-                              <a:endParaRPr lang="en-CA" dirty="0"/>
-                            </a:p>
-                          </p:txBody>
-                        </p:sp>
-                        <p:sp>
-                          <p:nvSpPr>
-                            <p:cNvPr id="95" name="TextBox 94">
-                              <a:extLst>
-                                <a:ext uri="{FF2B5EF4-FFF2-40B4-BE49-F238E27FC236}">
-                                  <a16:creationId xmlns:a16="http://schemas.microsoft.com/office/drawing/2014/main" id="{FE02A58B-459C-4BAF-A050-813277C17F0F}"/>
-                                </a:ext>
-                              </a:extLst>
-                            </p:cNvPr>
-                            <p:cNvSpPr txBox="1"/>
-                            <p:nvPr/>
-                          </p:nvSpPr>
-                          <p:spPr>
-                            <a:xfrm>
-                              <a:off x="4008120" y="1866900"/>
-                              <a:ext cx="678180" cy="367326"/>
-                            </a:xfrm>
-                            <a:prstGeom prst="rect">
-                              <a:avLst/>
-                            </a:prstGeom>
-                            <a:noFill/>
-                          </p:spPr>
-                          <p:txBody>
-                            <a:bodyPr wrap="square" rtlCol="0">
-                              <a:spAutoFit/>
-                            </a:bodyPr>
-                            <a:lstStyle/>
-                            <a:p>
-                              <a:pPr algn="ctr"/>
-                              <a:r>
-                                <a:rPr lang="en-US" dirty="0"/>
-                                <a:t>4.0</a:t>
-                              </a:r>
-                              <a:endParaRPr lang="en-CA" dirty="0"/>
-                            </a:p>
-                          </p:txBody>
-                        </p:sp>
-                      </p:grpSp>
-                    </p:grpSp>
-                  </p:grpSp>
-                  <p:sp>
-                    <p:nvSpPr>
-                      <p:cNvPr id="104" name="TextBox 103">
-                        <a:extLst>
-                          <a:ext uri="{FF2B5EF4-FFF2-40B4-BE49-F238E27FC236}">
-                            <a16:creationId xmlns:a16="http://schemas.microsoft.com/office/drawing/2014/main" id="{DAB27740-4A5A-FE22-9593-CAD7FA8B1824}"/>
-                          </a:ext>
-                        </a:extLst>
-                      </p:cNvPr>
-                      <p:cNvSpPr txBox="1"/>
-                      <p:nvPr/>
-                    </p:nvSpPr>
-                    <p:spPr>
-                      <a:xfrm>
-                        <a:off x="2727960" y="2380007"/>
-                        <a:ext cx="626009" cy="369332"/>
-                      </a:xfrm>
-                      <a:prstGeom prst="rect">
-                        <a:avLst/>
-                      </a:prstGeom>
-                      <a:noFill/>
-                    </p:spPr>
-                    <p:txBody>
-                      <a:bodyPr wrap="square" rtlCol="0">
-                        <a:spAutoFit/>
-                      </a:bodyPr>
-                      <a:lstStyle/>
-                      <a:p>
-                        <a:pPr algn="ctr"/>
-                        <a:r>
-                          <a:rPr lang="en-US" dirty="0"/>
-                          <a:t>y</a:t>
-                        </a:r>
-                        <a:endParaRPr lang="en-CA" dirty="0"/>
-                      </a:p>
-                    </p:txBody>
-                  </p:sp>
-                </p:grpSp>
-              </p:grpSp>
-            </p:grpSp>
-          </p:grpSp>
-        </p:grpSp>
-      </p:grpSp>
-      <p:cxnSp>
-        <p:nvCxnSpPr>
-          <p:cNvPr id="15" name="Straight Connector 14">
-            <a:extLst>
-              <a:ext uri="{FF2B5EF4-FFF2-40B4-BE49-F238E27FC236}">
-                <a16:creationId xmlns:a16="http://schemas.microsoft.com/office/drawing/2014/main" id="{BA1B24E4-CAD0-61BB-3BCD-F0EDBB0857EC}"/>
-              </a:ext>
-            </a:extLst>
-          </p:cNvPr>
-          <p:cNvCxnSpPr>
-            <a:cxnSpLocks/>
-          </p:cNvCxnSpPr>
-          <p:nvPr/>
-        </p:nvCxnSpPr>
-        <p:spPr>
-          <a:xfrm>
-            <a:off x="2935605" y="1924150"/>
-            <a:ext cx="3550920" cy="0"/>
-          </a:xfrm>
-          <a:prstGeom prst="line">
-            <a:avLst/>
-          </a:prstGeom>
-        </p:spPr>
-        <p:style>
-          <a:lnRef idx="1">
-            <a:schemeClr val="dk1"/>
-          </a:lnRef>
-          <a:fillRef idx="0">
-            <a:schemeClr val="dk1"/>
-          </a:fillRef>
-          <a:effectRef idx="0">
-            <a:schemeClr val="dk1"/>
-          </a:effectRef>
-          <a:fontRef idx="minor">
-            <a:schemeClr val="tx1"/>
-          </a:fontRef>
-        </p:style>
-      </p:cxnSp>
-      <p:sp>
-        <p:nvSpPr>
-          <p:cNvPr id="20" name="TextBox 19">
-            <a:extLst>
-              <a:ext uri="{FF2B5EF4-FFF2-40B4-BE49-F238E27FC236}">
-                <a16:creationId xmlns:a16="http://schemas.microsoft.com/office/drawing/2014/main" id="{7C5DA3D0-0265-C798-81AC-E7A5480D1394}"/>
-              </a:ext>
-            </a:extLst>
-          </p:cNvPr>
-          <p:cNvSpPr txBox="1">
-            <a:spLocks/>
-          </p:cNvSpPr>
-          <p:nvPr/>
-        </p:nvSpPr>
-        <p:spPr>
-          <a:xfrm>
-            <a:off x="1074533" y="1011675"/>
-            <a:ext cx="1859996" cy="369332"/>
-          </a:xfrm>
-          <a:prstGeom prst="rect">
-            <a:avLst/>
-          </a:prstGeom>
-          <a:noFill/>
-        </p:spPr>
-        <p:txBody>
-          <a:bodyPr wrap="none" rtlCol="0">
-            <a:spAutoFit/>
-          </a:bodyPr>
-          <a:lstStyle/>
-          <a:p>
-            <a:r>
-              <a:rPr lang="en-US" dirty="0"/>
-              <a:t>AR </a:t>
-            </a:r>
-            <a:r>
-              <a:rPr lang="en-US" dirty="0" err="1"/>
-              <a:t>try_to_change</a:t>
-            </a:r>
-            <a:endParaRPr lang="en-CA" dirty="0"/>
-          </a:p>
-        </p:txBody>
-      </p:sp>
-      <p:grpSp>
-        <p:nvGrpSpPr>
-          <p:cNvPr id="22" name="Group 21">
-            <a:extLst>
-              <a:ext uri="{FF2B5EF4-FFF2-40B4-BE49-F238E27FC236}">
-                <a16:creationId xmlns:a16="http://schemas.microsoft.com/office/drawing/2014/main" id="{982695A6-3335-36E6-FD3D-834F959B04CF}"/>
-              </a:ext>
-            </a:extLst>
-          </p:cNvPr>
-          <p:cNvGrpSpPr>
-            <a:grpSpLocks/>
-          </p:cNvGrpSpPr>
-          <p:nvPr/>
-        </p:nvGrpSpPr>
-        <p:grpSpPr>
-          <a:xfrm>
-            <a:off x="2905125" y="2343149"/>
-            <a:ext cx="1647396" cy="371900"/>
-            <a:chOff x="2800350" y="2916554"/>
-            <a:chExt cx="1647396" cy="371900"/>
-          </a:xfrm>
-        </p:grpSpPr>
-        <p:sp>
-          <p:nvSpPr>
-            <p:cNvPr id="71" name="Rectangle 70">
-              <a:extLst>
-                <a:ext uri="{FF2B5EF4-FFF2-40B4-BE49-F238E27FC236}">
-                  <a16:creationId xmlns:a16="http://schemas.microsoft.com/office/drawing/2014/main" id="{875740E8-BEFB-D56E-F5B2-DC442359E673}"/>
-                </a:ext>
-              </a:extLst>
-            </p:cNvPr>
-            <p:cNvSpPr>
-              <a:spLocks/>
-            </p:cNvSpPr>
-            <p:nvPr/>
-          </p:nvSpPr>
-          <p:spPr>
-            <a:xfrm>
-              <a:off x="3448049" y="2916554"/>
-              <a:ext cx="999697" cy="338609"/>
-            </a:xfrm>
-            <a:prstGeom prst="rect">
-              <a:avLst/>
-            </a:prstGeom>
-            <a:noFill/>
-            <a:ln>
-              <a:solidFill>
-                <a:schemeClr val="tx1"/>
-              </a:solidFill>
-            </a:ln>
-          </p:spPr>
-          <p:style>
-            <a:lnRef idx="2">
-              <a:schemeClr val="accent1">
-                <a:shade val="15000"/>
-              </a:schemeClr>
-            </a:lnRef>
-            <a:fillRef idx="1">
-              <a:schemeClr val="accent1"/>
-            </a:fillRef>
-            <a:effectRef idx="0">
-              <a:schemeClr val="accent1"/>
-            </a:effectRef>
-            <a:fontRef idx="minor">
-              <a:schemeClr val="lt1"/>
-            </a:fontRef>
-          </p:style>
-          <p:txBody>
-            <a:bodyPr rtlCol="0" anchor="ctr"/>
-            <a:lstStyle/>
-            <a:p>
-              <a:pPr algn="ctr"/>
-              <a:endParaRPr lang="en-CA"/>
-            </a:p>
-          </p:txBody>
-        </p:sp>
-        <p:sp>
-          <p:nvSpPr>
-            <p:cNvPr id="72" name="TextBox 71">
-              <a:extLst>
-                <a:ext uri="{FF2B5EF4-FFF2-40B4-BE49-F238E27FC236}">
-                  <a16:creationId xmlns:a16="http://schemas.microsoft.com/office/drawing/2014/main" id="{625ADCAE-8AAA-BFA4-2A54-E103F613E66F}"/>
-                </a:ext>
-              </a:extLst>
-            </p:cNvPr>
-            <p:cNvSpPr txBox="1">
-              <a:spLocks/>
-            </p:cNvSpPr>
-            <p:nvPr/>
-          </p:nvSpPr>
-          <p:spPr>
-            <a:xfrm>
-              <a:off x="2800350" y="2919122"/>
-              <a:ext cx="626009" cy="369332"/>
-            </a:xfrm>
-            <a:prstGeom prst="rect">
-              <a:avLst/>
-            </a:prstGeom>
-            <a:noFill/>
-          </p:spPr>
-          <p:txBody>
-            <a:bodyPr wrap="square" rtlCol="0">
-              <a:spAutoFit/>
-            </a:bodyPr>
-            <a:lstStyle/>
-            <a:p>
-              <a:pPr algn="ctr"/>
-              <a:r>
-                <a:rPr lang="en-US" dirty="0" err="1"/>
-                <a:t>dest</a:t>
-              </a:r>
-              <a:endParaRPr lang="en-CA" dirty="0"/>
-            </a:p>
-          </p:txBody>
-        </p:sp>
-      </p:grpSp>
-      <p:sp>
-        <p:nvSpPr>
-          <p:cNvPr id="25" name="Rectangle 24">
-            <a:extLst>
-              <a:ext uri="{FF2B5EF4-FFF2-40B4-BE49-F238E27FC236}">
-                <a16:creationId xmlns:a16="http://schemas.microsoft.com/office/drawing/2014/main" id="{24847AA7-D9EA-BC1F-621B-EE58EB859C0A}"/>
-              </a:ext>
-            </a:extLst>
-          </p:cNvPr>
-          <p:cNvSpPr>
-            <a:spLocks/>
-          </p:cNvSpPr>
-          <p:nvPr/>
-        </p:nvSpPr>
-        <p:spPr>
-          <a:xfrm>
-            <a:off x="2920165" y="736533"/>
-            <a:ext cx="3553326" cy="2294021"/>
-          </a:xfrm>
-          <a:prstGeom prst="rect">
-            <a:avLst/>
-          </a:prstGeom>
-          <a:noFill/>
-          <a:ln>
-            <a:solidFill>
-              <a:schemeClr val="tx1"/>
-            </a:solidFill>
-          </a:ln>
-        </p:spPr>
-        <p:style>
-          <a:lnRef idx="2">
-            <a:schemeClr val="accent1">
-              <a:shade val="15000"/>
-            </a:schemeClr>
-          </a:lnRef>
-          <a:fillRef idx="1">
-            <a:schemeClr val="accent1"/>
-          </a:fillRef>
-          <a:effectRef idx="0">
-            <a:schemeClr val="accent1"/>
-          </a:effectRef>
-          <a:fontRef idx="minor">
-            <a:schemeClr val="lt1"/>
-          </a:fontRef>
-        </p:style>
-        <p:txBody>
-          <a:bodyPr rtlCol="0" anchor="ctr"/>
-          <a:lstStyle/>
-          <a:p>
-            <a:pPr algn="ctr"/>
-            <a:endParaRPr lang="en-CA"/>
-          </a:p>
-        </p:txBody>
-      </p:sp>
-      <p:cxnSp>
-        <p:nvCxnSpPr>
-          <p:cNvPr id="84" name="Connector: Curved 83">
-            <a:extLst>
-              <a:ext uri="{FF2B5EF4-FFF2-40B4-BE49-F238E27FC236}">
-                <a16:creationId xmlns:a16="http://schemas.microsoft.com/office/drawing/2014/main" id="{06CC5023-9014-CF1C-002C-B1F7E1690F1E}"/>
-              </a:ext>
-            </a:extLst>
-          </p:cNvPr>
-          <p:cNvCxnSpPr>
-            <a:endCxn id="54" idx="3"/>
-          </p:cNvCxnSpPr>
-          <p:nvPr/>
-        </p:nvCxnSpPr>
-        <p:spPr>
-          <a:xfrm rot="5400000">
-            <a:off x="2785424" y="3266026"/>
-            <a:ext cx="2023653" cy="520801"/>
-          </a:xfrm>
-          <a:prstGeom prst="curvedConnector2">
-            <a:avLst/>
-          </a:prstGeom>
-          <a:ln>
-            <a:solidFill>
-              <a:srgbClr val="C00000"/>
-            </a:solidFill>
-            <a:tailEnd type="triangle"/>
-          </a:ln>
-        </p:spPr>
-        <p:style>
-          <a:lnRef idx="1">
-            <a:schemeClr val="accent1"/>
-          </a:lnRef>
-          <a:fillRef idx="0">
-            <a:schemeClr val="accent1"/>
-          </a:fillRef>
-          <a:effectRef idx="0">
-            <a:schemeClr val="accent1"/>
-          </a:effectRef>
-          <a:fontRef idx="minor">
-            <a:schemeClr val="tx1"/>
-          </a:fontRef>
-        </p:style>
-      </p:cxnSp>
-      <p:sp>
-        <p:nvSpPr>
-          <p:cNvPr id="87" name="TextBox 86">
-            <a:extLst>
-              <a:ext uri="{FF2B5EF4-FFF2-40B4-BE49-F238E27FC236}">
-                <a16:creationId xmlns:a16="http://schemas.microsoft.com/office/drawing/2014/main" id="{44153DC0-0D4D-4279-71A2-9DBDF6CC287B}"/>
-              </a:ext>
-            </a:extLst>
-          </p:cNvPr>
-          <p:cNvSpPr txBox="1"/>
-          <p:nvPr/>
-        </p:nvSpPr>
-        <p:spPr>
-          <a:xfrm>
-            <a:off x="2926080" y="1104900"/>
-            <a:ext cx="3550920" cy="369332"/>
-          </a:xfrm>
-          <a:prstGeom prst="rect">
-            <a:avLst/>
-          </a:prstGeom>
-          <a:noFill/>
-        </p:spPr>
-        <p:txBody>
-          <a:bodyPr wrap="square" rtlCol="0">
-            <a:spAutoFit/>
-          </a:bodyPr>
-          <a:lstStyle/>
-          <a:p>
-            <a:pPr algn="ctr"/>
-            <a:r>
-              <a:rPr lang="en-US" dirty="0"/>
-              <a:t>No local variables</a:t>
-            </a:r>
-            <a:endParaRPr lang="en-CA" dirty="0"/>
-          </a:p>
-        </p:txBody>
-      </p:sp>
-    </p:spTree>
-    <p:extLst>
-      <p:ext uri="{BB962C8B-B14F-4D97-AF65-F5344CB8AC3E}">
-        <p14:creationId xmlns:p14="http://schemas.microsoft.com/office/powerpoint/2010/main" val="778413885"/>
-      </p:ext>
-    </p:extLst>
-  </p:cSld>
-  <p:clrMapOvr>
-    <a:masterClrMapping/>
-  </p:clrMapOvr>
-</p:sld>
-</file>
-
-<file path=ppt/slides/slide4.xml><?xml version="1.0" encoding="utf-8"?>
-<p:sld xmlns:a="http://schemas.openxmlformats.org/drawingml/2006/main" xmlns:r="http://schemas.openxmlformats.org/officeDocument/2006/relationships" xmlns:p="http://schemas.openxmlformats.org/presentationml/2006/main">
-  <p:cSld>
-    <p:spTree>
-      <p:nvGrpSpPr>
-        <p:cNvPr id="1" name=""/>
-        <p:cNvGrpSpPr/>
-        <p:nvPr/>
-      </p:nvGrpSpPr>
-      <p:grpSpPr>
-        <a:xfrm>
-          <a:off x="0" y="0"/>
-          <a:ext cx="0" cy="0"/>
-          <a:chOff x="0" y="0"/>
-          <a:chExt cx="0" cy="0"/>
-        </a:xfrm>
-      </p:grpSpPr>
-      <p:sp>
-        <p:nvSpPr>
-          <p:cNvPr id="3" name="TextBox 2">
-            <a:extLst>
-              <a:ext uri="{FF2B5EF4-FFF2-40B4-BE49-F238E27FC236}">
-                <a16:creationId xmlns:a16="http://schemas.microsoft.com/office/drawing/2014/main" id="{3ADCEB22-761A-1882-E9D1-306234468128}"/>
-              </a:ext>
-            </a:extLst>
-          </p:cNvPr>
-          <p:cNvSpPr txBox="1"/>
-          <p:nvPr/>
-        </p:nvSpPr>
-        <p:spPr>
-          <a:xfrm>
-            <a:off x="8430126" y="363955"/>
-            <a:ext cx="855299" cy="369332"/>
-          </a:xfrm>
-          <a:prstGeom prst="rect">
-            <a:avLst/>
-          </a:prstGeom>
-          <a:noFill/>
-        </p:spPr>
-        <p:txBody>
-          <a:bodyPr wrap="none" rtlCol="0">
-            <a:spAutoFit/>
-          </a:bodyPr>
-          <a:lstStyle/>
-          <a:p>
-            <a:r>
-              <a:rPr lang="en-US" b="1" u="sng" dirty="0"/>
-              <a:t>Point 4</a:t>
-            </a:r>
-            <a:endParaRPr lang="en-CA" b="1" u="sng" dirty="0"/>
-          </a:p>
-        </p:txBody>
-      </p:sp>
-      <p:grpSp>
-        <p:nvGrpSpPr>
-          <p:cNvPr id="9" name="Group 8">
-            <a:extLst>
-              <a:ext uri="{FF2B5EF4-FFF2-40B4-BE49-F238E27FC236}">
-                <a16:creationId xmlns:a16="http://schemas.microsoft.com/office/drawing/2014/main" id="{73C1C009-E698-8BD8-4FDE-0784D383312F}"/>
-              </a:ext>
-            </a:extLst>
-          </p:cNvPr>
-          <p:cNvGrpSpPr/>
-          <p:nvPr/>
-        </p:nvGrpSpPr>
-        <p:grpSpPr>
-          <a:xfrm>
-            <a:off x="1969883" y="3536883"/>
-            <a:ext cx="4513133" cy="2294021"/>
-            <a:chOff x="1779383" y="1014663"/>
-            <a:chExt cx="4513133" cy="2294021"/>
-          </a:xfrm>
-        </p:grpSpPr>
-        <p:cxnSp>
-          <p:nvCxnSpPr>
-            <p:cNvPr id="11" name="Straight Connector 10">
-              <a:extLst>
-                <a:ext uri="{FF2B5EF4-FFF2-40B4-BE49-F238E27FC236}">
-                  <a16:creationId xmlns:a16="http://schemas.microsoft.com/office/drawing/2014/main" id="{864EEF87-5E24-8D86-29AE-FBEDA76B19C1}"/>
-                </a:ext>
-              </a:extLst>
-            </p:cNvPr>
-            <p:cNvCxnSpPr>
-              <a:cxnSpLocks/>
-            </p:cNvCxnSpPr>
-            <p:nvPr/>
-          </p:nvCxnSpPr>
-          <p:spPr>
-            <a:xfrm>
-              <a:off x="2735580" y="2859505"/>
-              <a:ext cx="3550920" cy="0"/>
-            </a:xfrm>
-            <a:prstGeom prst="line">
-              <a:avLst/>
-            </a:prstGeom>
-          </p:spPr>
-          <p:style>
-            <a:lnRef idx="1">
-              <a:schemeClr val="dk1"/>
-            </a:lnRef>
-            <a:fillRef idx="0">
-              <a:schemeClr val="dk1"/>
-            </a:fillRef>
-            <a:effectRef idx="0">
-              <a:schemeClr val="dk1"/>
-            </a:effectRef>
-            <a:fontRef idx="minor">
-              <a:schemeClr val="tx1"/>
-            </a:fontRef>
-          </p:style>
-        </p:cxnSp>
-        <p:sp>
-          <p:nvSpPr>
-            <p:cNvPr id="12" name="TextBox 11">
-              <a:extLst>
-                <a:ext uri="{FF2B5EF4-FFF2-40B4-BE49-F238E27FC236}">
-                  <a16:creationId xmlns:a16="http://schemas.microsoft.com/office/drawing/2014/main" id="{0B433080-284D-7D97-2992-FE77EE257555}"/>
-                </a:ext>
-              </a:extLst>
-            </p:cNvPr>
-            <p:cNvSpPr txBox="1"/>
-            <p:nvPr/>
-          </p:nvSpPr>
-          <p:spPr>
-            <a:xfrm>
-              <a:off x="2735580" y="2887980"/>
-              <a:ext cx="3550920" cy="369332"/>
-            </a:xfrm>
-            <a:prstGeom prst="rect">
-              <a:avLst/>
-            </a:prstGeom>
-            <a:noFill/>
-          </p:spPr>
-          <p:txBody>
-            <a:bodyPr wrap="square" rtlCol="0">
-              <a:spAutoFit/>
-            </a:bodyPr>
-            <a:lstStyle/>
-            <a:p>
-              <a:pPr algn="ctr"/>
-              <a:r>
-                <a:rPr lang="en-US" dirty="0"/>
-                <a:t>No arguments</a:t>
-              </a:r>
-              <a:endParaRPr lang="en-CA" dirty="0"/>
-            </a:p>
-          </p:txBody>
-        </p:sp>
-        <p:grpSp>
-          <p:nvGrpSpPr>
-            <p:cNvPr id="6" name="Group 5">
-              <a:extLst>
-                <a:ext uri="{FF2B5EF4-FFF2-40B4-BE49-F238E27FC236}">
-                  <a16:creationId xmlns:a16="http://schemas.microsoft.com/office/drawing/2014/main" id="{A95CEE77-1F0F-1BC3-1B78-D2E3E07CD948}"/>
-                </a:ext>
-              </a:extLst>
-            </p:cNvPr>
-            <p:cNvGrpSpPr/>
-            <p:nvPr/>
-          </p:nvGrpSpPr>
-          <p:grpSpPr>
-            <a:xfrm>
-              <a:off x="1779383" y="1014663"/>
-              <a:ext cx="4513133" cy="2294021"/>
-              <a:chOff x="1779383" y="1014663"/>
-              <a:chExt cx="4513133" cy="2294021"/>
-            </a:xfrm>
-          </p:grpSpPr>
-          <p:sp>
-            <p:nvSpPr>
-              <p:cNvPr id="13" name="TextBox 12">
-                <a:extLst>
-                  <a:ext uri="{FF2B5EF4-FFF2-40B4-BE49-F238E27FC236}">
-                    <a16:creationId xmlns:a16="http://schemas.microsoft.com/office/drawing/2014/main" id="{2BEB660A-F17F-EBD5-09C5-DB7ABA245FA4}"/>
-                  </a:ext>
-                </a:extLst>
-              </p:cNvPr>
-              <p:cNvSpPr txBox="1"/>
-              <p:nvPr/>
-            </p:nvSpPr>
-            <p:spPr>
-              <a:xfrm>
-                <a:off x="1779383" y="1261230"/>
-                <a:ext cx="965329" cy="369332"/>
-              </a:xfrm>
-              <a:prstGeom prst="rect">
-                <a:avLst/>
-              </a:prstGeom>
-              <a:noFill/>
-            </p:spPr>
-            <p:txBody>
-              <a:bodyPr wrap="none" rtlCol="0">
-                <a:spAutoFit/>
-              </a:bodyPr>
-              <a:lstStyle/>
-              <a:p>
-                <a:r>
-                  <a:rPr lang="en-US" dirty="0"/>
-                  <a:t>AR main</a:t>
-                </a:r>
-                <a:endParaRPr lang="en-CA" dirty="0"/>
-              </a:p>
-            </p:txBody>
-          </p:sp>
-          <p:grpSp>
-            <p:nvGrpSpPr>
-              <p:cNvPr id="5" name="Group 4">
-                <a:extLst>
-                  <a:ext uri="{FF2B5EF4-FFF2-40B4-BE49-F238E27FC236}">
-                    <a16:creationId xmlns:a16="http://schemas.microsoft.com/office/drawing/2014/main" id="{DA34308E-8370-4584-0279-57BBBBD6E06B}"/>
-                  </a:ext>
-                </a:extLst>
-              </p:cNvPr>
-              <p:cNvGrpSpPr/>
-              <p:nvPr/>
-            </p:nvGrpSpPr>
-            <p:grpSpPr>
-              <a:xfrm>
-                <a:off x="2720340" y="1014663"/>
-                <a:ext cx="3572176" cy="2294021"/>
-                <a:chOff x="2720340" y="1014663"/>
-                <a:chExt cx="3572176" cy="2294021"/>
-              </a:xfrm>
-            </p:grpSpPr>
-            <p:grpSp>
-              <p:nvGrpSpPr>
-                <p:cNvPr id="50" name="Group 49">
-                  <a:extLst>
-                    <a:ext uri="{FF2B5EF4-FFF2-40B4-BE49-F238E27FC236}">
-                      <a16:creationId xmlns:a16="http://schemas.microsoft.com/office/drawing/2014/main" id="{9CD3C0BA-0025-4662-55E9-9D96917EF836}"/>
-                    </a:ext>
-                  </a:extLst>
-                </p:cNvPr>
-                <p:cNvGrpSpPr/>
-                <p:nvPr/>
-              </p:nvGrpSpPr>
-              <p:grpSpPr>
-                <a:xfrm>
-                  <a:off x="2743200" y="1245643"/>
-                  <a:ext cx="1937084" cy="652935"/>
-                  <a:chOff x="2743200" y="1245643"/>
-                  <a:chExt cx="1937084" cy="652935"/>
-                </a:xfrm>
-              </p:grpSpPr>
-              <p:sp>
-                <p:nvSpPr>
-                  <p:cNvPr id="18" name="Rectangle 17">
-                    <a:extLst>
-                      <a:ext uri="{FF2B5EF4-FFF2-40B4-BE49-F238E27FC236}">
-                        <a16:creationId xmlns:a16="http://schemas.microsoft.com/office/drawing/2014/main" id="{FC31BB81-2776-1BE2-99DF-39E86F15E699}"/>
-                      </a:ext>
-                    </a:extLst>
-                  </p:cNvPr>
-                  <p:cNvSpPr/>
-                  <p:nvPr/>
-                </p:nvSpPr>
-                <p:spPr>
-                  <a:xfrm>
-                    <a:off x="3369209" y="1245643"/>
-                    <a:ext cx="1307138" cy="399796"/>
-                  </a:xfrm>
-                  <a:prstGeom prst="rect">
-                    <a:avLst/>
-                  </a:prstGeom>
-                  <a:noFill/>
-                  <a:ln>
-                    <a:solidFill>
-                      <a:schemeClr val="tx1"/>
-                    </a:solidFill>
-                  </a:ln>
-                </p:spPr>
-                <p:style>
-                  <a:lnRef idx="2">
-                    <a:schemeClr val="accent1">
-                      <a:shade val="15000"/>
-                    </a:schemeClr>
-                  </a:lnRef>
-                  <a:fillRef idx="1">
-                    <a:schemeClr val="accent1"/>
-                  </a:fillRef>
-                  <a:effectRef idx="0">
-                    <a:schemeClr val="accent1"/>
-                  </a:effectRef>
-                  <a:fontRef idx="minor">
-                    <a:schemeClr val="lt1"/>
-                  </a:fontRef>
-                </p:style>
-                <p:txBody>
-                  <a:bodyPr rtlCol="0" anchor="ctr"/>
-                  <a:lstStyle/>
-                  <a:p>
-                    <a:pPr algn="ctr"/>
-                    <a:endParaRPr lang="en-CA"/>
-                  </a:p>
-                </p:txBody>
-              </p:sp>
-              <p:sp>
-                <p:nvSpPr>
-                  <p:cNvPr id="17" name="TextBox 16">
-                    <a:extLst>
-                      <a:ext uri="{FF2B5EF4-FFF2-40B4-BE49-F238E27FC236}">
-                        <a16:creationId xmlns:a16="http://schemas.microsoft.com/office/drawing/2014/main" id="{555E3565-737B-CA0F-1EE4-D4AFC2471ADC}"/>
-                      </a:ext>
-                    </a:extLst>
-                  </p:cNvPr>
-                  <p:cNvSpPr txBox="1"/>
-                  <p:nvPr/>
-                </p:nvSpPr>
-                <p:spPr>
-                  <a:xfrm>
-                    <a:off x="2743200" y="1252247"/>
-                    <a:ext cx="626009" cy="646331"/>
-                  </a:xfrm>
-                  <a:prstGeom prst="rect">
-                    <a:avLst/>
-                  </a:prstGeom>
-                  <a:noFill/>
-                </p:spPr>
-                <p:txBody>
-                  <a:bodyPr wrap="square" rtlCol="0">
-                    <a:spAutoFit/>
-                  </a:bodyPr>
-                  <a:lstStyle/>
-                  <a:p>
-                    <a:pPr algn="ctr"/>
-                    <a:r>
-                      <a:rPr lang="en-US" dirty="0"/>
-                      <a:t>sum</a:t>
-                    </a:r>
-                    <a:endParaRPr lang="en-CA" dirty="0"/>
-                  </a:p>
-                </p:txBody>
-              </p:sp>
-              <p:sp>
-                <p:nvSpPr>
-                  <p:cNvPr id="24" name="TextBox 23">
-                    <a:extLst>
-                      <a:ext uri="{FF2B5EF4-FFF2-40B4-BE49-F238E27FC236}">
-                        <a16:creationId xmlns:a16="http://schemas.microsoft.com/office/drawing/2014/main" id="{36380628-3A09-5297-36B5-2B0244A5BE5C}"/>
-                      </a:ext>
-                    </a:extLst>
-                  </p:cNvPr>
-                  <p:cNvSpPr txBox="1"/>
-                  <p:nvPr/>
-                </p:nvSpPr>
-                <p:spPr>
-                  <a:xfrm>
-                    <a:off x="3381020" y="1270535"/>
-                    <a:ext cx="1299264" cy="369332"/>
-                  </a:xfrm>
-                  <a:prstGeom prst="rect">
-                    <a:avLst/>
-                  </a:prstGeom>
-                  <a:noFill/>
-                </p:spPr>
-                <p:txBody>
-                  <a:bodyPr wrap="square" rtlCol="0">
-                    <a:spAutoFit/>
-                  </a:bodyPr>
-                  <a:lstStyle/>
-                  <a:p>
-                    <a:pPr algn="ctr"/>
-                    <a:r>
-                      <a:rPr lang="en-US" dirty="0"/>
-                      <a:t>0</a:t>
-                    </a:r>
-                    <a:endParaRPr lang="en-CA" dirty="0"/>
-                  </a:p>
-                </p:txBody>
-              </p:sp>
-            </p:grpSp>
-            <p:grpSp>
-              <p:nvGrpSpPr>
-                <p:cNvPr id="4" name="Group 3">
-                  <a:extLst>
-                    <a:ext uri="{FF2B5EF4-FFF2-40B4-BE49-F238E27FC236}">
-                      <a16:creationId xmlns:a16="http://schemas.microsoft.com/office/drawing/2014/main" id="{01E1524F-D215-531C-44D7-023B2BEE35FE}"/>
-                    </a:ext>
-                  </a:extLst>
-                </p:cNvPr>
-                <p:cNvGrpSpPr/>
-                <p:nvPr/>
-              </p:nvGrpSpPr>
-              <p:grpSpPr>
-                <a:xfrm>
-                  <a:off x="2720340" y="1014663"/>
-                  <a:ext cx="3572176" cy="2294021"/>
-                  <a:chOff x="2720340" y="1014663"/>
-                  <a:chExt cx="3572176" cy="2294021"/>
-                </a:xfrm>
-              </p:grpSpPr>
-              <p:sp>
-                <p:nvSpPr>
-                  <p:cNvPr id="10" name="Rectangle 9">
-                    <a:extLst>
-                      <a:ext uri="{FF2B5EF4-FFF2-40B4-BE49-F238E27FC236}">
-                        <a16:creationId xmlns:a16="http://schemas.microsoft.com/office/drawing/2014/main" id="{9C9B4144-BA02-7272-481D-121FB6A4802E}"/>
-                      </a:ext>
-                    </a:extLst>
-                  </p:cNvPr>
-                  <p:cNvSpPr/>
-                  <p:nvPr/>
-                </p:nvSpPr>
-                <p:spPr>
-                  <a:xfrm>
-                    <a:off x="2739190" y="1014663"/>
-                    <a:ext cx="3553326" cy="2294021"/>
-                  </a:xfrm>
-                  <a:prstGeom prst="rect">
-                    <a:avLst/>
-                  </a:prstGeom>
-                  <a:noFill/>
-                  <a:ln>
-                    <a:solidFill>
-                      <a:schemeClr val="tx1"/>
-                    </a:solidFill>
-                  </a:ln>
-                </p:spPr>
-                <p:style>
-                  <a:lnRef idx="2">
-                    <a:schemeClr val="accent1">
-                      <a:shade val="15000"/>
-                    </a:schemeClr>
-                  </a:lnRef>
-                  <a:fillRef idx="1">
-                    <a:schemeClr val="accent1"/>
-                  </a:fillRef>
-                  <a:effectRef idx="0">
-                    <a:schemeClr val="accent1"/>
-                  </a:effectRef>
-                  <a:fontRef idx="minor">
-                    <a:schemeClr val="lt1"/>
-                  </a:fontRef>
-                </p:style>
-                <p:txBody>
-                  <a:bodyPr rtlCol="0" anchor="ctr"/>
-                  <a:lstStyle/>
-                  <a:p>
-                    <a:pPr algn="ctr"/>
-                    <a:endParaRPr lang="en-CA"/>
-                  </a:p>
-                </p:txBody>
-              </p:sp>
-              <p:grpSp>
-                <p:nvGrpSpPr>
-                  <p:cNvPr id="2" name="Group 1">
-                    <a:extLst>
-                      <a:ext uri="{FF2B5EF4-FFF2-40B4-BE49-F238E27FC236}">
-                        <a16:creationId xmlns:a16="http://schemas.microsoft.com/office/drawing/2014/main" id="{D713AC0C-1A63-777A-9A52-DA2261A60D21}"/>
-                      </a:ext>
-                    </a:extLst>
-                  </p:cNvPr>
-                  <p:cNvGrpSpPr/>
-                  <p:nvPr/>
-                </p:nvGrpSpPr>
-                <p:grpSpPr>
-                  <a:xfrm>
-                    <a:off x="2720340" y="1824763"/>
-                    <a:ext cx="3345180" cy="940816"/>
-                    <a:chOff x="2720340" y="1824763"/>
-                    <a:chExt cx="3345180" cy="940816"/>
-                  </a:xfrm>
-                </p:grpSpPr>
-                <p:grpSp>
-                  <p:nvGrpSpPr>
-                    <p:cNvPr id="106" name="Group 105">
-                      <a:extLst>
-                        <a:ext uri="{FF2B5EF4-FFF2-40B4-BE49-F238E27FC236}">
-                          <a16:creationId xmlns:a16="http://schemas.microsoft.com/office/drawing/2014/main" id="{15DAE353-9425-CC7A-9CBB-6CCA743E0549}"/>
-                        </a:ext>
-                      </a:extLst>
-                    </p:cNvPr>
-                    <p:cNvGrpSpPr/>
-                    <p:nvPr/>
-                  </p:nvGrpSpPr>
-                  <p:grpSpPr>
-                    <a:xfrm>
-                      <a:off x="2720340" y="1824763"/>
-                      <a:ext cx="3337560" cy="399796"/>
-                      <a:chOff x="2720340" y="1855243"/>
-                      <a:chExt cx="3337560" cy="399796"/>
-                    </a:xfrm>
-                  </p:grpSpPr>
-                  <p:sp>
-                    <p:nvSpPr>
-                      <p:cNvPr id="54" name="TextBox 53">
-                        <a:extLst>
-                          <a:ext uri="{FF2B5EF4-FFF2-40B4-BE49-F238E27FC236}">
-                            <a16:creationId xmlns:a16="http://schemas.microsoft.com/office/drawing/2014/main" id="{EA81B028-EFCE-85B2-4E1F-0A1E56A8D6F3}"/>
-                          </a:ext>
-                        </a:extLst>
-                      </p:cNvPr>
-                      <p:cNvSpPr txBox="1"/>
-                      <p:nvPr/>
-                    </p:nvSpPr>
-                    <p:spPr>
-                      <a:xfrm>
-                        <a:off x="2720340" y="1861847"/>
-                        <a:ext cx="626009" cy="369332"/>
-                      </a:xfrm>
-                      <a:prstGeom prst="rect">
-                        <a:avLst/>
-                      </a:prstGeom>
-                      <a:noFill/>
-                    </p:spPr>
-                    <p:txBody>
-                      <a:bodyPr wrap="square" rtlCol="0">
-                        <a:spAutoFit/>
-                      </a:bodyPr>
-                      <a:lstStyle/>
-                      <a:p>
-                        <a:pPr algn="ctr"/>
-                        <a:r>
-                          <a:rPr lang="en-US" dirty="0"/>
-                          <a:t>x</a:t>
-                        </a:r>
-                        <a:endParaRPr lang="en-CA" dirty="0"/>
-                      </a:p>
-                    </p:txBody>
-                  </p:sp>
-                  <p:grpSp>
-                    <p:nvGrpSpPr>
-                      <p:cNvPr id="88" name="Group 87">
-                        <a:extLst>
-                          <a:ext uri="{FF2B5EF4-FFF2-40B4-BE49-F238E27FC236}">
-                            <a16:creationId xmlns:a16="http://schemas.microsoft.com/office/drawing/2014/main" id="{4C4B189A-1612-E6C8-E6E3-92BB9F93B414}"/>
-                          </a:ext>
-                        </a:extLst>
-                      </p:cNvPr>
-                      <p:cNvGrpSpPr/>
-                      <p:nvPr/>
-                    </p:nvGrpSpPr>
-                    <p:grpSpPr>
-                      <a:xfrm>
-                        <a:off x="3346349" y="1855243"/>
-                        <a:ext cx="2711551" cy="399796"/>
-                        <a:chOff x="3346349" y="1855243"/>
-                        <a:chExt cx="2711551" cy="399796"/>
-                      </a:xfrm>
-                    </p:grpSpPr>
-                    <p:grpSp>
-                      <p:nvGrpSpPr>
-                        <p:cNvPr id="66" name="Group 65">
-                          <a:extLst>
-                            <a:ext uri="{FF2B5EF4-FFF2-40B4-BE49-F238E27FC236}">
-                              <a16:creationId xmlns:a16="http://schemas.microsoft.com/office/drawing/2014/main" id="{C96C39AF-92BA-D971-5EEC-CD6ED77CBEED}"/>
-                            </a:ext>
-                          </a:extLst>
-                        </p:cNvPr>
-                        <p:cNvGrpSpPr>
-                          <a:grpSpLocks/>
-                        </p:cNvGrpSpPr>
-                        <p:nvPr/>
-                      </p:nvGrpSpPr>
-                      <p:grpSpPr>
-                        <a:xfrm>
-                          <a:off x="3346349" y="1855243"/>
-                          <a:ext cx="2711551" cy="399796"/>
-                          <a:chOff x="3346349" y="1855243"/>
-                          <a:chExt cx="2711551" cy="399796"/>
-                        </a:xfrm>
-                      </p:grpSpPr>
-                      <p:grpSp>
-                        <p:nvGrpSpPr>
-                          <p:cNvPr id="62" name="Group 61">
-                            <a:extLst>
-                              <a:ext uri="{FF2B5EF4-FFF2-40B4-BE49-F238E27FC236}">
-                                <a16:creationId xmlns:a16="http://schemas.microsoft.com/office/drawing/2014/main" id="{DC567CBB-1B67-BBBB-BA75-0301EE40C2C4}"/>
-                              </a:ext>
-                            </a:extLst>
-                          </p:cNvPr>
-                          <p:cNvGrpSpPr>
-                            <a:grpSpLocks/>
-                          </p:cNvGrpSpPr>
-                          <p:nvPr/>
-                        </p:nvGrpSpPr>
-                        <p:grpSpPr>
-                          <a:xfrm>
-                            <a:off x="3346349" y="1855243"/>
-                            <a:ext cx="1355191" cy="399796"/>
-                            <a:chOff x="3346349" y="1855243"/>
-                            <a:chExt cx="1355191" cy="399796"/>
-                          </a:xfrm>
-                        </p:grpSpPr>
-                        <p:sp>
-                          <p:nvSpPr>
-                            <p:cNvPr id="52" name="Rectangle 51">
-                              <a:extLst>
-                                <a:ext uri="{FF2B5EF4-FFF2-40B4-BE49-F238E27FC236}">
-                                  <a16:creationId xmlns:a16="http://schemas.microsoft.com/office/drawing/2014/main" id="{6DDE8478-9C69-4522-7017-BE5CD0822E9C}"/>
-                                </a:ext>
-                              </a:extLst>
-                            </p:cNvPr>
-                            <p:cNvSpPr>
-                              <a:spLocks/>
-                            </p:cNvSpPr>
-                            <p:nvPr/>
-                          </p:nvSpPr>
-                          <p:spPr>
-                            <a:xfrm>
-                              <a:off x="3346349" y="1855243"/>
-                              <a:ext cx="677011" cy="399796"/>
-                            </a:xfrm>
-                            <a:prstGeom prst="rect">
-                              <a:avLst/>
-                            </a:prstGeom>
-                            <a:noFill/>
-                            <a:ln>
-                              <a:solidFill>
-                                <a:schemeClr val="tx1"/>
-                              </a:solidFill>
-                            </a:ln>
-                          </p:spPr>
-                          <p:style>
-                            <a:lnRef idx="2">
-                              <a:schemeClr val="accent1">
-                                <a:shade val="15000"/>
-                              </a:schemeClr>
-                            </a:lnRef>
-                            <a:fillRef idx="1">
-                              <a:schemeClr val="accent1"/>
-                            </a:fillRef>
-                            <a:effectRef idx="0">
-                              <a:schemeClr val="accent1"/>
-                            </a:effectRef>
-                            <a:fontRef idx="minor">
-                              <a:schemeClr val="lt1"/>
-                            </a:fontRef>
-                          </p:style>
-                          <p:txBody>
-                            <a:bodyPr rtlCol="0" anchor="ctr"/>
-                            <a:lstStyle/>
-                            <a:p>
-                              <a:pPr algn="ctr"/>
-                              <a:endParaRPr lang="en-CA"/>
-                            </a:p>
-                          </p:txBody>
-                        </p:sp>
-                        <p:sp>
-                          <p:nvSpPr>
-                            <p:cNvPr id="59" name="Rectangle 58">
-                              <a:extLst>
-                                <a:ext uri="{FF2B5EF4-FFF2-40B4-BE49-F238E27FC236}">
-                                  <a16:creationId xmlns:a16="http://schemas.microsoft.com/office/drawing/2014/main" id="{B1EAB6AC-6700-ABEB-2C15-4408E6DA81AB}"/>
-                                </a:ext>
-                              </a:extLst>
-                            </p:cNvPr>
-                            <p:cNvSpPr>
-                              <a:spLocks/>
-                            </p:cNvSpPr>
-                            <p:nvPr/>
-                          </p:nvSpPr>
-                          <p:spPr>
-                            <a:xfrm>
-                              <a:off x="4024529" y="1855243"/>
-                              <a:ext cx="677011" cy="399796"/>
-                            </a:xfrm>
-                            <a:prstGeom prst="rect">
-                              <a:avLst/>
-                            </a:prstGeom>
-                            <a:noFill/>
-                            <a:ln>
-                              <a:solidFill>
-                                <a:schemeClr val="tx1"/>
-                              </a:solidFill>
-                            </a:ln>
-                          </p:spPr>
-                          <p:style>
-                            <a:lnRef idx="2">
-                              <a:schemeClr val="accent1">
-                                <a:shade val="15000"/>
-                              </a:schemeClr>
-                            </a:lnRef>
-                            <a:fillRef idx="1">
-                              <a:schemeClr val="accent1"/>
-                            </a:fillRef>
-                            <a:effectRef idx="0">
-                              <a:schemeClr val="accent1"/>
-                            </a:effectRef>
-                            <a:fontRef idx="minor">
-                              <a:schemeClr val="lt1"/>
-                            </a:fontRef>
-                          </p:style>
-                          <p:txBody>
-                            <a:bodyPr rtlCol="0" anchor="ctr"/>
-                            <a:lstStyle/>
-                            <a:p>
-                              <a:pPr algn="ctr"/>
-                              <a:endParaRPr lang="en-CA"/>
-                            </a:p>
-                          </p:txBody>
-                        </p:sp>
-                      </p:grpSp>
-                      <p:grpSp>
-                        <p:nvGrpSpPr>
-                          <p:cNvPr id="63" name="Group 62">
-                            <a:extLst>
-                              <a:ext uri="{FF2B5EF4-FFF2-40B4-BE49-F238E27FC236}">
-                                <a16:creationId xmlns:a16="http://schemas.microsoft.com/office/drawing/2014/main" id="{59D693B3-E636-1D39-1EDA-440FE1E87390}"/>
-                              </a:ext>
-                            </a:extLst>
-                          </p:cNvPr>
-                          <p:cNvGrpSpPr>
-                            <a:grpSpLocks/>
-                          </p:cNvGrpSpPr>
-                          <p:nvPr/>
-                        </p:nvGrpSpPr>
-                        <p:grpSpPr>
-                          <a:xfrm>
-                            <a:off x="4702709" y="1855243"/>
-                            <a:ext cx="1355191" cy="399796"/>
-                            <a:chOff x="3346349" y="1855243"/>
-                            <a:chExt cx="1355191" cy="399796"/>
-                          </a:xfrm>
-                        </p:grpSpPr>
-                        <p:sp>
-                          <p:nvSpPr>
-                            <p:cNvPr id="64" name="Rectangle 63">
-                              <a:extLst>
-                                <a:ext uri="{FF2B5EF4-FFF2-40B4-BE49-F238E27FC236}">
-                                  <a16:creationId xmlns:a16="http://schemas.microsoft.com/office/drawing/2014/main" id="{E1EF94C3-F7C2-A46C-D6D5-C1B4C63357BA}"/>
-                                </a:ext>
-                              </a:extLst>
-                            </p:cNvPr>
-                            <p:cNvSpPr>
-                              <a:spLocks/>
-                            </p:cNvSpPr>
-                            <p:nvPr/>
-                          </p:nvSpPr>
-                          <p:spPr>
-                            <a:xfrm>
-                              <a:off x="3346349" y="1855243"/>
-                              <a:ext cx="677011" cy="399796"/>
-                            </a:xfrm>
-                            <a:prstGeom prst="rect">
-                              <a:avLst/>
-                            </a:prstGeom>
-                            <a:noFill/>
-                            <a:ln>
-                              <a:solidFill>
-                                <a:schemeClr val="tx1"/>
-                              </a:solidFill>
-                            </a:ln>
-                          </p:spPr>
-                          <p:style>
-                            <a:lnRef idx="2">
-                              <a:schemeClr val="accent1">
-                                <a:shade val="15000"/>
-                              </a:schemeClr>
-                            </a:lnRef>
-                            <a:fillRef idx="1">
-                              <a:schemeClr val="accent1"/>
-                            </a:fillRef>
-                            <a:effectRef idx="0">
-                              <a:schemeClr val="accent1"/>
-                            </a:effectRef>
-                            <a:fontRef idx="minor">
-                              <a:schemeClr val="lt1"/>
-                            </a:fontRef>
-                          </p:style>
-                          <p:txBody>
-                            <a:bodyPr rtlCol="0" anchor="ctr"/>
-                            <a:lstStyle/>
-                            <a:p>
-                              <a:pPr algn="ctr"/>
-                              <a:endParaRPr lang="en-CA"/>
-                            </a:p>
-                          </p:txBody>
-                        </p:sp>
-                        <p:sp>
-                          <p:nvSpPr>
-                            <p:cNvPr id="65" name="Rectangle 64">
-                              <a:extLst>
-                                <a:ext uri="{FF2B5EF4-FFF2-40B4-BE49-F238E27FC236}">
-                                  <a16:creationId xmlns:a16="http://schemas.microsoft.com/office/drawing/2014/main" id="{1BE12BC7-95FD-DECD-8324-26DFDF580A46}"/>
-                                </a:ext>
-                              </a:extLst>
-                            </p:cNvPr>
-                            <p:cNvSpPr>
-                              <a:spLocks/>
-                            </p:cNvSpPr>
-                            <p:nvPr/>
-                          </p:nvSpPr>
-                          <p:spPr>
-                            <a:xfrm>
-                              <a:off x="4024529" y="1855243"/>
-                              <a:ext cx="677011" cy="399796"/>
-                            </a:xfrm>
-                            <a:prstGeom prst="rect">
-                              <a:avLst/>
-                            </a:prstGeom>
-                            <a:noFill/>
-                            <a:ln>
-                              <a:solidFill>
-                                <a:schemeClr val="tx1"/>
-                              </a:solidFill>
-                            </a:ln>
-                          </p:spPr>
-                          <p:style>
-                            <a:lnRef idx="2">
-                              <a:schemeClr val="accent1">
-                                <a:shade val="15000"/>
-                              </a:schemeClr>
-                            </a:lnRef>
-                            <a:fillRef idx="1">
-                              <a:schemeClr val="accent1"/>
-                            </a:fillRef>
-                            <a:effectRef idx="0">
-                              <a:schemeClr val="accent1"/>
-                            </a:effectRef>
-                            <a:fontRef idx="minor">
-                              <a:schemeClr val="lt1"/>
-                            </a:fontRef>
-                          </p:style>
-                          <p:txBody>
-                            <a:bodyPr rtlCol="0" anchor="ctr"/>
-                            <a:lstStyle/>
-                            <a:p>
-                              <a:pPr algn="ctr"/>
-                              <a:endParaRPr lang="en-CA"/>
-                            </a:p>
-                          </p:txBody>
-                        </p:sp>
-                      </p:grpSp>
-                    </p:grpSp>
-                    <p:grpSp>
-                      <p:nvGrpSpPr>
-                        <p:cNvPr id="79" name="Group 78">
-                          <a:extLst>
-                            <a:ext uri="{FF2B5EF4-FFF2-40B4-BE49-F238E27FC236}">
-                              <a16:creationId xmlns:a16="http://schemas.microsoft.com/office/drawing/2014/main" id="{669565BC-47CE-12FF-74FC-6D02FD43E72F}"/>
-                            </a:ext>
-                          </a:extLst>
-                        </p:cNvPr>
-                        <p:cNvGrpSpPr/>
-                        <p:nvPr/>
-                      </p:nvGrpSpPr>
-                      <p:grpSpPr>
-                        <a:xfrm>
-                          <a:off x="3352800" y="1866900"/>
-                          <a:ext cx="2644140" cy="382566"/>
-                          <a:chOff x="3352800" y="1866900"/>
-                          <a:chExt cx="2644140" cy="382566"/>
-                        </a:xfrm>
-                      </p:grpSpPr>
-                      <p:grpSp>
-                        <p:nvGrpSpPr>
-                          <p:cNvPr id="75" name="Group 74">
-                            <a:extLst>
-                              <a:ext uri="{FF2B5EF4-FFF2-40B4-BE49-F238E27FC236}">
-                                <a16:creationId xmlns:a16="http://schemas.microsoft.com/office/drawing/2014/main" id="{3EE208CC-441B-744B-C420-3604F52B7670}"/>
-                              </a:ext>
-                            </a:extLst>
-                          </p:cNvPr>
-                          <p:cNvGrpSpPr/>
-                          <p:nvPr/>
-                        </p:nvGrpSpPr>
-                        <p:grpSpPr>
-                          <a:xfrm>
-                            <a:off x="3352800" y="1866900"/>
-                            <a:ext cx="1333500" cy="367326"/>
-                            <a:chOff x="3352800" y="1866900"/>
-                            <a:chExt cx="1333500" cy="367326"/>
-                          </a:xfrm>
-                        </p:grpSpPr>
-                        <p:sp>
-                          <p:nvSpPr>
-                            <p:cNvPr id="56" name="TextBox 55">
-                              <a:extLst>
-                                <a:ext uri="{FF2B5EF4-FFF2-40B4-BE49-F238E27FC236}">
-                                  <a16:creationId xmlns:a16="http://schemas.microsoft.com/office/drawing/2014/main" id="{D8CAEC3B-F62A-D71B-5265-C39697F8DB94}"/>
-                                </a:ext>
-                              </a:extLst>
-                            </p:cNvPr>
-                            <p:cNvSpPr txBox="1"/>
-                            <p:nvPr/>
-                          </p:nvSpPr>
-                          <p:spPr>
-                            <a:xfrm>
-                              <a:off x="3352800" y="1866900"/>
-                              <a:ext cx="678180" cy="367326"/>
-                            </a:xfrm>
-                            <a:prstGeom prst="rect">
-                              <a:avLst/>
-                            </a:prstGeom>
-                            <a:noFill/>
-                          </p:spPr>
-                          <p:txBody>
-                            <a:bodyPr wrap="square" rtlCol="0">
-                              <a:spAutoFit/>
-                            </a:bodyPr>
-                            <a:lstStyle/>
-                            <a:p>
-                              <a:pPr algn="ctr"/>
-                              <a:r>
-                                <a:rPr lang="en-US" dirty="0"/>
-                                <a:t>\0</a:t>
-                              </a:r>
-                              <a:endParaRPr lang="en-CA" dirty="0"/>
-                            </a:p>
-                          </p:txBody>
-                        </p:sp>
-                        <p:sp>
-                          <p:nvSpPr>
-                            <p:cNvPr id="74" name="TextBox 73">
-                              <a:extLst>
-                                <a:ext uri="{FF2B5EF4-FFF2-40B4-BE49-F238E27FC236}">
-                                  <a16:creationId xmlns:a16="http://schemas.microsoft.com/office/drawing/2014/main" id="{D96810D0-B22E-D09B-308D-AE920BE25A3B}"/>
-                                </a:ext>
-                              </a:extLst>
-                            </p:cNvPr>
-                            <p:cNvSpPr txBox="1"/>
-                            <p:nvPr/>
-                          </p:nvSpPr>
-                          <p:spPr>
-                            <a:xfrm>
-                              <a:off x="4008120" y="1866900"/>
-                              <a:ext cx="678180" cy="367326"/>
-                            </a:xfrm>
-                            <a:prstGeom prst="rect">
-                              <a:avLst/>
-                            </a:prstGeom>
-                            <a:noFill/>
-                          </p:spPr>
-                          <p:txBody>
-                            <a:bodyPr wrap="square" rtlCol="0">
-                              <a:spAutoFit/>
-                            </a:bodyPr>
-                            <a:lstStyle/>
-                            <a:p>
-                              <a:pPr algn="ctr"/>
-                              <a:r>
-                                <a:rPr lang="en-US" dirty="0"/>
-                                <a:t>\0</a:t>
-                              </a:r>
-                              <a:endParaRPr lang="en-CA" dirty="0"/>
-                            </a:p>
-                          </p:txBody>
-                        </p:sp>
-                      </p:grpSp>
-                      <p:grpSp>
-                        <p:nvGrpSpPr>
-                          <p:cNvPr id="76" name="Group 75">
-                            <a:extLst>
-                              <a:ext uri="{FF2B5EF4-FFF2-40B4-BE49-F238E27FC236}">
-                                <a16:creationId xmlns:a16="http://schemas.microsoft.com/office/drawing/2014/main" id="{8B549F91-E211-799E-D072-F4E7E6EBB3B7}"/>
-                              </a:ext>
-                            </a:extLst>
-                          </p:cNvPr>
-                          <p:cNvGrpSpPr/>
-                          <p:nvPr/>
-                        </p:nvGrpSpPr>
-                        <p:grpSpPr>
-                          <a:xfrm>
-                            <a:off x="4663440" y="1882140"/>
-                            <a:ext cx="1333500" cy="367326"/>
-                            <a:chOff x="3352800" y="1866900"/>
-                            <a:chExt cx="1333500" cy="367326"/>
-                          </a:xfrm>
-                        </p:grpSpPr>
-                        <p:sp>
-                          <p:nvSpPr>
-                            <p:cNvPr id="77" name="TextBox 76">
-                              <a:extLst>
-                                <a:ext uri="{FF2B5EF4-FFF2-40B4-BE49-F238E27FC236}">
-                                  <a16:creationId xmlns:a16="http://schemas.microsoft.com/office/drawing/2014/main" id="{399EF06D-3618-8291-ED7E-9B8FFFED0E64}"/>
-                                </a:ext>
-                              </a:extLst>
-                            </p:cNvPr>
-                            <p:cNvSpPr txBox="1"/>
-                            <p:nvPr/>
-                          </p:nvSpPr>
-                          <p:spPr>
-                            <a:xfrm>
-                              <a:off x="3352800" y="1866900"/>
-                              <a:ext cx="678180" cy="367326"/>
-                            </a:xfrm>
-                            <a:prstGeom prst="rect">
-                              <a:avLst/>
-                            </a:prstGeom>
-                            <a:noFill/>
-                          </p:spPr>
-                          <p:txBody>
-                            <a:bodyPr wrap="square" rtlCol="0">
-                              <a:spAutoFit/>
-                            </a:bodyPr>
-                            <a:lstStyle/>
-                            <a:p>
-                              <a:pPr algn="ctr"/>
-                              <a:r>
-                                <a:rPr lang="en-US" dirty="0"/>
-                                <a:t>\0</a:t>
+                                <a:t>?</a:t>
                               </a:r>
                               <a:endParaRPr lang="en-CA" dirty="0"/>
                             </a:p>

</xml_diff>

<commit_message>
added my_strlen and my_strncat
</commit_message>
<xml_diff>
--- a/assignments/labs/lab2/documents/drawing.pptx
+++ b/assignments/labs/lab2/documents/drawing.pptx
@@ -6504,114 +6504,228 @@
           </p:grpSp>
         </p:grpSp>
       </p:grpSp>
-      <p:cxnSp>
-        <p:nvCxnSpPr>
-          <p:cNvPr id="15" name="Straight Connector 14">
+      <p:grpSp>
+        <p:nvGrpSpPr>
+          <p:cNvPr id="7" name="Group 6">
             <a:extLst>
               <a:ext uri="{FF2B5EF4-FFF2-40B4-BE49-F238E27FC236}">
-                <a16:creationId xmlns:a16="http://schemas.microsoft.com/office/drawing/2014/main" id="{BA1B24E4-CAD0-61BB-3BCD-F0EDBB0857EC}"/>
+                <a16:creationId xmlns:a16="http://schemas.microsoft.com/office/drawing/2014/main" id="{08664905-7B98-0B00-1BE8-B207FCE53F64}"/>
               </a:ext>
             </a:extLst>
           </p:cNvPr>
-          <p:cNvCxnSpPr>
-            <a:cxnSpLocks/>
-          </p:cNvCxnSpPr>
-          <p:nvPr/>
-        </p:nvCxnSpPr>
-        <p:spPr>
-          <a:xfrm>
-            <a:off x="2935605" y="1924150"/>
-            <a:ext cx="3550920" cy="0"/>
-          </a:xfrm>
-          <a:prstGeom prst="line">
-            <a:avLst/>
-          </a:prstGeom>
-        </p:spPr>
-        <p:style>
-          <a:lnRef idx="1">
-            <a:schemeClr val="dk1"/>
-          </a:lnRef>
-          <a:fillRef idx="0">
-            <a:schemeClr val="dk1"/>
-          </a:fillRef>
-          <a:effectRef idx="0">
-            <a:schemeClr val="dk1"/>
-          </a:effectRef>
-          <a:fontRef idx="minor">
-            <a:schemeClr val="tx1"/>
-          </a:fontRef>
-        </p:style>
-      </p:cxnSp>
-      <p:sp>
-        <p:nvSpPr>
-          <p:cNvPr id="20" name="TextBox 19">
-            <a:extLst>
-              <a:ext uri="{FF2B5EF4-FFF2-40B4-BE49-F238E27FC236}">
-                <a16:creationId xmlns:a16="http://schemas.microsoft.com/office/drawing/2014/main" id="{7C5DA3D0-0265-C798-81AC-E7A5480D1394}"/>
-              </a:ext>
-            </a:extLst>
-          </p:cNvPr>
-          <p:cNvSpPr txBox="1">
-            <a:spLocks/>
-          </p:cNvSpPr>
-          <p:nvPr/>
-        </p:nvSpPr>
-        <p:spPr>
-          <a:xfrm>
-            <a:off x="1245983" y="983100"/>
-            <a:ext cx="1628010" cy="369332"/>
-          </a:xfrm>
-          <a:prstGeom prst="rect">
-            <a:avLst/>
-          </a:prstGeom>
-          <a:noFill/>
-        </p:spPr>
-        <p:txBody>
-          <a:bodyPr wrap="none" rtlCol="0">
-            <a:spAutoFit/>
-          </a:bodyPr>
-          <a:lstStyle/>
-          <a:p>
-            <a:r>
-              <a:rPr lang="en-US" dirty="0"/>
-              <a:t>AR </a:t>
-            </a:r>
-            <a:r>
-              <a:rPr lang="en-US" dirty="0" err="1"/>
-              <a:t>try_to_copy</a:t>
-            </a:r>
-            <a:endParaRPr lang="en-CA" dirty="0"/>
-          </a:p>
-        </p:txBody>
-      </p:sp>
-      <p:grpSp>
-        <p:nvGrpSpPr>
-          <p:cNvPr id="22" name="Group 21">
-            <a:extLst>
-              <a:ext uri="{FF2B5EF4-FFF2-40B4-BE49-F238E27FC236}">
-                <a16:creationId xmlns:a16="http://schemas.microsoft.com/office/drawing/2014/main" id="{982695A6-3335-36E6-FD3D-834F959B04CF}"/>
-              </a:ext>
-            </a:extLst>
-          </p:cNvPr>
-          <p:cNvGrpSpPr>
-            <a:grpSpLocks/>
-          </p:cNvGrpSpPr>
+          <p:cNvGrpSpPr/>
           <p:nvPr/>
         </p:nvGrpSpPr>
         <p:grpSpPr>
           <a:xfrm>
-            <a:off x="2905125" y="2343149"/>
-            <a:ext cx="1647396" cy="371900"/>
-            <a:chOff x="2800350" y="2916554"/>
-            <a:chExt cx="1647396" cy="371900"/>
+            <a:off x="1245983" y="736533"/>
+            <a:ext cx="5240542" cy="4346148"/>
+            <a:chOff x="1245983" y="736533"/>
+            <a:chExt cx="5240542" cy="4346148"/>
           </a:xfrm>
         </p:grpSpPr>
+        <p:cxnSp>
+          <p:nvCxnSpPr>
+            <p:cNvPr id="15" name="Straight Connector 14">
+              <a:extLst>
+                <a:ext uri="{FF2B5EF4-FFF2-40B4-BE49-F238E27FC236}">
+                  <a16:creationId xmlns:a16="http://schemas.microsoft.com/office/drawing/2014/main" id="{BA1B24E4-CAD0-61BB-3BCD-F0EDBB0857EC}"/>
+                </a:ext>
+              </a:extLst>
+            </p:cNvPr>
+            <p:cNvCxnSpPr>
+              <a:cxnSpLocks/>
+            </p:cNvCxnSpPr>
+            <p:nvPr/>
+          </p:nvCxnSpPr>
+          <p:spPr>
+            <a:xfrm>
+              <a:off x="2935605" y="1924150"/>
+              <a:ext cx="3550920" cy="0"/>
+            </a:xfrm>
+            <a:prstGeom prst="line">
+              <a:avLst/>
+            </a:prstGeom>
+          </p:spPr>
+          <p:style>
+            <a:lnRef idx="1">
+              <a:schemeClr val="dk1"/>
+            </a:lnRef>
+            <a:fillRef idx="0">
+              <a:schemeClr val="dk1"/>
+            </a:fillRef>
+            <a:effectRef idx="0">
+              <a:schemeClr val="dk1"/>
+            </a:effectRef>
+            <a:fontRef idx="minor">
+              <a:schemeClr val="tx1"/>
+            </a:fontRef>
+          </p:style>
+        </p:cxnSp>
         <p:sp>
           <p:nvSpPr>
-            <p:cNvPr id="71" name="Rectangle 70">
+            <p:cNvPr id="20" name="TextBox 19">
               <a:extLst>
                 <a:ext uri="{FF2B5EF4-FFF2-40B4-BE49-F238E27FC236}">
-                  <a16:creationId xmlns:a16="http://schemas.microsoft.com/office/drawing/2014/main" id="{875740E8-BEFB-D56E-F5B2-DC442359E673}"/>
+                  <a16:creationId xmlns:a16="http://schemas.microsoft.com/office/drawing/2014/main" id="{7C5DA3D0-0265-C798-81AC-E7A5480D1394}"/>
+                </a:ext>
+              </a:extLst>
+            </p:cNvPr>
+            <p:cNvSpPr txBox="1">
+              <a:spLocks/>
+            </p:cNvSpPr>
+            <p:nvPr/>
+          </p:nvSpPr>
+          <p:spPr>
+            <a:xfrm>
+              <a:off x="1245983" y="983100"/>
+              <a:ext cx="1628010" cy="369332"/>
+            </a:xfrm>
+            <a:prstGeom prst="rect">
+              <a:avLst/>
+            </a:prstGeom>
+            <a:noFill/>
+          </p:spPr>
+          <p:txBody>
+            <a:bodyPr wrap="none" rtlCol="0">
+              <a:spAutoFit/>
+            </a:bodyPr>
+            <a:lstStyle/>
+            <a:p>
+              <a:r>
+                <a:rPr lang="en-US" dirty="0"/>
+                <a:t>AR </a:t>
+              </a:r>
+              <a:r>
+                <a:rPr lang="en-US" dirty="0" err="1"/>
+                <a:t>try_to_copy</a:t>
+              </a:r>
+              <a:endParaRPr lang="en-CA" dirty="0"/>
+            </a:p>
+          </p:txBody>
+        </p:sp>
+        <p:grpSp>
+          <p:nvGrpSpPr>
+            <p:cNvPr id="22" name="Group 21">
+              <a:extLst>
+                <a:ext uri="{FF2B5EF4-FFF2-40B4-BE49-F238E27FC236}">
+                  <a16:creationId xmlns:a16="http://schemas.microsoft.com/office/drawing/2014/main" id="{982695A6-3335-36E6-FD3D-834F959B04CF}"/>
+                </a:ext>
+              </a:extLst>
+            </p:cNvPr>
+            <p:cNvGrpSpPr>
+              <a:grpSpLocks/>
+            </p:cNvGrpSpPr>
+            <p:nvPr/>
+          </p:nvGrpSpPr>
+          <p:grpSpPr>
+            <a:xfrm>
+              <a:off x="2905125" y="2343149"/>
+              <a:ext cx="1647396" cy="371900"/>
+              <a:chOff x="2800350" y="2916554"/>
+              <a:chExt cx="1647396" cy="371900"/>
+            </a:xfrm>
+          </p:grpSpPr>
+          <p:sp>
+            <p:nvSpPr>
+              <p:cNvPr id="71" name="Rectangle 70">
+                <a:extLst>
+                  <a:ext uri="{FF2B5EF4-FFF2-40B4-BE49-F238E27FC236}">
+                    <a16:creationId xmlns:a16="http://schemas.microsoft.com/office/drawing/2014/main" id="{875740E8-BEFB-D56E-F5B2-DC442359E673}"/>
+                  </a:ext>
+                </a:extLst>
+              </p:cNvPr>
+              <p:cNvSpPr>
+                <a:spLocks/>
+              </p:cNvSpPr>
+              <p:nvPr/>
+            </p:nvSpPr>
+            <p:spPr>
+              <a:xfrm>
+                <a:off x="3448049" y="2916554"/>
+                <a:ext cx="999697" cy="338609"/>
+              </a:xfrm>
+              <a:prstGeom prst="rect">
+                <a:avLst/>
+              </a:prstGeom>
+              <a:noFill/>
+              <a:ln>
+                <a:solidFill>
+                  <a:schemeClr val="tx1"/>
+                </a:solidFill>
+              </a:ln>
+            </p:spPr>
+            <p:style>
+              <a:lnRef idx="2">
+                <a:schemeClr val="accent1">
+                  <a:shade val="15000"/>
+                </a:schemeClr>
+              </a:lnRef>
+              <a:fillRef idx="1">
+                <a:schemeClr val="accent1"/>
+              </a:fillRef>
+              <a:effectRef idx="0">
+                <a:schemeClr val="accent1"/>
+              </a:effectRef>
+              <a:fontRef idx="minor">
+                <a:schemeClr val="lt1"/>
+              </a:fontRef>
+            </p:style>
+            <p:txBody>
+              <a:bodyPr rtlCol="0" anchor="ctr"/>
+              <a:lstStyle/>
+              <a:p>
+                <a:pPr algn="ctr"/>
+                <a:endParaRPr lang="en-CA"/>
+              </a:p>
+            </p:txBody>
+          </p:sp>
+          <p:sp>
+            <p:nvSpPr>
+              <p:cNvPr id="72" name="TextBox 71">
+                <a:extLst>
+                  <a:ext uri="{FF2B5EF4-FFF2-40B4-BE49-F238E27FC236}">
+                    <a16:creationId xmlns:a16="http://schemas.microsoft.com/office/drawing/2014/main" id="{625ADCAE-8AAA-BFA4-2A54-E103F613E66F}"/>
+                  </a:ext>
+                </a:extLst>
+              </p:cNvPr>
+              <p:cNvSpPr txBox="1">
+                <a:spLocks/>
+              </p:cNvSpPr>
+              <p:nvPr/>
+            </p:nvSpPr>
+            <p:spPr>
+              <a:xfrm>
+                <a:off x="2800350" y="2919122"/>
+                <a:ext cx="626009" cy="369332"/>
+              </a:xfrm>
+              <a:prstGeom prst="rect">
+                <a:avLst/>
+              </a:prstGeom>
+              <a:noFill/>
+            </p:spPr>
+            <p:txBody>
+              <a:bodyPr wrap="square" rtlCol="0">
+                <a:spAutoFit/>
+              </a:bodyPr>
+              <a:lstStyle/>
+              <a:p>
+                <a:pPr algn="ctr"/>
+                <a:r>
+                  <a:rPr lang="en-US" dirty="0" err="1"/>
+                  <a:t>dest</a:t>
+                </a:r>
+                <a:endParaRPr lang="en-CA" dirty="0"/>
+              </a:p>
+            </p:txBody>
+          </p:sp>
+        </p:grpSp>
+        <p:sp>
+          <p:nvSpPr>
+            <p:cNvPr id="25" name="Rectangle 24">
+              <a:extLst>
+                <a:ext uri="{FF2B5EF4-FFF2-40B4-BE49-F238E27FC236}">
+                  <a16:creationId xmlns:a16="http://schemas.microsoft.com/office/drawing/2014/main" id="{24847AA7-D9EA-BC1F-621B-EE58EB859C0A}"/>
                 </a:ext>
               </a:extLst>
             </p:cNvPr>
@@ -6622,8 +6736,8 @@
           </p:nvSpPr>
           <p:spPr>
             <a:xfrm>
-              <a:off x="3448049" y="2916554"/>
-              <a:ext cx="999697" cy="338609"/>
+              <a:off x="2920165" y="736533"/>
+              <a:ext cx="3553326" cy="2294021"/>
             </a:xfrm>
             <a:prstGeom prst="rect">
               <a:avLst/>
@@ -6660,194 +6774,228 @@
             </a:p>
           </p:txBody>
         </p:sp>
-        <p:sp>
-          <p:nvSpPr>
-            <p:cNvPr id="72" name="TextBox 71">
+        <p:grpSp>
+          <p:nvGrpSpPr>
+            <p:cNvPr id="80" name="Group 79">
               <a:extLst>
                 <a:ext uri="{FF2B5EF4-FFF2-40B4-BE49-F238E27FC236}">
-                  <a16:creationId xmlns:a16="http://schemas.microsoft.com/office/drawing/2014/main" id="{625ADCAE-8AAA-BFA4-2A54-E103F613E66F}"/>
+                  <a16:creationId xmlns:a16="http://schemas.microsoft.com/office/drawing/2014/main" id="{92D7B302-B4C5-AF89-3449-EFD6CD90FDA8}"/>
                 </a:ext>
               </a:extLst>
             </p:cNvPr>
-            <p:cNvSpPr txBox="1">
-              <a:spLocks/>
-            </p:cNvSpPr>
+            <p:cNvGrpSpPr>
+              <a:grpSpLocks/>
+            </p:cNvGrpSpPr>
             <p:nvPr/>
-          </p:nvSpPr>
-          <p:spPr>
+          </p:nvGrpSpPr>
+          <p:grpSpPr>
             <a:xfrm>
-              <a:off x="2800350" y="2919122"/>
-              <a:ext cx="626009" cy="369332"/>
+              <a:off x="4505325" y="2336192"/>
+              <a:ext cx="1799796" cy="369332"/>
+              <a:chOff x="2647950" y="2900072"/>
+              <a:chExt cx="1799796" cy="369332"/>
             </a:xfrm>
-            <a:prstGeom prst="rect">
-              <a:avLst/>
-            </a:prstGeom>
-            <a:noFill/>
-          </p:spPr>
-          <p:txBody>
-            <a:bodyPr wrap="square" rtlCol="0">
-              <a:spAutoFit/>
-            </a:bodyPr>
-            <a:lstStyle/>
-            <a:p>
-              <a:pPr algn="ctr"/>
-              <a:r>
-                <a:rPr lang="en-US" dirty="0" err="1"/>
-                <a:t>dest</a:t>
-              </a:r>
-              <a:endParaRPr lang="en-CA" dirty="0"/>
-            </a:p>
-          </p:txBody>
-        </p:sp>
-      </p:grpSp>
-      <p:sp>
-        <p:nvSpPr>
-          <p:cNvPr id="25" name="Rectangle 24">
-            <a:extLst>
-              <a:ext uri="{FF2B5EF4-FFF2-40B4-BE49-F238E27FC236}">
-                <a16:creationId xmlns:a16="http://schemas.microsoft.com/office/drawing/2014/main" id="{24847AA7-D9EA-BC1F-621B-EE58EB859C0A}"/>
-              </a:ext>
-            </a:extLst>
-          </p:cNvPr>
-          <p:cNvSpPr>
-            <a:spLocks/>
-          </p:cNvSpPr>
-          <p:nvPr/>
-        </p:nvSpPr>
-        <p:spPr>
-          <a:xfrm>
-            <a:off x="2920165" y="736533"/>
-            <a:ext cx="3553326" cy="2294021"/>
-          </a:xfrm>
-          <a:prstGeom prst="rect">
-            <a:avLst/>
-          </a:prstGeom>
-          <a:noFill/>
-          <a:ln>
-            <a:solidFill>
-              <a:schemeClr val="tx1"/>
-            </a:solidFill>
-          </a:ln>
-        </p:spPr>
-        <p:style>
-          <a:lnRef idx="2">
-            <a:schemeClr val="accent1">
-              <a:shade val="15000"/>
-            </a:schemeClr>
-          </a:lnRef>
-          <a:fillRef idx="1">
-            <a:schemeClr val="accent1"/>
-          </a:fillRef>
-          <a:effectRef idx="0">
-            <a:schemeClr val="accent1"/>
-          </a:effectRef>
-          <a:fontRef idx="minor">
-            <a:schemeClr val="lt1"/>
-          </a:fontRef>
-        </p:style>
-        <p:txBody>
-          <a:bodyPr rtlCol="0" anchor="ctr"/>
-          <a:lstStyle/>
-          <a:p>
-            <a:pPr algn="ctr"/>
-            <a:endParaRPr lang="en-CA"/>
-          </a:p>
-        </p:txBody>
-      </p:sp>
-      <p:grpSp>
-        <p:nvGrpSpPr>
-          <p:cNvPr id="80" name="Group 79">
-            <a:extLst>
-              <a:ext uri="{FF2B5EF4-FFF2-40B4-BE49-F238E27FC236}">
-                <a16:creationId xmlns:a16="http://schemas.microsoft.com/office/drawing/2014/main" id="{92D7B302-B4C5-AF89-3449-EFD6CD90FDA8}"/>
-              </a:ext>
-            </a:extLst>
-          </p:cNvPr>
-          <p:cNvGrpSpPr>
-            <a:grpSpLocks/>
-          </p:cNvGrpSpPr>
-          <p:nvPr/>
-        </p:nvGrpSpPr>
-        <p:grpSpPr>
-          <a:xfrm>
-            <a:off x="4505325" y="2336192"/>
-            <a:ext cx="1799796" cy="369332"/>
-            <a:chOff x="2647950" y="2900072"/>
-            <a:chExt cx="1799796" cy="369332"/>
-          </a:xfrm>
-        </p:grpSpPr>
-        <p:sp>
-          <p:nvSpPr>
-            <p:cNvPr id="81" name="Rectangle 80">
+          </p:grpSpPr>
+          <p:sp>
+            <p:nvSpPr>
+              <p:cNvPr id="81" name="Rectangle 80">
+                <a:extLst>
+                  <a:ext uri="{FF2B5EF4-FFF2-40B4-BE49-F238E27FC236}">
+                    <a16:creationId xmlns:a16="http://schemas.microsoft.com/office/drawing/2014/main" id="{E7717D85-0CB8-150C-197C-13949EDDF712}"/>
+                  </a:ext>
+                </a:extLst>
+              </p:cNvPr>
+              <p:cNvSpPr>
+                <a:spLocks/>
+              </p:cNvSpPr>
+              <p:nvPr/>
+            </p:nvSpPr>
+            <p:spPr>
+              <a:xfrm>
+                <a:off x="3448049" y="2916554"/>
+                <a:ext cx="999697" cy="338609"/>
+              </a:xfrm>
+              <a:prstGeom prst="rect">
+                <a:avLst/>
+              </a:prstGeom>
+              <a:noFill/>
+              <a:ln>
+                <a:solidFill>
+                  <a:schemeClr val="tx1"/>
+                </a:solidFill>
+              </a:ln>
+            </p:spPr>
+            <p:style>
+              <a:lnRef idx="2">
+                <a:schemeClr val="accent1">
+                  <a:shade val="15000"/>
+                </a:schemeClr>
+              </a:lnRef>
+              <a:fillRef idx="1">
+                <a:schemeClr val="accent1"/>
+              </a:fillRef>
+              <a:effectRef idx="0">
+                <a:schemeClr val="accent1"/>
+              </a:effectRef>
+              <a:fontRef idx="minor">
+                <a:schemeClr val="lt1"/>
+              </a:fontRef>
+            </p:style>
+            <p:txBody>
+              <a:bodyPr rtlCol="0" anchor="ctr"/>
+              <a:lstStyle/>
+              <a:p>
+                <a:pPr algn="ctr"/>
+                <a:endParaRPr lang="en-CA"/>
+              </a:p>
+            </p:txBody>
+          </p:sp>
+          <p:sp>
+            <p:nvSpPr>
+              <p:cNvPr id="82" name="TextBox 81">
+                <a:extLst>
+                  <a:ext uri="{FF2B5EF4-FFF2-40B4-BE49-F238E27FC236}">
+                    <a16:creationId xmlns:a16="http://schemas.microsoft.com/office/drawing/2014/main" id="{5A492B31-0E77-9B1C-9211-4379220918E9}"/>
+                  </a:ext>
+                </a:extLst>
+              </p:cNvPr>
+              <p:cNvSpPr txBox="1">
+                <a:spLocks/>
+              </p:cNvSpPr>
+              <p:nvPr/>
+            </p:nvSpPr>
+            <p:spPr>
+              <a:xfrm>
+                <a:off x="2647950" y="2900072"/>
+                <a:ext cx="847725" cy="369332"/>
+              </a:xfrm>
+              <a:prstGeom prst="rect">
+                <a:avLst/>
+              </a:prstGeom>
+              <a:noFill/>
+            </p:spPr>
+            <p:txBody>
+              <a:bodyPr wrap="square" rtlCol="0">
+                <a:spAutoFit/>
+              </a:bodyPr>
+              <a:lstStyle/>
+              <a:p>
+                <a:pPr algn="ctr"/>
+                <a:r>
+                  <a:rPr lang="en-US" dirty="0"/>
+                  <a:t>source</a:t>
+                </a:r>
+                <a:endParaRPr lang="en-CA" dirty="0"/>
+              </a:p>
+            </p:txBody>
+          </p:sp>
+        </p:grpSp>
+        <p:cxnSp>
+          <p:nvCxnSpPr>
+            <p:cNvPr id="84" name="Connector: Curved 83">
               <a:extLst>
                 <a:ext uri="{FF2B5EF4-FFF2-40B4-BE49-F238E27FC236}">
-                  <a16:creationId xmlns:a16="http://schemas.microsoft.com/office/drawing/2014/main" id="{E7717D85-0CB8-150C-197C-13949EDDF712}"/>
+                  <a16:creationId xmlns:a16="http://schemas.microsoft.com/office/drawing/2014/main" id="{06CC5023-9014-CF1C-002C-B1F7E1690F1E}"/>
                 </a:ext>
               </a:extLst>
             </p:cNvPr>
-            <p:cNvSpPr>
-              <a:spLocks/>
-            </p:cNvSpPr>
+            <p:cNvCxnSpPr>
+              <a:cxnSpLocks/>
+            </p:cNvCxnSpPr>
             <p:nvPr/>
-          </p:nvSpPr>
+          </p:nvCxnSpPr>
           <p:spPr>
-            <a:xfrm>
-              <a:off x="3448049" y="2916554"/>
-              <a:ext cx="999697" cy="338609"/>
+            <a:xfrm rot="5400000">
+              <a:off x="2515590" y="3555659"/>
+              <a:ext cx="2580113" cy="473931"/>
             </a:xfrm>
-            <a:prstGeom prst="rect">
-              <a:avLst/>
+            <a:prstGeom prst="curvedConnector3">
+              <a:avLst>
+                <a:gd name="adj1" fmla="val 50000"/>
+              </a:avLst>
             </a:prstGeom>
-            <a:noFill/>
             <a:ln>
               <a:solidFill>
-                <a:schemeClr val="tx1"/>
+                <a:srgbClr val="C00000"/>
               </a:solidFill>
+              <a:tailEnd type="triangle"/>
             </a:ln>
           </p:spPr>
           <p:style>
-            <a:lnRef idx="2">
-              <a:schemeClr val="accent1">
-                <a:shade val="15000"/>
-              </a:schemeClr>
+            <a:lnRef idx="1">
+              <a:schemeClr val="accent1"/>
             </a:lnRef>
-            <a:fillRef idx="1">
+            <a:fillRef idx="0">
               <a:schemeClr val="accent1"/>
             </a:fillRef>
             <a:effectRef idx="0">
               <a:schemeClr val="accent1"/>
             </a:effectRef>
             <a:fontRef idx="minor">
-              <a:schemeClr val="lt1"/>
+              <a:schemeClr val="tx1"/>
             </a:fontRef>
           </p:style>
-          <p:txBody>
-            <a:bodyPr rtlCol="0" anchor="ctr"/>
-            <a:lstStyle/>
-            <a:p>
-              <a:pPr algn="ctr"/>
-              <a:endParaRPr lang="en-CA"/>
-            </a:p>
-          </p:txBody>
-        </p:sp>
-        <p:sp>
-          <p:nvSpPr>
-            <p:cNvPr id="82" name="TextBox 81">
+        </p:cxnSp>
+        <p:cxnSp>
+          <p:nvCxnSpPr>
+            <p:cNvPr id="86" name="Connector: Curved 85">
               <a:extLst>
                 <a:ext uri="{FF2B5EF4-FFF2-40B4-BE49-F238E27FC236}">
-                  <a16:creationId xmlns:a16="http://schemas.microsoft.com/office/drawing/2014/main" id="{5A492B31-0E77-9B1C-9211-4379220918E9}"/>
+                  <a16:creationId xmlns:a16="http://schemas.microsoft.com/office/drawing/2014/main" id="{78CAE5D8-70B0-1A79-84F1-1A99C620C1EA}"/>
                 </a:ext>
               </a:extLst>
             </p:cNvPr>
-            <p:cNvSpPr txBox="1">
-              <a:spLocks/>
-            </p:cNvSpPr>
+            <p:cNvCxnSpPr>
+              <a:endCxn id="104" idx="3"/>
+            </p:cNvCxnSpPr>
+            <p:nvPr/>
+          </p:nvCxnSpPr>
+          <p:spPr>
+            <a:xfrm rot="5400000">
+              <a:off x="3400886" y="2689561"/>
+              <a:ext cx="2540148" cy="2240280"/>
+            </a:xfrm>
+            <a:prstGeom prst="curvedConnector4">
+              <a:avLst>
+                <a:gd name="adj1" fmla="val 46385"/>
+                <a:gd name="adj2" fmla="val 110204"/>
+              </a:avLst>
+            </a:prstGeom>
+            <a:ln>
+              <a:tailEnd type="triangle"/>
+            </a:ln>
+          </p:spPr>
+          <p:style>
+            <a:lnRef idx="1">
+              <a:schemeClr val="accent1"/>
+            </a:lnRef>
+            <a:fillRef idx="0">
+              <a:schemeClr val="accent1"/>
+            </a:fillRef>
+            <a:effectRef idx="0">
+              <a:schemeClr val="accent1"/>
+            </a:effectRef>
+            <a:fontRef idx="minor">
+              <a:schemeClr val="tx1"/>
+            </a:fontRef>
+          </p:style>
+        </p:cxnSp>
+        <p:sp>
+          <p:nvSpPr>
+            <p:cNvPr id="87" name="TextBox 86">
+              <a:extLst>
+                <a:ext uri="{FF2B5EF4-FFF2-40B4-BE49-F238E27FC236}">
+                  <a16:creationId xmlns:a16="http://schemas.microsoft.com/office/drawing/2014/main" id="{44153DC0-0D4D-4279-71A2-9DBDF6CC287B}"/>
+                </a:ext>
+              </a:extLst>
+            </p:cNvPr>
+            <p:cNvSpPr txBox="1"/>
             <p:nvPr/>
           </p:nvSpPr>
           <p:spPr>
             <a:xfrm>
-              <a:off x="2647950" y="2900072"/>
-              <a:ext cx="847725" cy="369332"/>
+              <a:off x="2926080" y="1104900"/>
+              <a:ext cx="3550920" cy="369332"/>
             </a:xfrm>
             <a:prstGeom prst="rect">
               <a:avLst/>
@@ -6863,138 +7011,13 @@
               <a:pPr algn="ctr"/>
               <a:r>
                 <a:rPr lang="en-US" dirty="0"/>
-                <a:t>source</a:t>
+                <a:t>No local variables</a:t>
               </a:r>
               <a:endParaRPr lang="en-CA" dirty="0"/>
             </a:p>
           </p:txBody>
         </p:sp>
       </p:grpSp>
-      <p:cxnSp>
-        <p:nvCxnSpPr>
-          <p:cNvPr id="84" name="Connector: Curved 83">
-            <a:extLst>
-              <a:ext uri="{FF2B5EF4-FFF2-40B4-BE49-F238E27FC236}">
-                <a16:creationId xmlns:a16="http://schemas.microsoft.com/office/drawing/2014/main" id="{06CC5023-9014-CF1C-002C-B1F7E1690F1E}"/>
-              </a:ext>
-            </a:extLst>
-          </p:cNvPr>
-          <p:cNvCxnSpPr>
-            <a:cxnSpLocks/>
-          </p:cNvCxnSpPr>
-          <p:nvPr/>
-        </p:nvCxnSpPr>
-        <p:spPr>
-          <a:xfrm rot="5400000">
-            <a:off x="2817253" y="3810454"/>
-            <a:ext cx="2023653" cy="520801"/>
-          </a:xfrm>
-          <a:prstGeom prst="curvedConnector2">
-            <a:avLst/>
-          </a:prstGeom>
-          <a:ln>
-            <a:solidFill>
-              <a:srgbClr val="C00000"/>
-            </a:solidFill>
-            <a:tailEnd type="triangle"/>
-          </a:ln>
-        </p:spPr>
-        <p:style>
-          <a:lnRef idx="1">
-            <a:schemeClr val="accent1"/>
-          </a:lnRef>
-          <a:fillRef idx="0">
-            <a:schemeClr val="accent1"/>
-          </a:fillRef>
-          <a:effectRef idx="0">
-            <a:schemeClr val="accent1"/>
-          </a:effectRef>
-          <a:fontRef idx="minor">
-            <a:schemeClr val="tx1"/>
-          </a:fontRef>
-        </p:style>
-      </p:cxnSp>
-      <p:cxnSp>
-        <p:nvCxnSpPr>
-          <p:cNvPr id="86" name="Connector: Curved 85">
-            <a:extLst>
-              <a:ext uri="{FF2B5EF4-FFF2-40B4-BE49-F238E27FC236}">
-                <a16:creationId xmlns:a16="http://schemas.microsoft.com/office/drawing/2014/main" id="{78CAE5D8-70B0-1A79-84F1-1A99C620C1EA}"/>
-              </a:ext>
-            </a:extLst>
-          </p:cNvPr>
-          <p:cNvCxnSpPr>
-            <a:endCxn id="104" idx="3"/>
-          </p:cNvCxnSpPr>
-          <p:nvPr/>
-        </p:nvCxnSpPr>
-        <p:spPr>
-          <a:xfrm rot="5400000">
-            <a:off x="3400886" y="2689561"/>
-            <a:ext cx="2540148" cy="2240280"/>
-          </a:xfrm>
-          <a:prstGeom prst="curvedConnector4">
-            <a:avLst>
-              <a:gd name="adj1" fmla="val 46385"/>
-              <a:gd name="adj2" fmla="val 110204"/>
-            </a:avLst>
-          </a:prstGeom>
-          <a:ln>
-            <a:tailEnd type="triangle"/>
-          </a:ln>
-        </p:spPr>
-        <p:style>
-          <a:lnRef idx="1">
-            <a:schemeClr val="accent1"/>
-          </a:lnRef>
-          <a:fillRef idx="0">
-            <a:schemeClr val="accent1"/>
-          </a:fillRef>
-          <a:effectRef idx="0">
-            <a:schemeClr val="accent1"/>
-          </a:effectRef>
-          <a:fontRef idx="minor">
-            <a:schemeClr val="tx1"/>
-          </a:fontRef>
-        </p:style>
-      </p:cxnSp>
-      <p:sp>
-        <p:nvSpPr>
-          <p:cNvPr id="87" name="TextBox 86">
-            <a:extLst>
-              <a:ext uri="{FF2B5EF4-FFF2-40B4-BE49-F238E27FC236}">
-                <a16:creationId xmlns:a16="http://schemas.microsoft.com/office/drawing/2014/main" id="{44153DC0-0D4D-4279-71A2-9DBDF6CC287B}"/>
-              </a:ext>
-            </a:extLst>
-          </p:cNvPr>
-          <p:cNvSpPr txBox="1"/>
-          <p:nvPr/>
-        </p:nvSpPr>
-        <p:spPr>
-          <a:xfrm>
-            <a:off x="2926080" y="1104900"/>
-            <a:ext cx="3550920" cy="369332"/>
-          </a:xfrm>
-          <a:prstGeom prst="rect">
-            <a:avLst/>
-          </a:prstGeom>
-          <a:noFill/>
-        </p:spPr>
-        <p:txBody>
-          <a:bodyPr wrap="square" rtlCol="0">
-            <a:spAutoFit/>
-          </a:bodyPr>
-          <a:lstStyle/>
-          <a:p>
-            <a:pPr algn="ctr"/>
-            <a:r>
-              <a:rPr lang="en-US" dirty="0"/>
-              <a:t>No local variables</a:t>
-            </a:r>
-            <a:endParaRPr lang="en-CA" dirty="0"/>
-          </a:p>
-        </p:txBody>
-      </p:sp>
     </p:spTree>
     <p:extLst>
       <p:ext uri="{BB962C8B-B14F-4D97-AF65-F5344CB8AC3E}">
@@ -7039,7 +7062,7 @@
         </p:nvSpPr>
         <p:spPr>
           <a:xfrm>
-            <a:off x="8420601" y="525880"/>
+            <a:off x="10297527" y="273217"/>
             <a:ext cx="855299" cy="369332"/>
           </a:xfrm>
           <a:prstGeom prst="rect">
@@ -7075,8 +7098,8 @@
         </p:nvGrpSpPr>
         <p:grpSpPr>
           <a:xfrm>
-            <a:off x="1969883" y="3536883"/>
-            <a:ext cx="4513133" cy="2294021"/>
+            <a:off x="3465095" y="4608095"/>
+            <a:ext cx="4451684" cy="2113146"/>
             <a:chOff x="1779383" y="1014663"/>
             <a:chExt cx="4513133" cy="2294021"/>
           </a:xfrm>
@@ -8626,114 +8649,228 @@
           </p:grpSp>
         </p:grpSp>
       </p:grpSp>
-      <p:cxnSp>
-        <p:nvCxnSpPr>
-          <p:cNvPr id="15" name="Straight Connector 14">
+      <p:grpSp>
+        <p:nvGrpSpPr>
+          <p:cNvPr id="7" name="Group 6">
             <a:extLst>
               <a:ext uri="{FF2B5EF4-FFF2-40B4-BE49-F238E27FC236}">
-                <a16:creationId xmlns:a16="http://schemas.microsoft.com/office/drawing/2014/main" id="{BA1B24E4-CAD0-61BB-3BCD-F0EDBB0857EC}"/>
+                <a16:creationId xmlns:a16="http://schemas.microsoft.com/office/drawing/2014/main" id="{C5674CF1-9019-9EF1-F126-9D346FAC73E0}"/>
               </a:ext>
             </a:extLst>
           </p:cNvPr>
-          <p:cNvCxnSpPr>
-            <a:cxnSpLocks/>
-          </p:cNvCxnSpPr>
-          <p:nvPr/>
-        </p:nvCxnSpPr>
-        <p:spPr>
-          <a:xfrm>
-            <a:off x="2935605" y="1924150"/>
-            <a:ext cx="3550920" cy="0"/>
-          </a:xfrm>
-          <a:prstGeom prst="line">
-            <a:avLst/>
-          </a:prstGeom>
-        </p:spPr>
-        <p:style>
-          <a:lnRef idx="1">
-            <a:schemeClr val="dk1"/>
-          </a:lnRef>
-          <a:fillRef idx="0">
-            <a:schemeClr val="dk1"/>
-          </a:fillRef>
-          <a:effectRef idx="0">
-            <a:schemeClr val="dk1"/>
-          </a:effectRef>
-          <a:fontRef idx="minor">
-            <a:schemeClr val="tx1"/>
-          </a:fontRef>
-        </p:style>
-      </p:cxnSp>
-      <p:sp>
-        <p:nvSpPr>
-          <p:cNvPr id="20" name="TextBox 19">
-            <a:extLst>
-              <a:ext uri="{FF2B5EF4-FFF2-40B4-BE49-F238E27FC236}">
-                <a16:creationId xmlns:a16="http://schemas.microsoft.com/office/drawing/2014/main" id="{7C5DA3D0-0265-C798-81AC-E7A5480D1394}"/>
-              </a:ext>
-            </a:extLst>
-          </p:cNvPr>
-          <p:cNvSpPr txBox="1">
-            <a:spLocks/>
-          </p:cNvSpPr>
-          <p:nvPr/>
-        </p:nvSpPr>
-        <p:spPr>
-          <a:xfrm>
-            <a:off x="1074533" y="1011675"/>
-            <a:ext cx="1859996" cy="369332"/>
-          </a:xfrm>
-          <a:prstGeom prst="rect">
-            <a:avLst/>
-          </a:prstGeom>
-          <a:noFill/>
-        </p:spPr>
-        <p:txBody>
-          <a:bodyPr wrap="none" rtlCol="0">
-            <a:spAutoFit/>
-          </a:bodyPr>
-          <a:lstStyle/>
-          <a:p>
-            <a:r>
-              <a:rPr lang="en-US" dirty="0"/>
-              <a:t>AR </a:t>
-            </a:r>
-            <a:r>
-              <a:rPr lang="en-US" dirty="0" err="1"/>
-              <a:t>try_to_change</a:t>
-            </a:r>
-            <a:endParaRPr lang="en-CA" dirty="0"/>
-          </a:p>
-        </p:txBody>
-      </p:sp>
-      <p:grpSp>
-        <p:nvGrpSpPr>
-          <p:cNvPr id="22" name="Group 21">
-            <a:extLst>
-              <a:ext uri="{FF2B5EF4-FFF2-40B4-BE49-F238E27FC236}">
-                <a16:creationId xmlns:a16="http://schemas.microsoft.com/office/drawing/2014/main" id="{982695A6-3335-36E6-FD3D-834F959B04CF}"/>
-              </a:ext>
-            </a:extLst>
-          </p:cNvPr>
-          <p:cNvGrpSpPr>
-            <a:grpSpLocks/>
-          </p:cNvGrpSpPr>
+          <p:cNvGrpSpPr/>
           <p:nvPr/>
         </p:nvGrpSpPr>
         <p:grpSpPr>
           <a:xfrm>
-            <a:off x="2905125" y="2343149"/>
-            <a:ext cx="1647396" cy="371900"/>
-            <a:chOff x="2800350" y="2916554"/>
-            <a:chExt cx="1647396" cy="371900"/>
+            <a:off x="2021305" y="192505"/>
+            <a:ext cx="5871411" cy="1995839"/>
+            <a:chOff x="601354" y="736533"/>
+            <a:chExt cx="5885171" cy="2294021"/>
           </a:xfrm>
         </p:grpSpPr>
+        <p:cxnSp>
+          <p:nvCxnSpPr>
+            <p:cNvPr id="15" name="Straight Connector 14">
+              <a:extLst>
+                <a:ext uri="{FF2B5EF4-FFF2-40B4-BE49-F238E27FC236}">
+                  <a16:creationId xmlns:a16="http://schemas.microsoft.com/office/drawing/2014/main" id="{BA1B24E4-CAD0-61BB-3BCD-F0EDBB0857EC}"/>
+                </a:ext>
+              </a:extLst>
+            </p:cNvPr>
+            <p:cNvCxnSpPr>
+              <a:cxnSpLocks/>
+            </p:cNvCxnSpPr>
+            <p:nvPr/>
+          </p:nvCxnSpPr>
+          <p:spPr>
+            <a:xfrm>
+              <a:off x="2935605" y="1924150"/>
+              <a:ext cx="3550920" cy="0"/>
+            </a:xfrm>
+            <a:prstGeom prst="line">
+              <a:avLst/>
+            </a:prstGeom>
+          </p:spPr>
+          <p:style>
+            <a:lnRef idx="1">
+              <a:schemeClr val="dk1"/>
+            </a:lnRef>
+            <a:fillRef idx="0">
+              <a:schemeClr val="dk1"/>
+            </a:fillRef>
+            <a:effectRef idx="0">
+              <a:schemeClr val="dk1"/>
+            </a:effectRef>
+            <a:fontRef idx="minor">
+              <a:schemeClr val="tx1"/>
+            </a:fontRef>
+          </p:style>
+        </p:cxnSp>
         <p:sp>
           <p:nvSpPr>
-            <p:cNvPr id="71" name="Rectangle 70">
+            <p:cNvPr id="20" name="TextBox 19">
               <a:extLst>
                 <a:ext uri="{FF2B5EF4-FFF2-40B4-BE49-F238E27FC236}">
-                  <a16:creationId xmlns:a16="http://schemas.microsoft.com/office/drawing/2014/main" id="{875740E8-BEFB-D56E-F5B2-DC442359E673}"/>
+                  <a16:creationId xmlns:a16="http://schemas.microsoft.com/office/drawing/2014/main" id="{7C5DA3D0-0265-C798-81AC-E7A5480D1394}"/>
+                </a:ext>
+              </a:extLst>
+            </p:cNvPr>
+            <p:cNvSpPr txBox="1">
+              <a:spLocks/>
+            </p:cNvSpPr>
+            <p:nvPr/>
+          </p:nvSpPr>
+          <p:spPr>
+            <a:xfrm>
+              <a:off x="601354" y="1039333"/>
+              <a:ext cx="1859996" cy="369332"/>
+            </a:xfrm>
+            <a:prstGeom prst="rect">
+              <a:avLst/>
+            </a:prstGeom>
+            <a:noFill/>
+          </p:spPr>
+          <p:txBody>
+            <a:bodyPr wrap="none" rtlCol="0">
+              <a:spAutoFit/>
+            </a:bodyPr>
+            <a:lstStyle/>
+            <a:p>
+              <a:r>
+                <a:rPr lang="en-US" dirty="0"/>
+                <a:t>AR </a:t>
+              </a:r>
+              <a:r>
+                <a:rPr lang="en-US" dirty="0" err="1"/>
+                <a:t>try_to_change</a:t>
+              </a:r>
+              <a:endParaRPr lang="en-CA" dirty="0"/>
+            </a:p>
+          </p:txBody>
+        </p:sp>
+        <p:grpSp>
+          <p:nvGrpSpPr>
+            <p:cNvPr id="22" name="Group 21">
+              <a:extLst>
+                <a:ext uri="{FF2B5EF4-FFF2-40B4-BE49-F238E27FC236}">
+                  <a16:creationId xmlns:a16="http://schemas.microsoft.com/office/drawing/2014/main" id="{982695A6-3335-36E6-FD3D-834F959B04CF}"/>
+                </a:ext>
+              </a:extLst>
+            </p:cNvPr>
+            <p:cNvGrpSpPr>
+              <a:grpSpLocks/>
+            </p:cNvGrpSpPr>
+            <p:nvPr/>
+          </p:nvGrpSpPr>
+          <p:grpSpPr>
+            <a:xfrm>
+              <a:off x="2905125" y="2343149"/>
+              <a:ext cx="1647396" cy="371900"/>
+              <a:chOff x="2800350" y="2916554"/>
+              <a:chExt cx="1647396" cy="371900"/>
+            </a:xfrm>
+          </p:grpSpPr>
+          <p:sp>
+            <p:nvSpPr>
+              <p:cNvPr id="71" name="Rectangle 70">
+                <a:extLst>
+                  <a:ext uri="{FF2B5EF4-FFF2-40B4-BE49-F238E27FC236}">
+                    <a16:creationId xmlns:a16="http://schemas.microsoft.com/office/drawing/2014/main" id="{875740E8-BEFB-D56E-F5B2-DC442359E673}"/>
+                  </a:ext>
+                </a:extLst>
+              </p:cNvPr>
+              <p:cNvSpPr>
+                <a:spLocks/>
+              </p:cNvSpPr>
+              <p:nvPr/>
+            </p:nvSpPr>
+            <p:spPr>
+              <a:xfrm>
+                <a:off x="3448049" y="2916554"/>
+                <a:ext cx="999697" cy="338609"/>
+              </a:xfrm>
+              <a:prstGeom prst="rect">
+                <a:avLst/>
+              </a:prstGeom>
+              <a:noFill/>
+              <a:ln>
+                <a:solidFill>
+                  <a:schemeClr val="tx1"/>
+                </a:solidFill>
+              </a:ln>
+            </p:spPr>
+            <p:style>
+              <a:lnRef idx="2">
+                <a:schemeClr val="accent1">
+                  <a:shade val="15000"/>
+                </a:schemeClr>
+              </a:lnRef>
+              <a:fillRef idx="1">
+                <a:schemeClr val="accent1"/>
+              </a:fillRef>
+              <a:effectRef idx="0">
+                <a:schemeClr val="accent1"/>
+              </a:effectRef>
+              <a:fontRef idx="minor">
+                <a:schemeClr val="lt1"/>
+              </a:fontRef>
+            </p:style>
+            <p:txBody>
+              <a:bodyPr rtlCol="0" anchor="ctr"/>
+              <a:lstStyle/>
+              <a:p>
+                <a:pPr algn="ctr"/>
+                <a:endParaRPr lang="en-CA"/>
+              </a:p>
+            </p:txBody>
+          </p:sp>
+          <p:sp>
+            <p:nvSpPr>
+              <p:cNvPr id="72" name="TextBox 71">
+                <a:extLst>
+                  <a:ext uri="{FF2B5EF4-FFF2-40B4-BE49-F238E27FC236}">
+                    <a16:creationId xmlns:a16="http://schemas.microsoft.com/office/drawing/2014/main" id="{625ADCAE-8AAA-BFA4-2A54-E103F613E66F}"/>
+                  </a:ext>
+                </a:extLst>
+              </p:cNvPr>
+              <p:cNvSpPr txBox="1">
+                <a:spLocks/>
+              </p:cNvSpPr>
+              <p:nvPr/>
+            </p:nvSpPr>
+            <p:spPr>
+              <a:xfrm>
+                <a:off x="2800350" y="2919122"/>
+                <a:ext cx="626009" cy="369332"/>
+              </a:xfrm>
+              <a:prstGeom prst="rect">
+                <a:avLst/>
+              </a:prstGeom>
+              <a:noFill/>
+            </p:spPr>
+            <p:txBody>
+              <a:bodyPr wrap="square" rtlCol="0">
+                <a:spAutoFit/>
+              </a:bodyPr>
+              <a:lstStyle/>
+              <a:p>
+                <a:pPr algn="ctr"/>
+                <a:r>
+                  <a:rPr lang="en-US" dirty="0" err="1"/>
+                  <a:t>dest</a:t>
+                </a:r>
+                <a:endParaRPr lang="en-CA" dirty="0"/>
+              </a:p>
+            </p:txBody>
+          </p:sp>
+        </p:grpSp>
+        <p:sp>
+          <p:nvSpPr>
+            <p:cNvPr id="25" name="Rectangle 24">
+              <a:extLst>
+                <a:ext uri="{FF2B5EF4-FFF2-40B4-BE49-F238E27FC236}">
+                  <a16:creationId xmlns:a16="http://schemas.microsoft.com/office/drawing/2014/main" id="{24847AA7-D9EA-BC1F-621B-EE58EB859C0A}"/>
                 </a:ext>
               </a:extLst>
             </p:cNvPr>
@@ -8744,8 +8881,8 @@
           </p:nvSpPr>
           <p:spPr>
             <a:xfrm>
-              <a:off x="3448049" y="2916554"/>
-              <a:ext cx="999697" cy="338609"/>
+              <a:off x="2920165" y="736533"/>
+              <a:ext cx="3553326" cy="2294021"/>
             </a:xfrm>
             <a:prstGeom prst="rect">
               <a:avLst/>
@@ -8784,22 +8921,20 @@
         </p:sp>
         <p:sp>
           <p:nvSpPr>
-            <p:cNvPr id="72" name="TextBox 71">
+            <p:cNvPr id="87" name="TextBox 86">
               <a:extLst>
                 <a:ext uri="{FF2B5EF4-FFF2-40B4-BE49-F238E27FC236}">
-                  <a16:creationId xmlns:a16="http://schemas.microsoft.com/office/drawing/2014/main" id="{625ADCAE-8AAA-BFA4-2A54-E103F613E66F}"/>
+                  <a16:creationId xmlns:a16="http://schemas.microsoft.com/office/drawing/2014/main" id="{44153DC0-0D4D-4279-71A2-9DBDF6CC287B}"/>
                 </a:ext>
               </a:extLst>
             </p:cNvPr>
-            <p:cNvSpPr txBox="1">
-              <a:spLocks/>
-            </p:cNvSpPr>
+            <p:cNvSpPr txBox="1"/>
             <p:nvPr/>
           </p:nvSpPr>
           <p:spPr>
             <a:xfrm>
-              <a:off x="2800350" y="2919122"/>
-              <a:ext cx="626009" cy="369332"/>
+              <a:off x="2926080" y="1104900"/>
+              <a:ext cx="3550920" cy="369332"/>
             </a:xfrm>
             <a:prstGeom prst="rect">
               <a:avLst/>
@@ -8814,68 +8949,475 @@
             <a:p>
               <a:pPr algn="ctr"/>
               <a:r>
-                <a:rPr lang="en-US" dirty="0" err="1"/>
-                <a:t>dest</a:t>
+                <a:rPr lang="en-US" dirty="0"/>
+                <a:t>No local variables</a:t>
               </a:r>
               <a:endParaRPr lang="en-CA" dirty="0"/>
             </a:p>
           </p:txBody>
         </p:sp>
       </p:grpSp>
-      <p:sp>
-        <p:nvSpPr>
-          <p:cNvPr id="25" name="Rectangle 24">
+      <p:grpSp>
+        <p:nvGrpSpPr>
+          <p:cNvPr id="51" name="Group 50">
             <a:extLst>
               <a:ext uri="{FF2B5EF4-FFF2-40B4-BE49-F238E27FC236}">
-                <a16:creationId xmlns:a16="http://schemas.microsoft.com/office/drawing/2014/main" id="{24847AA7-D9EA-BC1F-621B-EE58EB859C0A}"/>
+                <a16:creationId xmlns:a16="http://schemas.microsoft.com/office/drawing/2014/main" id="{FE2361C6-9E61-47E8-B167-69AAADBFEC3F}"/>
               </a:ext>
             </a:extLst>
           </p:cNvPr>
-          <p:cNvSpPr>
-            <a:spLocks/>
-          </p:cNvSpPr>
+          <p:cNvGrpSpPr/>
           <p:nvPr/>
-        </p:nvSpPr>
+        </p:nvGrpSpPr>
+        <p:grpSpPr>
+          <a:xfrm>
+            <a:off x="2406314" y="2310062"/>
+            <a:ext cx="5474370" cy="2176313"/>
+            <a:chOff x="892812" y="736533"/>
+            <a:chExt cx="5593713" cy="2294021"/>
+          </a:xfrm>
+        </p:grpSpPr>
+        <p:cxnSp>
+          <p:nvCxnSpPr>
+            <p:cNvPr id="53" name="Straight Connector 52">
+              <a:extLst>
+                <a:ext uri="{FF2B5EF4-FFF2-40B4-BE49-F238E27FC236}">
+                  <a16:creationId xmlns:a16="http://schemas.microsoft.com/office/drawing/2014/main" id="{7D275412-A52F-159B-FDB2-D2D35FDAF60B}"/>
+                </a:ext>
+              </a:extLst>
+            </p:cNvPr>
+            <p:cNvCxnSpPr>
+              <a:cxnSpLocks/>
+            </p:cNvCxnSpPr>
+            <p:nvPr/>
+          </p:nvCxnSpPr>
+          <p:spPr>
+            <a:xfrm>
+              <a:off x="2935605" y="1924150"/>
+              <a:ext cx="3550920" cy="0"/>
+            </a:xfrm>
+            <a:prstGeom prst="line">
+              <a:avLst/>
+            </a:prstGeom>
+          </p:spPr>
+          <p:style>
+            <a:lnRef idx="1">
+              <a:schemeClr val="dk1"/>
+            </a:lnRef>
+            <a:fillRef idx="0">
+              <a:schemeClr val="dk1"/>
+            </a:fillRef>
+            <a:effectRef idx="0">
+              <a:schemeClr val="dk1"/>
+            </a:effectRef>
+            <a:fontRef idx="minor">
+              <a:schemeClr val="tx1"/>
+            </a:fontRef>
+          </p:style>
+        </p:cxnSp>
+        <p:sp>
+          <p:nvSpPr>
+            <p:cNvPr id="55" name="TextBox 54">
+              <a:extLst>
+                <a:ext uri="{FF2B5EF4-FFF2-40B4-BE49-F238E27FC236}">
+                  <a16:creationId xmlns:a16="http://schemas.microsoft.com/office/drawing/2014/main" id="{66F249F6-A3F3-0F34-2A9A-496B848D1534}"/>
+                </a:ext>
+              </a:extLst>
+            </p:cNvPr>
+            <p:cNvSpPr txBox="1">
+              <a:spLocks/>
+            </p:cNvSpPr>
+            <p:nvPr/>
+          </p:nvSpPr>
+          <p:spPr>
+            <a:xfrm>
+              <a:off x="892812" y="1008464"/>
+              <a:ext cx="1628010" cy="369332"/>
+            </a:xfrm>
+            <a:prstGeom prst="rect">
+              <a:avLst/>
+            </a:prstGeom>
+            <a:noFill/>
+          </p:spPr>
+          <p:txBody>
+            <a:bodyPr wrap="none" rtlCol="0">
+              <a:spAutoFit/>
+            </a:bodyPr>
+            <a:lstStyle/>
+            <a:p>
+              <a:r>
+                <a:rPr lang="en-US" dirty="0"/>
+                <a:t>AR </a:t>
+              </a:r>
+              <a:r>
+                <a:rPr lang="en-US" dirty="0" err="1"/>
+                <a:t>try_to_copy</a:t>
+              </a:r>
+              <a:endParaRPr lang="en-CA" dirty="0"/>
+            </a:p>
+          </p:txBody>
+        </p:sp>
+        <p:grpSp>
+          <p:nvGrpSpPr>
+            <p:cNvPr id="57" name="Group 56">
+              <a:extLst>
+                <a:ext uri="{FF2B5EF4-FFF2-40B4-BE49-F238E27FC236}">
+                  <a16:creationId xmlns:a16="http://schemas.microsoft.com/office/drawing/2014/main" id="{4AC5B0F8-AEED-963E-BBD2-DA277FA50BD6}"/>
+                </a:ext>
+              </a:extLst>
+            </p:cNvPr>
+            <p:cNvGrpSpPr>
+              <a:grpSpLocks/>
+            </p:cNvGrpSpPr>
+            <p:nvPr/>
+          </p:nvGrpSpPr>
+          <p:grpSpPr>
+            <a:xfrm>
+              <a:off x="2905125" y="2343149"/>
+              <a:ext cx="1647396" cy="371900"/>
+              <a:chOff x="2800350" y="2916554"/>
+              <a:chExt cx="1647396" cy="371900"/>
+            </a:xfrm>
+          </p:grpSpPr>
+          <p:sp>
+            <p:nvSpPr>
+              <p:cNvPr id="73" name="Rectangle 72">
+                <a:extLst>
+                  <a:ext uri="{FF2B5EF4-FFF2-40B4-BE49-F238E27FC236}">
+                    <a16:creationId xmlns:a16="http://schemas.microsoft.com/office/drawing/2014/main" id="{77B7EA06-BD12-3794-578D-FD05418612F4}"/>
+                  </a:ext>
+                </a:extLst>
+              </p:cNvPr>
+              <p:cNvSpPr>
+                <a:spLocks/>
+              </p:cNvSpPr>
+              <p:nvPr/>
+            </p:nvSpPr>
+            <p:spPr>
+              <a:xfrm>
+                <a:off x="3448049" y="2916554"/>
+                <a:ext cx="999697" cy="338609"/>
+              </a:xfrm>
+              <a:prstGeom prst="rect">
+                <a:avLst/>
+              </a:prstGeom>
+              <a:noFill/>
+              <a:ln>
+                <a:solidFill>
+                  <a:schemeClr val="tx1"/>
+                </a:solidFill>
+              </a:ln>
+            </p:spPr>
+            <p:style>
+              <a:lnRef idx="2">
+                <a:schemeClr val="accent1">
+                  <a:shade val="15000"/>
+                </a:schemeClr>
+              </a:lnRef>
+              <a:fillRef idx="1">
+                <a:schemeClr val="accent1"/>
+              </a:fillRef>
+              <a:effectRef idx="0">
+                <a:schemeClr val="accent1"/>
+              </a:effectRef>
+              <a:fontRef idx="minor">
+                <a:schemeClr val="lt1"/>
+              </a:fontRef>
+            </p:style>
+            <p:txBody>
+              <a:bodyPr rtlCol="0" anchor="ctr"/>
+              <a:lstStyle/>
+              <a:p>
+                <a:pPr algn="ctr"/>
+                <a:endParaRPr lang="en-CA"/>
+              </a:p>
+            </p:txBody>
+          </p:sp>
+          <p:sp>
+            <p:nvSpPr>
+              <p:cNvPr id="80" name="TextBox 79">
+                <a:extLst>
+                  <a:ext uri="{FF2B5EF4-FFF2-40B4-BE49-F238E27FC236}">
+                    <a16:creationId xmlns:a16="http://schemas.microsoft.com/office/drawing/2014/main" id="{21FB3EB6-FC9C-5CB7-CD73-CA4D3C3DB980}"/>
+                  </a:ext>
+                </a:extLst>
+              </p:cNvPr>
+              <p:cNvSpPr txBox="1">
+                <a:spLocks/>
+              </p:cNvSpPr>
+              <p:nvPr/>
+            </p:nvSpPr>
+            <p:spPr>
+              <a:xfrm>
+                <a:off x="2800350" y="2919122"/>
+                <a:ext cx="626009" cy="369332"/>
+              </a:xfrm>
+              <a:prstGeom prst="rect">
+                <a:avLst/>
+              </a:prstGeom>
+              <a:noFill/>
+            </p:spPr>
+            <p:txBody>
+              <a:bodyPr wrap="square" rtlCol="0">
+                <a:spAutoFit/>
+              </a:bodyPr>
+              <a:lstStyle/>
+              <a:p>
+                <a:pPr algn="ctr"/>
+                <a:r>
+                  <a:rPr lang="en-US" dirty="0" err="1"/>
+                  <a:t>dest</a:t>
+                </a:r>
+                <a:endParaRPr lang="en-CA" dirty="0"/>
+              </a:p>
+            </p:txBody>
+          </p:sp>
+        </p:grpSp>
+        <p:sp>
+          <p:nvSpPr>
+            <p:cNvPr id="58" name="Rectangle 57">
+              <a:extLst>
+                <a:ext uri="{FF2B5EF4-FFF2-40B4-BE49-F238E27FC236}">
+                  <a16:creationId xmlns:a16="http://schemas.microsoft.com/office/drawing/2014/main" id="{B233CF36-E7F8-BDE7-1D88-545F1A6A3D45}"/>
+                </a:ext>
+              </a:extLst>
+            </p:cNvPr>
+            <p:cNvSpPr>
+              <a:spLocks/>
+            </p:cNvSpPr>
+            <p:nvPr/>
+          </p:nvSpPr>
+          <p:spPr>
+            <a:xfrm>
+              <a:off x="2920165" y="736533"/>
+              <a:ext cx="3553326" cy="2294021"/>
+            </a:xfrm>
+            <a:prstGeom prst="rect">
+              <a:avLst/>
+            </a:prstGeom>
+            <a:noFill/>
+            <a:ln>
+              <a:solidFill>
+                <a:schemeClr val="tx1"/>
+              </a:solidFill>
+            </a:ln>
+          </p:spPr>
+          <p:style>
+            <a:lnRef idx="2">
+              <a:schemeClr val="accent1">
+                <a:shade val="15000"/>
+              </a:schemeClr>
+            </a:lnRef>
+            <a:fillRef idx="1">
+              <a:schemeClr val="accent1"/>
+            </a:fillRef>
+            <a:effectRef idx="0">
+              <a:schemeClr val="accent1"/>
+            </a:effectRef>
+            <a:fontRef idx="minor">
+              <a:schemeClr val="lt1"/>
+            </a:fontRef>
+          </p:style>
+          <p:txBody>
+            <a:bodyPr rtlCol="0" anchor="ctr"/>
+            <a:lstStyle/>
+            <a:p>
+              <a:pPr algn="ctr"/>
+              <a:endParaRPr lang="en-CA"/>
+            </a:p>
+          </p:txBody>
+        </p:sp>
+        <p:grpSp>
+          <p:nvGrpSpPr>
+            <p:cNvPr id="60" name="Group 59">
+              <a:extLst>
+                <a:ext uri="{FF2B5EF4-FFF2-40B4-BE49-F238E27FC236}">
+                  <a16:creationId xmlns:a16="http://schemas.microsoft.com/office/drawing/2014/main" id="{A10A9A93-024E-79D0-D332-9B8609BB13F8}"/>
+                </a:ext>
+              </a:extLst>
+            </p:cNvPr>
+            <p:cNvGrpSpPr>
+              <a:grpSpLocks/>
+            </p:cNvGrpSpPr>
+            <p:nvPr/>
+          </p:nvGrpSpPr>
+          <p:grpSpPr>
+            <a:xfrm>
+              <a:off x="4505325" y="2336192"/>
+              <a:ext cx="1799796" cy="369332"/>
+              <a:chOff x="2647950" y="2900072"/>
+              <a:chExt cx="1799796" cy="369332"/>
+            </a:xfrm>
+          </p:grpSpPr>
+          <p:sp>
+            <p:nvSpPr>
+              <p:cNvPr id="69" name="Rectangle 68">
+                <a:extLst>
+                  <a:ext uri="{FF2B5EF4-FFF2-40B4-BE49-F238E27FC236}">
+                    <a16:creationId xmlns:a16="http://schemas.microsoft.com/office/drawing/2014/main" id="{42E06D45-3A30-58E0-2294-B64A350218F6}"/>
+                  </a:ext>
+                </a:extLst>
+              </p:cNvPr>
+              <p:cNvSpPr>
+                <a:spLocks/>
+              </p:cNvSpPr>
+              <p:nvPr/>
+            </p:nvSpPr>
+            <p:spPr>
+              <a:xfrm>
+                <a:off x="3448049" y="2916554"/>
+                <a:ext cx="999697" cy="338609"/>
+              </a:xfrm>
+              <a:prstGeom prst="rect">
+                <a:avLst/>
+              </a:prstGeom>
+              <a:noFill/>
+              <a:ln>
+                <a:solidFill>
+                  <a:schemeClr val="tx1"/>
+                </a:solidFill>
+              </a:ln>
+            </p:spPr>
+            <p:style>
+              <a:lnRef idx="2">
+                <a:schemeClr val="accent1">
+                  <a:shade val="15000"/>
+                </a:schemeClr>
+              </a:lnRef>
+              <a:fillRef idx="1">
+                <a:schemeClr val="accent1"/>
+              </a:fillRef>
+              <a:effectRef idx="0">
+                <a:schemeClr val="accent1"/>
+              </a:effectRef>
+              <a:fontRef idx="minor">
+                <a:schemeClr val="lt1"/>
+              </a:fontRef>
+            </p:style>
+            <p:txBody>
+              <a:bodyPr rtlCol="0" anchor="ctr"/>
+              <a:lstStyle/>
+              <a:p>
+                <a:pPr algn="ctr"/>
+                <a:endParaRPr lang="en-CA"/>
+              </a:p>
+            </p:txBody>
+          </p:sp>
+          <p:sp>
+            <p:nvSpPr>
+              <p:cNvPr id="70" name="TextBox 69">
+                <a:extLst>
+                  <a:ext uri="{FF2B5EF4-FFF2-40B4-BE49-F238E27FC236}">
+                    <a16:creationId xmlns:a16="http://schemas.microsoft.com/office/drawing/2014/main" id="{3D89BA28-F4FE-193B-6163-571BE1E35A2E}"/>
+                  </a:ext>
+                </a:extLst>
+              </p:cNvPr>
+              <p:cNvSpPr txBox="1">
+                <a:spLocks/>
+              </p:cNvSpPr>
+              <p:nvPr/>
+            </p:nvSpPr>
+            <p:spPr>
+              <a:xfrm>
+                <a:off x="2647950" y="2900072"/>
+                <a:ext cx="847725" cy="369332"/>
+              </a:xfrm>
+              <a:prstGeom prst="rect">
+                <a:avLst/>
+              </a:prstGeom>
+              <a:noFill/>
+            </p:spPr>
+            <p:txBody>
+              <a:bodyPr wrap="square" rtlCol="0">
+                <a:spAutoFit/>
+              </a:bodyPr>
+              <a:lstStyle/>
+              <a:p>
+                <a:pPr algn="ctr"/>
+                <a:r>
+                  <a:rPr lang="en-US" dirty="0"/>
+                  <a:t>source</a:t>
+                </a:r>
+                <a:endParaRPr lang="en-CA" dirty="0"/>
+              </a:p>
+            </p:txBody>
+          </p:sp>
+        </p:grpSp>
+        <p:sp>
+          <p:nvSpPr>
+            <p:cNvPr id="68" name="TextBox 67">
+              <a:extLst>
+                <a:ext uri="{FF2B5EF4-FFF2-40B4-BE49-F238E27FC236}">
+                  <a16:creationId xmlns:a16="http://schemas.microsoft.com/office/drawing/2014/main" id="{C93193B3-D894-4673-4707-968450D1D32B}"/>
+                </a:ext>
+              </a:extLst>
+            </p:cNvPr>
+            <p:cNvSpPr txBox="1"/>
+            <p:nvPr/>
+          </p:nvSpPr>
+          <p:spPr>
+            <a:xfrm>
+              <a:off x="2926080" y="1104900"/>
+              <a:ext cx="3550920" cy="369332"/>
+            </a:xfrm>
+            <a:prstGeom prst="rect">
+              <a:avLst/>
+            </a:prstGeom>
+            <a:noFill/>
+          </p:spPr>
+          <p:txBody>
+            <a:bodyPr wrap="square" rtlCol="0">
+              <a:spAutoFit/>
+            </a:bodyPr>
+            <a:lstStyle/>
+            <a:p>
+              <a:pPr algn="ctr"/>
+              <a:r>
+                <a:rPr lang="en-US" dirty="0"/>
+                <a:t>No local variables</a:t>
+              </a:r>
+              <a:endParaRPr lang="en-CA" dirty="0"/>
+            </a:p>
+          </p:txBody>
+        </p:sp>
+      </p:grpSp>
+      <p:cxnSp>
+        <p:nvCxnSpPr>
+          <p:cNvPr id="83" name="Straight Connector 82">
+            <a:extLst>
+              <a:ext uri="{FF2B5EF4-FFF2-40B4-BE49-F238E27FC236}">
+                <a16:creationId xmlns:a16="http://schemas.microsoft.com/office/drawing/2014/main" id="{2DC66468-0E83-5271-CDCE-31F18BEF227A}"/>
+              </a:ext>
+            </a:extLst>
+          </p:cNvPr>
+          <p:cNvCxnSpPr/>
+          <p:nvPr/>
+        </p:nvCxnSpPr>
         <p:spPr>
-          <a:xfrm>
-            <a:off x="2920165" y="736533"/>
-            <a:ext cx="3553326" cy="2294021"/>
+          <a:xfrm flipV="1">
+            <a:off x="2381233" y="2712204"/>
+            <a:ext cx="6918158" cy="1323474"/>
           </a:xfrm>
-          <a:prstGeom prst="rect">
+          <a:prstGeom prst="line">
             <a:avLst/>
           </a:prstGeom>
-          <a:noFill/>
-          <a:ln>
-            <a:solidFill>
-              <a:schemeClr val="tx1"/>
-            </a:solidFill>
-          </a:ln>
+          <a:ln w="127000"/>
         </p:spPr>
         <p:style>
-          <a:lnRef idx="2">
-            <a:schemeClr val="accent1">
-              <a:shade val="15000"/>
-            </a:schemeClr>
+          <a:lnRef idx="1">
+            <a:schemeClr val="dk1"/>
           </a:lnRef>
-          <a:fillRef idx="1">
-            <a:schemeClr val="accent1"/>
+          <a:fillRef idx="0">
+            <a:schemeClr val="dk1"/>
           </a:fillRef>
           <a:effectRef idx="0">
-            <a:schemeClr val="accent1"/>
+            <a:schemeClr val="dk1"/>
           </a:effectRef>
           <a:fontRef idx="minor">
-            <a:schemeClr val="lt1"/>
+            <a:schemeClr val="tx1"/>
           </a:fontRef>
         </p:style>
-        <p:txBody>
-          <a:bodyPr rtlCol="0" anchor="ctr"/>
-          <a:lstStyle/>
-          <a:p>
-            <a:pPr algn="ctr"/>
-            <a:endParaRPr lang="en-CA"/>
-          </a:p>
-        </p:txBody>
-      </p:sp>
+      </p:cxnSp>
       <p:cxnSp>
         <p:nvCxnSpPr>
           <p:cNvPr id="84" name="Connector: Curved 83">
@@ -8886,14 +9428,15 @@
             </a:extLst>
           </p:cNvPr>
           <p:cNvCxnSpPr>
+            <a:cxnSpLocks/>
             <a:endCxn id="54" idx="3"/>
           </p:cNvCxnSpPr>
           <p:nvPr/>
         </p:nvCxnSpPr>
         <p:spPr>
           <a:xfrm rot="5400000">
-            <a:off x="2785424" y="3266026"/>
-            <a:ext cx="2023653" cy="520801"/>
+            <a:off x="3321508" y="3418958"/>
+            <a:ext cx="3800771" cy="422334"/>
           </a:xfrm>
           <a:prstGeom prst="curvedConnector2">
             <a:avLst/>
@@ -8920,43 +9463,6 @@
           </a:fontRef>
         </p:style>
       </p:cxnSp>
-      <p:sp>
-        <p:nvSpPr>
-          <p:cNvPr id="87" name="TextBox 86">
-            <a:extLst>
-              <a:ext uri="{FF2B5EF4-FFF2-40B4-BE49-F238E27FC236}">
-                <a16:creationId xmlns:a16="http://schemas.microsoft.com/office/drawing/2014/main" id="{44153DC0-0D4D-4279-71A2-9DBDF6CC287B}"/>
-              </a:ext>
-            </a:extLst>
-          </p:cNvPr>
-          <p:cNvSpPr txBox="1"/>
-          <p:nvPr/>
-        </p:nvSpPr>
-        <p:spPr>
-          <a:xfrm>
-            <a:off x="2926080" y="1104900"/>
-            <a:ext cx="3550920" cy="369332"/>
-          </a:xfrm>
-          <a:prstGeom prst="rect">
-            <a:avLst/>
-          </a:prstGeom>
-          <a:noFill/>
-        </p:spPr>
-        <p:txBody>
-          <a:bodyPr wrap="square" rtlCol="0">
-            <a:spAutoFit/>
-          </a:bodyPr>
-          <a:lstStyle/>
-          <a:p>
-            <a:pPr algn="ctr"/>
-            <a:r>
-              <a:rPr lang="en-US" dirty="0"/>
-              <a:t>No local variables</a:t>
-            </a:r>
-            <a:endParaRPr lang="en-CA" dirty="0"/>
-          </a:p>
-        </p:txBody>
-      </p:sp>
     </p:spTree>
     <p:extLst>
       <p:ext uri="{BB962C8B-B14F-4D97-AF65-F5344CB8AC3E}">
@@ -10668,122 +11174,45 @@
           </a:p>
         </p:txBody>
       </p:sp>
-      <p:grpSp>
-        <p:nvGrpSpPr>
-          <p:cNvPr id="22" name="Group 21">
+      <p:sp>
+        <p:nvSpPr>
+          <p:cNvPr id="72" name="TextBox 71">
             <a:extLst>
               <a:ext uri="{FF2B5EF4-FFF2-40B4-BE49-F238E27FC236}">
-                <a16:creationId xmlns:a16="http://schemas.microsoft.com/office/drawing/2014/main" id="{982695A6-3335-36E6-FD3D-834F959B04CF}"/>
+                <a16:creationId xmlns:a16="http://schemas.microsoft.com/office/drawing/2014/main" id="{625ADCAE-8AAA-BFA4-2A54-E103F613E66F}"/>
               </a:ext>
             </a:extLst>
           </p:cNvPr>
-          <p:cNvGrpSpPr>
-            <a:grpSpLocks/>
-          </p:cNvGrpSpPr>
+          <p:cNvSpPr txBox="1">
+            <a:spLocks/>
+          </p:cNvSpPr>
           <p:nvPr/>
-        </p:nvGrpSpPr>
-        <p:grpSpPr>
+        </p:nvSpPr>
+        <p:spPr>
           <a:xfrm>
-            <a:off x="2905125" y="2343149"/>
-            <a:ext cx="1647396" cy="371900"/>
-            <a:chOff x="2800350" y="2916554"/>
-            <a:chExt cx="1647396" cy="371900"/>
+            <a:off x="2905125" y="2345717"/>
+            <a:ext cx="626009" cy="369332"/>
           </a:xfrm>
-        </p:grpSpPr>
-        <p:sp>
-          <p:nvSpPr>
-            <p:cNvPr id="71" name="Rectangle 70">
-              <a:extLst>
-                <a:ext uri="{FF2B5EF4-FFF2-40B4-BE49-F238E27FC236}">
-                  <a16:creationId xmlns:a16="http://schemas.microsoft.com/office/drawing/2014/main" id="{875740E8-BEFB-D56E-F5B2-DC442359E673}"/>
-                </a:ext>
-              </a:extLst>
-            </p:cNvPr>
-            <p:cNvSpPr>
-              <a:spLocks/>
-            </p:cNvSpPr>
-            <p:nvPr/>
-          </p:nvSpPr>
-          <p:spPr>
-            <a:xfrm>
-              <a:off x="3448049" y="2916554"/>
-              <a:ext cx="999697" cy="338609"/>
-            </a:xfrm>
-            <a:prstGeom prst="rect">
-              <a:avLst/>
-            </a:prstGeom>
-            <a:noFill/>
-            <a:ln>
-              <a:solidFill>
-                <a:schemeClr val="tx1"/>
-              </a:solidFill>
-            </a:ln>
-          </p:spPr>
-          <p:style>
-            <a:lnRef idx="2">
-              <a:schemeClr val="accent1">
-                <a:shade val="15000"/>
-              </a:schemeClr>
-            </a:lnRef>
-            <a:fillRef idx="1">
-              <a:schemeClr val="accent1"/>
-            </a:fillRef>
-            <a:effectRef idx="0">
-              <a:schemeClr val="accent1"/>
-            </a:effectRef>
-            <a:fontRef idx="minor">
-              <a:schemeClr val="lt1"/>
-            </a:fontRef>
-          </p:style>
-          <p:txBody>
-            <a:bodyPr rtlCol="0" anchor="ctr"/>
-            <a:lstStyle/>
-            <a:p>
-              <a:pPr algn="ctr"/>
-              <a:endParaRPr lang="en-CA"/>
-            </a:p>
-          </p:txBody>
-        </p:sp>
-        <p:sp>
-          <p:nvSpPr>
-            <p:cNvPr id="72" name="TextBox 71">
-              <a:extLst>
-                <a:ext uri="{FF2B5EF4-FFF2-40B4-BE49-F238E27FC236}">
-                  <a16:creationId xmlns:a16="http://schemas.microsoft.com/office/drawing/2014/main" id="{625ADCAE-8AAA-BFA4-2A54-E103F613E66F}"/>
-                </a:ext>
-              </a:extLst>
-            </p:cNvPr>
-            <p:cNvSpPr txBox="1">
-              <a:spLocks/>
-            </p:cNvSpPr>
-            <p:nvPr/>
-          </p:nvSpPr>
-          <p:spPr>
-            <a:xfrm>
-              <a:off x="2800350" y="2919122"/>
-              <a:ext cx="626009" cy="369332"/>
-            </a:xfrm>
-            <a:prstGeom prst="rect">
-              <a:avLst/>
-            </a:prstGeom>
-            <a:noFill/>
-          </p:spPr>
-          <p:txBody>
-            <a:bodyPr wrap="square" rtlCol="0">
-              <a:spAutoFit/>
-            </a:bodyPr>
-            <a:lstStyle/>
-            <a:p>
-              <a:pPr algn="ctr"/>
-              <a:r>
-                <a:rPr lang="en-US" dirty="0" err="1"/>
-                <a:t>arg</a:t>
-              </a:r>
-              <a:endParaRPr lang="en-CA" dirty="0"/>
-            </a:p>
-          </p:txBody>
-        </p:sp>
-      </p:grpSp>
+          <a:prstGeom prst="rect">
+            <a:avLst/>
+          </a:prstGeom>
+          <a:noFill/>
+        </p:spPr>
+        <p:txBody>
+          <a:bodyPr wrap="square" rtlCol="0">
+            <a:spAutoFit/>
+          </a:bodyPr>
+          <a:lstStyle/>
+          <a:p>
+            <a:pPr algn="ctr"/>
+            <a:r>
+              <a:rPr lang="en-US" dirty="0" err="1"/>
+              <a:t>arg</a:t>
+            </a:r>
+            <a:endParaRPr lang="en-CA" dirty="0"/>
+          </a:p>
+        </p:txBody>
+      </p:sp>
       <p:sp>
         <p:nvSpPr>
           <p:cNvPr id="25" name="Rectangle 24">
@@ -10838,51 +11267,6 @@
           </a:p>
         </p:txBody>
       </p:sp>
-      <p:cxnSp>
-        <p:nvCxnSpPr>
-          <p:cNvPr id="84" name="Connector: Curved 83">
-            <a:extLst>
-              <a:ext uri="{FF2B5EF4-FFF2-40B4-BE49-F238E27FC236}">
-                <a16:creationId xmlns:a16="http://schemas.microsoft.com/office/drawing/2014/main" id="{06CC5023-9014-CF1C-002C-B1F7E1690F1E}"/>
-              </a:ext>
-            </a:extLst>
-          </p:cNvPr>
-          <p:cNvCxnSpPr>
-            <a:cxnSpLocks/>
-            <a:endCxn id="97" idx="1"/>
-          </p:cNvCxnSpPr>
-          <p:nvPr/>
-        </p:nvCxnSpPr>
-        <p:spPr>
-          <a:xfrm rot="16200000" flipH="1">
-            <a:off x="2847584" y="3724667"/>
-            <a:ext cx="2568724" cy="148588"/>
-          </a:xfrm>
-          <a:prstGeom prst="curvedConnector2">
-            <a:avLst/>
-          </a:prstGeom>
-          <a:ln>
-            <a:solidFill>
-              <a:srgbClr val="C00000"/>
-            </a:solidFill>
-            <a:tailEnd type="triangle"/>
-          </a:ln>
-        </p:spPr>
-        <p:style>
-          <a:lnRef idx="1">
-            <a:schemeClr val="accent1"/>
-          </a:lnRef>
-          <a:fillRef idx="0">
-            <a:schemeClr val="accent1"/>
-          </a:fillRef>
-          <a:effectRef idx="0">
-            <a:schemeClr val="accent1"/>
-          </a:effectRef>
-          <a:fontRef idx="minor">
-            <a:schemeClr val="tx1"/>
-          </a:fontRef>
-        </p:style>
-      </p:cxnSp>
       <p:sp>
         <p:nvSpPr>
           <p:cNvPr id="87" name="TextBox 86">
@@ -10920,6 +11304,320 @@
           </a:p>
         </p:txBody>
       </p:sp>
+      <p:sp>
+        <p:nvSpPr>
+          <p:cNvPr id="71" name="Rectangle 70">
+            <a:extLst>
+              <a:ext uri="{FF2B5EF4-FFF2-40B4-BE49-F238E27FC236}">
+                <a16:creationId xmlns:a16="http://schemas.microsoft.com/office/drawing/2014/main" id="{875740E8-BEFB-D56E-F5B2-DC442359E673}"/>
+              </a:ext>
+            </a:extLst>
+          </p:cNvPr>
+          <p:cNvSpPr>
+            <a:spLocks/>
+          </p:cNvSpPr>
+          <p:nvPr/>
+        </p:nvSpPr>
+        <p:spPr>
+          <a:xfrm>
+            <a:off x="3420477" y="2367212"/>
+            <a:ext cx="477756" cy="338609"/>
+          </a:xfrm>
+          <a:prstGeom prst="rect">
+            <a:avLst/>
+          </a:prstGeom>
+          <a:noFill/>
+          <a:ln>
+            <a:solidFill>
+              <a:schemeClr val="tx1"/>
+            </a:solidFill>
+          </a:ln>
+        </p:spPr>
+        <p:style>
+          <a:lnRef idx="2">
+            <a:schemeClr val="accent1">
+              <a:shade val="15000"/>
+            </a:schemeClr>
+          </a:lnRef>
+          <a:fillRef idx="1">
+            <a:schemeClr val="accent1"/>
+          </a:fillRef>
+          <a:effectRef idx="0">
+            <a:schemeClr val="accent1"/>
+          </a:effectRef>
+          <a:fontRef idx="minor">
+            <a:schemeClr val="lt1"/>
+          </a:fontRef>
+        </p:style>
+        <p:txBody>
+          <a:bodyPr rtlCol="0" anchor="ctr"/>
+          <a:lstStyle/>
+          <a:p>
+            <a:pPr algn="ctr"/>
+            <a:endParaRPr lang="en-CA"/>
+          </a:p>
+        </p:txBody>
+      </p:sp>
+      <p:sp>
+        <p:nvSpPr>
+          <p:cNvPr id="7" name="Rectangle 6">
+            <a:extLst>
+              <a:ext uri="{FF2B5EF4-FFF2-40B4-BE49-F238E27FC236}">
+                <a16:creationId xmlns:a16="http://schemas.microsoft.com/office/drawing/2014/main" id="{9B6B50F7-7C71-E70D-4C05-580B3493C493}"/>
+              </a:ext>
+            </a:extLst>
+          </p:cNvPr>
+          <p:cNvSpPr>
+            <a:spLocks/>
+          </p:cNvSpPr>
+          <p:nvPr/>
+        </p:nvSpPr>
+        <p:spPr>
+          <a:xfrm>
+            <a:off x="3895892" y="2366963"/>
+            <a:ext cx="477756" cy="337354"/>
+          </a:xfrm>
+          <a:prstGeom prst="rect">
+            <a:avLst/>
+          </a:prstGeom>
+          <a:noFill/>
+          <a:ln>
+            <a:solidFill>
+              <a:schemeClr val="tx1"/>
+            </a:solidFill>
+          </a:ln>
+        </p:spPr>
+        <p:style>
+          <a:lnRef idx="2">
+            <a:schemeClr val="accent1">
+              <a:shade val="15000"/>
+            </a:schemeClr>
+          </a:lnRef>
+          <a:fillRef idx="1">
+            <a:schemeClr val="accent1"/>
+          </a:fillRef>
+          <a:effectRef idx="0">
+            <a:schemeClr val="accent1"/>
+          </a:effectRef>
+          <a:fontRef idx="minor">
+            <a:schemeClr val="lt1"/>
+          </a:fontRef>
+        </p:style>
+        <p:txBody>
+          <a:bodyPr rtlCol="0" anchor="ctr"/>
+          <a:lstStyle/>
+          <a:p>
+            <a:pPr algn="ctr"/>
+            <a:endParaRPr lang="en-CA"/>
+          </a:p>
+        </p:txBody>
+      </p:sp>
+      <p:sp>
+        <p:nvSpPr>
+          <p:cNvPr id="23" name="Rectangle 22">
+            <a:extLst>
+              <a:ext uri="{FF2B5EF4-FFF2-40B4-BE49-F238E27FC236}">
+                <a16:creationId xmlns:a16="http://schemas.microsoft.com/office/drawing/2014/main" id="{18647AD6-9649-C86F-8CAE-C826ADA4B224}"/>
+              </a:ext>
+            </a:extLst>
+          </p:cNvPr>
+          <p:cNvSpPr>
+            <a:spLocks/>
+          </p:cNvSpPr>
+          <p:nvPr/>
+        </p:nvSpPr>
+        <p:spPr>
+          <a:xfrm>
+            <a:off x="4372977" y="2367212"/>
+            <a:ext cx="477756" cy="338609"/>
+          </a:xfrm>
+          <a:prstGeom prst="rect">
+            <a:avLst/>
+          </a:prstGeom>
+          <a:noFill/>
+          <a:ln>
+            <a:solidFill>
+              <a:schemeClr val="tx1"/>
+            </a:solidFill>
+          </a:ln>
+        </p:spPr>
+        <p:style>
+          <a:lnRef idx="2">
+            <a:schemeClr val="accent1">
+              <a:shade val="15000"/>
+            </a:schemeClr>
+          </a:lnRef>
+          <a:fillRef idx="1">
+            <a:schemeClr val="accent1"/>
+          </a:fillRef>
+          <a:effectRef idx="0">
+            <a:schemeClr val="accent1"/>
+          </a:effectRef>
+          <a:fontRef idx="minor">
+            <a:schemeClr val="lt1"/>
+          </a:fontRef>
+        </p:style>
+        <p:txBody>
+          <a:bodyPr rtlCol="0" anchor="ctr"/>
+          <a:lstStyle/>
+          <a:p>
+            <a:pPr algn="ctr"/>
+            <a:endParaRPr lang="en-CA"/>
+          </a:p>
+        </p:txBody>
+      </p:sp>
+      <p:sp>
+        <p:nvSpPr>
+          <p:cNvPr id="26" name="Rectangle 25">
+            <a:extLst>
+              <a:ext uri="{FF2B5EF4-FFF2-40B4-BE49-F238E27FC236}">
+                <a16:creationId xmlns:a16="http://schemas.microsoft.com/office/drawing/2014/main" id="{F5087624-ACE9-DB80-81A7-F7EB7D17DE0A}"/>
+              </a:ext>
+            </a:extLst>
+          </p:cNvPr>
+          <p:cNvSpPr>
+            <a:spLocks/>
+          </p:cNvSpPr>
+          <p:nvPr/>
+        </p:nvSpPr>
+        <p:spPr>
+          <a:xfrm>
+            <a:off x="4848392" y="2364582"/>
+            <a:ext cx="477756" cy="339736"/>
+          </a:xfrm>
+          <a:prstGeom prst="rect">
+            <a:avLst/>
+          </a:prstGeom>
+          <a:noFill/>
+          <a:ln>
+            <a:solidFill>
+              <a:schemeClr val="tx1"/>
+            </a:solidFill>
+          </a:ln>
+        </p:spPr>
+        <p:style>
+          <a:lnRef idx="2">
+            <a:schemeClr val="accent1">
+              <a:shade val="15000"/>
+            </a:schemeClr>
+          </a:lnRef>
+          <a:fillRef idx="1">
+            <a:schemeClr val="accent1"/>
+          </a:fillRef>
+          <a:effectRef idx="0">
+            <a:schemeClr val="accent1"/>
+          </a:effectRef>
+          <a:fontRef idx="minor">
+            <a:schemeClr val="lt1"/>
+          </a:fontRef>
+        </p:style>
+        <p:txBody>
+          <a:bodyPr rtlCol="0" anchor="ctr"/>
+          <a:lstStyle/>
+          <a:p>
+            <a:pPr algn="ctr"/>
+            <a:endParaRPr lang="en-CA"/>
+          </a:p>
+        </p:txBody>
+      </p:sp>
+      <p:sp>
+        <p:nvSpPr>
+          <p:cNvPr id="27" name="Rectangle 26">
+            <a:extLst>
+              <a:ext uri="{FF2B5EF4-FFF2-40B4-BE49-F238E27FC236}">
+                <a16:creationId xmlns:a16="http://schemas.microsoft.com/office/drawing/2014/main" id="{BC1A15D4-1255-9D0E-407A-B93DD16B8A42}"/>
+              </a:ext>
+            </a:extLst>
+          </p:cNvPr>
+          <p:cNvSpPr>
+            <a:spLocks/>
+          </p:cNvSpPr>
+          <p:nvPr/>
+        </p:nvSpPr>
+        <p:spPr>
+          <a:xfrm>
+            <a:off x="5327023" y="2364581"/>
+            <a:ext cx="477756" cy="339736"/>
+          </a:xfrm>
+          <a:prstGeom prst="rect">
+            <a:avLst/>
+          </a:prstGeom>
+          <a:noFill/>
+          <a:ln>
+            <a:solidFill>
+              <a:schemeClr val="tx1"/>
+            </a:solidFill>
+          </a:ln>
+        </p:spPr>
+        <p:style>
+          <a:lnRef idx="2">
+            <a:schemeClr val="accent1">
+              <a:shade val="15000"/>
+            </a:schemeClr>
+          </a:lnRef>
+          <a:fillRef idx="1">
+            <a:schemeClr val="accent1"/>
+          </a:fillRef>
+          <a:effectRef idx="0">
+            <a:schemeClr val="accent1"/>
+          </a:effectRef>
+          <a:fontRef idx="minor">
+            <a:schemeClr val="lt1"/>
+          </a:fontRef>
+        </p:style>
+        <p:txBody>
+          <a:bodyPr rtlCol="0" anchor="ctr"/>
+          <a:lstStyle/>
+          <a:p>
+            <a:pPr algn="ctr"/>
+            <a:endParaRPr lang="en-CA"/>
+          </a:p>
+        </p:txBody>
+      </p:sp>
+      <p:cxnSp>
+        <p:nvCxnSpPr>
+          <p:cNvPr id="29" name="Connector: Curved 28">
+            <a:extLst>
+              <a:ext uri="{FF2B5EF4-FFF2-40B4-BE49-F238E27FC236}">
+                <a16:creationId xmlns:a16="http://schemas.microsoft.com/office/drawing/2014/main" id="{86CFECA5-C22E-35A1-E4FE-660B8F834768}"/>
+              </a:ext>
+            </a:extLst>
+          </p:cNvPr>
+          <p:cNvCxnSpPr>
+            <a:endCxn id="97" idx="1"/>
+          </p:cNvCxnSpPr>
+          <p:nvPr/>
+        </p:nvCxnSpPr>
+        <p:spPr>
+          <a:xfrm rot="16200000" flipH="1">
+            <a:off x="2655179" y="3532261"/>
+            <a:ext cx="2553483" cy="548640"/>
+          </a:xfrm>
+          <a:prstGeom prst="curvedConnector2">
+            <a:avLst/>
+          </a:prstGeom>
+          <a:ln>
+            <a:solidFill>
+              <a:srgbClr val="C00000"/>
+            </a:solidFill>
+            <a:tailEnd type="triangle"/>
+          </a:ln>
+        </p:spPr>
+        <p:style>
+          <a:lnRef idx="1">
+            <a:schemeClr val="accent1"/>
+          </a:lnRef>
+          <a:fillRef idx="0">
+            <a:schemeClr val="accent1"/>
+          </a:fillRef>
+          <a:effectRef idx="0">
+            <a:schemeClr val="accent1"/>
+          </a:effectRef>
+          <a:fontRef idx="minor">
+            <a:schemeClr val="tx1"/>
+          </a:fontRef>
+        </p:style>
+      </p:cxnSp>
     </p:spTree>
     <p:extLst>
       <p:ext uri="{BB962C8B-B14F-4D97-AF65-F5344CB8AC3E}">

</xml_diff>